<commit_message>
Spell Letter Change work
</commit_message>
<xml_diff>
--- a/Art/SpellImageWork.pptx
+++ b/Art/SpellImageWork.pptx
@@ -5,14 +5,16 @@
     <p:sldMasterId id="2147483648" r:id="rId1"/>
   </p:sldMasterIdLst>
   <p:notesMasterIdLst>
-    <p:notesMasterId r:id="rId7"/>
+    <p:notesMasterId r:id="rId9"/>
   </p:notesMasterIdLst>
   <p:sldIdLst>
     <p:sldId id="257" r:id="rId2"/>
-    <p:sldId id="258" r:id="rId3"/>
-    <p:sldId id="259" r:id="rId4"/>
-    <p:sldId id="260" r:id="rId5"/>
-    <p:sldId id="256" r:id="rId6"/>
+    <p:sldId id="261" r:id="rId3"/>
+    <p:sldId id="262" r:id="rId4"/>
+    <p:sldId id="258" r:id="rId5"/>
+    <p:sldId id="259" r:id="rId6"/>
+    <p:sldId id="260" r:id="rId7"/>
+    <p:sldId id="256" r:id="rId8"/>
   </p:sldIdLst>
   <p:sldSz cx="12192000" cy="6858000"/>
   <p:notesSz cx="6858000" cy="9144000"/>
@@ -111,7 +113,16 @@
       </a:defRPr>
     </a:lvl9pPr>
   </p:defaultTextStyle>
+  <p:extLst>
+    <p:ext uri="{EFAFB233-063F-42B5-8137-9DF3F51BA10A}">
+      <p15:sldGuideLst xmlns:p15="http://schemas.microsoft.com/office/powerpoint/2012/main"/>
+    </p:ext>
+  </p:extLst>
 </p:presentation>
+</file>
+
+<file path=ppt/revisionInfo.xml><?xml version="1.0" encoding="utf-8"?>
+<p1510:revInfo xmlns:a="http://schemas.openxmlformats.org/drawingml/2006/main" xmlns:r="http://schemas.openxmlformats.org/officeDocument/2006/relationships" xmlns:p1510="http://schemas.microsoft.com/office/powerpoint/2015/10/main"/>
 </file>
 
 <file path=ppt/notesMasters/notesMaster1.xml><?xml version="1.0" encoding="utf-8"?>
@@ -621,7 +632,7 @@
     </p:spTree>
     <p:extLst>
       <p:ext uri="{BB962C8B-B14F-4D97-AF65-F5344CB8AC3E}">
-        <p14:creationId xmlns:p14="http://schemas.microsoft.com/office/powerpoint/2010/main" val="937330666"/>
+        <p14:creationId xmlns:p14="http://schemas.microsoft.com/office/powerpoint/2010/main" val="1177702451"/>
       </p:ext>
     </p:extLst>
   </p:cSld>
@@ -705,7 +716,7 @@
     </p:spTree>
     <p:extLst>
       <p:ext uri="{BB962C8B-B14F-4D97-AF65-F5344CB8AC3E}">
-        <p14:creationId xmlns:p14="http://schemas.microsoft.com/office/powerpoint/2010/main" val="1616101520"/>
+        <p14:creationId xmlns:p14="http://schemas.microsoft.com/office/powerpoint/2010/main" val="612743181"/>
       </p:ext>
     </p:extLst>
   </p:cSld>
@@ -789,7 +800,7 @@
     </p:spTree>
     <p:extLst>
       <p:ext uri="{BB962C8B-B14F-4D97-AF65-F5344CB8AC3E}">
-        <p14:creationId xmlns:p14="http://schemas.microsoft.com/office/powerpoint/2010/main" val="1211650007"/>
+        <p14:creationId xmlns:p14="http://schemas.microsoft.com/office/powerpoint/2010/main" val="937330666"/>
       </p:ext>
     </p:extLst>
   </p:cSld>
@@ -865,6 +876,174 @@
             <a:fld id="{5B19FFF6-9D3A-43A2-9BC5-0E29ACA647E9}" type="slidenum">
               <a:rPr lang="en-US" smtClean="0"/>
               <a:t>5</a:t>
+            </a:fld>
+            <a:endParaRPr lang="en-US"/>
+          </a:p>
+        </p:txBody>
+      </p:sp>
+    </p:spTree>
+    <p:extLst>
+      <p:ext uri="{BB962C8B-B14F-4D97-AF65-F5344CB8AC3E}">
+        <p14:creationId xmlns:p14="http://schemas.microsoft.com/office/powerpoint/2010/main" val="1616101520"/>
+      </p:ext>
+    </p:extLst>
+  </p:cSld>
+  <p:clrMapOvr>
+    <a:masterClrMapping/>
+  </p:clrMapOvr>
+</p:notes>
+</file>
+
+<file path=ppt/notesSlides/notesSlide6.xml><?xml version="1.0" encoding="utf-8"?>
+<p:notes xmlns:a="http://schemas.openxmlformats.org/drawingml/2006/main" xmlns:r="http://schemas.openxmlformats.org/officeDocument/2006/relationships" xmlns:p="http://schemas.openxmlformats.org/presentationml/2006/main">
+  <p:cSld>
+    <p:spTree>
+      <p:nvGrpSpPr>
+        <p:cNvPr id="1" name=""/>
+        <p:cNvGrpSpPr/>
+        <p:nvPr/>
+      </p:nvGrpSpPr>
+      <p:grpSpPr>
+        <a:xfrm>
+          <a:off x="0" y="0"/>
+          <a:ext cx="0" cy="0"/>
+          <a:chOff x="0" y="0"/>
+          <a:chExt cx="0" cy="0"/>
+        </a:xfrm>
+      </p:grpSpPr>
+      <p:sp>
+        <p:nvSpPr>
+          <p:cNvPr id="2" name="Slide Image Placeholder 1"/>
+          <p:cNvSpPr>
+            <a:spLocks noGrp="1" noRot="1" noChangeAspect="1"/>
+          </p:cNvSpPr>
+          <p:nvPr>
+            <p:ph type="sldImg"/>
+          </p:nvPr>
+        </p:nvSpPr>
+        <p:spPr/>
+      </p:sp>
+      <p:sp>
+        <p:nvSpPr>
+          <p:cNvPr id="3" name="Notes Placeholder 2"/>
+          <p:cNvSpPr>
+            <a:spLocks noGrp="1"/>
+          </p:cNvSpPr>
+          <p:nvPr>
+            <p:ph type="body" idx="1"/>
+          </p:nvPr>
+        </p:nvSpPr>
+        <p:spPr/>
+        <p:txBody>
+          <a:bodyPr/>
+          <a:lstStyle/>
+          <a:p>
+            <a:endParaRPr lang="en-US"/>
+          </a:p>
+        </p:txBody>
+      </p:sp>
+      <p:sp>
+        <p:nvSpPr>
+          <p:cNvPr id="4" name="Slide Number Placeholder 3"/>
+          <p:cNvSpPr>
+            <a:spLocks noGrp="1"/>
+          </p:cNvSpPr>
+          <p:nvPr>
+            <p:ph type="sldNum" sz="quarter" idx="10"/>
+          </p:nvPr>
+        </p:nvSpPr>
+        <p:spPr/>
+        <p:txBody>
+          <a:bodyPr/>
+          <a:lstStyle/>
+          <a:p>
+            <a:fld id="{5B19FFF6-9D3A-43A2-9BC5-0E29ACA647E9}" type="slidenum">
+              <a:rPr lang="en-US" smtClean="0"/>
+              <a:t>6</a:t>
+            </a:fld>
+            <a:endParaRPr lang="en-US"/>
+          </a:p>
+        </p:txBody>
+      </p:sp>
+    </p:spTree>
+    <p:extLst>
+      <p:ext uri="{BB962C8B-B14F-4D97-AF65-F5344CB8AC3E}">
+        <p14:creationId xmlns:p14="http://schemas.microsoft.com/office/powerpoint/2010/main" val="1211650007"/>
+      </p:ext>
+    </p:extLst>
+  </p:cSld>
+  <p:clrMapOvr>
+    <a:masterClrMapping/>
+  </p:clrMapOvr>
+</p:notes>
+</file>
+
+<file path=ppt/notesSlides/notesSlide7.xml><?xml version="1.0" encoding="utf-8"?>
+<p:notes xmlns:a="http://schemas.openxmlformats.org/drawingml/2006/main" xmlns:r="http://schemas.openxmlformats.org/officeDocument/2006/relationships" xmlns:p="http://schemas.openxmlformats.org/presentationml/2006/main">
+  <p:cSld>
+    <p:spTree>
+      <p:nvGrpSpPr>
+        <p:cNvPr id="1" name=""/>
+        <p:cNvGrpSpPr/>
+        <p:nvPr/>
+      </p:nvGrpSpPr>
+      <p:grpSpPr>
+        <a:xfrm>
+          <a:off x="0" y="0"/>
+          <a:ext cx="0" cy="0"/>
+          <a:chOff x="0" y="0"/>
+          <a:chExt cx="0" cy="0"/>
+        </a:xfrm>
+      </p:grpSpPr>
+      <p:sp>
+        <p:nvSpPr>
+          <p:cNvPr id="2" name="Slide Image Placeholder 1"/>
+          <p:cNvSpPr>
+            <a:spLocks noGrp="1" noRot="1" noChangeAspect="1"/>
+          </p:cNvSpPr>
+          <p:nvPr>
+            <p:ph type="sldImg"/>
+          </p:nvPr>
+        </p:nvSpPr>
+        <p:spPr/>
+      </p:sp>
+      <p:sp>
+        <p:nvSpPr>
+          <p:cNvPr id="3" name="Notes Placeholder 2"/>
+          <p:cNvSpPr>
+            <a:spLocks noGrp="1"/>
+          </p:cNvSpPr>
+          <p:nvPr>
+            <p:ph type="body" idx="1"/>
+          </p:nvPr>
+        </p:nvSpPr>
+        <p:spPr/>
+        <p:txBody>
+          <a:bodyPr/>
+          <a:lstStyle/>
+          <a:p>
+            <a:endParaRPr lang="en-US"/>
+          </a:p>
+        </p:txBody>
+      </p:sp>
+      <p:sp>
+        <p:nvSpPr>
+          <p:cNvPr id="4" name="Slide Number Placeholder 3"/>
+          <p:cNvSpPr>
+            <a:spLocks noGrp="1"/>
+          </p:cNvSpPr>
+          <p:nvPr>
+            <p:ph type="sldNum" sz="quarter" idx="10"/>
+          </p:nvPr>
+        </p:nvSpPr>
+        <p:spPr/>
+        <p:txBody>
+          <a:bodyPr/>
+          <a:lstStyle/>
+          <a:p>
+            <a:fld id="{5B19FFF6-9D3A-43A2-9BC5-0E29ACA647E9}" type="slidenum">
+              <a:rPr lang="en-US" smtClean="0"/>
+              <a:t>7</a:t>
             </a:fld>
             <a:endParaRPr lang="en-US"/>
           </a:p>
@@ -4162,7 +4341,7 @@
           <p:cNvPr id="2" name="Picture 1">
             <a:extLst>
               <a:ext uri="{FF2B5EF4-FFF2-40B4-BE49-F238E27FC236}">
-                <a16:creationId xmlns:a16="http://schemas.microsoft.com/office/drawing/2014/main" id="{3F346B1C-146E-40B6-A156-9ECCC04E1773}"/>
+                <a16:creationId xmlns:a16="http://schemas.microsoft.com/office/drawing/2014/main" id="{810E4F26-075C-4F8E-B53A-135C51CBBCEC}"/>
               </a:ext>
             </a:extLst>
           </p:cNvPr>
@@ -4173,13 +4352,13 @@
         </p:nvPicPr>
         <p:blipFill rotWithShape="1">
           <a:blip r:embed="rId3"/>
-          <a:srcRect l="18443" t="8911" r="39760" b="52305"/>
+          <a:srcRect l="30878" t="10063" r="30564" b="52831"/>
           <a:stretch/>
         </p:blipFill>
         <p:spPr>
           <a:xfrm>
-            <a:off x="4476751" y="2170750"/>
-            <a:ext cx="3035300" cy="2807650"/>
+            <a:off x="4543425" y="1885332"/>
+            <a:ext cx="2562226" cy="2458068"/>
           </a:xfrm>
           <a:prstGeom prst="rect">
             <a:avLst/>
@@ -4188,10 +4367,10 @@
       </p:pic>
       <p:sp>
         <p:nvSpPr>
-          <p:cNvPr id="3" name="Arrow: Curved Left 2">
-            <a:extLst>
-              <a:ext uri="{FF2B5EF4-FFF2-40B4-BE49-F238E27FC236}">
-                <a16:creationId xmlns:a16="http://schemas.microsoft.com/office/drawing/2014/main" id="{553EA8F3-3BF9-4F6A-9336-C8F36EEE5500}"/>
+          <p:cNvPr id="3" name="Multiplication Sign 2">
+            <a:extLst>
+              <a:ext uri="{FF2B5EF4-FFF2-40B4-BE49-F238E27FC236}">
+                <a16:creationId xmlns:a16="http://schemas.microsoft.com/office/drawing/2014/main" id="{D250D44B-F387-4D84-B7E5-EC1CAE256365}"/>
               </a:ext>
             </a:extLst>
           </p:cNvPr>
@@ -4200,26 +4379,27 @@
         </p:nvSpPr>
         <p:spPr>
           <a:xfrm>
-            <a:off x="6218240" y="2840957"/>
-            <a:ext cx="948528" cy="1737394"/>
+            <a:off x="5153025" y="2505075"/>
+            <a:ext cx="1304925" cy="1152525"/>
           </a:xfrm>
-          <a:prstGeom prst="curvedLeftArrow">
-            <a:avLst>
-              <a:gd name="adj1" fmla="val 18048"/>
-              <a:gd name="adj2" fmla="val 50000"/>
-              <a:gd name="adj3" fmla="val 39338"/>
-            </a:avLst>
+          <a:prstGeom prst="mathMultiply">
+            <a:avLst/>
           </a:prstGeom>
+          <a:solidFill>
+            <a:srgbClr val="FF0000"/>
+          </a:solidFill>
         </p:spPr>
         <p:style>
-          <a:lnRef idx="0">
-            <a:schemeClr val="accent4"/>
+          <a:lnRef idx="2">
+            <a:schemeClr val="accent1">
+              <a:shade val="50000"/>
+            </a:schemeClr>
           </a:lnRef>
-          <a:fillRef idx="3">
-            <a:schemeClr val="accent4"/>
+          <a:fillRef idx="1">
+            <a:schemeClr val="accent1"/>
           </a:fillRef>
-          <a:effectRef idx="3">
-            <a:schemeClr val="accent4"/>
+          <a:effectRef idx="0">
+            <a:schemeClr val="accent1"/>
           </a:effectRef>
           <a:fontRef idx="minor">
             <a:schemeClr val="lt1"/>
@@ -4230,70 +4410,14 @@
           <a:lstStyle/>
           <a:p>
             <a:pPr algn="ctr"/>
-            <a:endParaRPr lang="en-US">
-              <a:solidFill>
-                <a:schemeClr val="tx1"/>
-              </a:solidFill>
-            </a:endParaRPr>
-          </a:p>
-        </p:txBody>
-      </p:sp>
-      <p:sp>
-        <p:nvSpPr>
-          <p:cNvPr id="5" name="Arrow: Curved Left 4">
-            <a:extLst>
-              <a:ext uri="{FF2B5EF4-FFF2-40B4-BE49-F238E27FC236}">
-                <a16:creationId xmlns:a16="http://schemas.microsoft.com/office/drawing/2014/main" id="{D8C208C2-D625-476D-AB9B-A5A8754B6CBB}"/>
-              </a:ext>
-            </a:extLst>
-          </p:cNvPr>
-          <p:cNvSpPr/>
-          <p:nvPr/>
-        </p:nvSpPr>
-        <p:spPr>
-          <a:xfrm rot="10800000">
-            <a:off x="4812884" y="2691729"/>
-            <a:ext cx="887825" cy="1737395"/>
-          </a:xfrm>
-          <a:prstGeom prst="curvedLeftArrow">
-            <a:avLst>
-              <a:gd name="adj1" fmla="val 18048"/>
-              <a:gd name="adj2" fmla="val 50000"/>
-              <a:gd name="adj3" fmla="val 39338"/>
-            </a:avLst>
-          </a:prstGeom>
-        </p:spPr>
-        <p:style>
-          <a:lnRef idx="0">
-            <a:schemeClr val="accent4"/>
-          </a:lnRef>
-          <a:fillRef idx="3">
-            <a:schemeClr val="accent4"/>
-          </a:fillRef>
-          <a:effectRef idx="3">
-            <a:schemeClr val="accent4"/>
-          </a:effectRef>
-          <a:fontRef idx="minor">
-            <a:schemeClr val="lt1"/>
-          </a:fontRef>
-        </p:style>
-        <p:txBody>
-          <a:bodyPr rtlCol="0" anchor="ctr"/>
-          <a:lstStyle/>
-          <a:p>
-            <a:pPr algn="ctr"/>
-            <a:endParaRPr lang="en-US">
-              <a:solidFill>
-                <a:schemeClr val="tx1"/>
-              </a:solidFill>
-            </a:endParaRPr>
+            <a:endParaRPr lang="en-US"/>
           </a:p>
         </p:txBody>
       </p:sp>
     </p:spTree>
     <p:extLst>
       <p:ext uri="{BB962C8B-B14F-4D97-AF65-F5344CB8AC3E}">
-        <p14:creationId xmlns:p14="http://schemas.microsoft.com/office/powerpoint/2010/main" val="3255219281"/>
+        <p14:creationId xmlns:p14="http://schemas.microsoft.com/office/powerpoint/2010/main" val="660330235"/>
       </p:ext>
     </p:extLst>
   </p:cSld>
@@ -4325,7 +4449,7 @@
           <p:cNvPr id="2" name="Picture 1">
             <a:extLst>
               <a:ext uri="{FF2B5EF4-FFF2-40B4-BE49-F238E27FC236}">
-                <a16:creationId xmlns:a16="http://schemas.microsoft.com/office/drawing/2014/main" id="{3F346B1C-146E-40B6-A156-9ECCC04E1773}"/>
+                <a16:creationId xmlns:a16="http://schemas.microsoft.com/office/drawing/2014/main" id="{810E4F26-075C-4F8E-B53A-135C51CBBCEC}"/>
               </a:ext>
             </a:extLst>
           </p:cNvPr>
@@ -4336,13 +4460,13 @@
         </p:nvPicPr>
         <p:blipFill rotWithShape="1">
           <a:blip r:embed="rId3"/>
-          <a:srcRect l="18443" t="8911" r="39760" b="52305"/>
+          <a:srcRect l="22135" t="582" r="23110" b="44060"/>
           <a:stretch/>
         </p:blipFill>
         <p:spPr>
           <a:xfrm>
-            <a:off x="4476751" y="2170750"/>
-            <a:ext cx="3035300" cy="2807650"/>
+            <a:off x="3962400" y="1257299"/>
+            <a:ext cx="3638549" cy="3667125"/>
           </a:xfrm>
           <a:prstGeom prst="rect">
             <a:avLst/>
@@ -4351,10 +4475,10 @@
       </p:pic>
       <p:sp>
         <p:nvSpPr>
-          <p:cNvPr id="3" name="Arrow: Curved Left 2">
-            <a:extLst>
-              <a:ext uri="{FF2B5EF4-FFF2-40B4-BE49-F238E27FC236}">
-                <a16:creationId xmlns:a16="http://schemas.microsoft.com/office/drawing/2014/main" id="{553EA8F3-3BF9-4F6A-9336-C8F36EEE5500}"/>
+          <p:cNvPr id="3" name="Multiplication Sign 2">
+            <a:extLst>
+              <a:ext uri="{FF2B5EF4-FFF2-40B4-BE49-F238E27FC236}">
+                <a16:creationId xmlns:a16="http://schemas.microsoft.com/office/drawing/2014/main" id="{D250D44B-F387-4D84-B7E5-EC1CAE256365}"/>
               </a:ext>
             </a:extLst>
           </p:cNvPr>
@@ -4362,27 +4486,28 @@
           <p:nvPr/>
         </p:nvSpPr>
         <p:spPr>
-          <a:xfrm flipV="1">
-            <a:off x="6218240" y="2672680"/>
-            <a:ext cx="948528" cy="1737394"/>
+          <a:xfrm>
+            <a:off x="4090986" y="1643061"/>
+            <a:ext cx="3381375" cy="2895600"/>
           </a:xfrm>
-          <a:prstGeom prst="curvedLeftArrow">
-            <a:avLst>
-              <a:gd name="adj1" fmla="val 18048"/>
-              <a:gd name="adj2" fmla="val 50000"/>
-              <a:gd name="adj3" fmla="val 39338"/>
-            </a:avLst>
+          <a:prstGeom prst="mathMultiply">
+            <a:avLst/>
           </a:prstGeom>
+          <a:solidFill>
+            <a:srgbClr val="FF0000"/>
+          </a:solidFill>
         </p:spPr>
         <p:style>
-          <a:lnRef idx="0">
-            <a:schemeClr val="accent4"/>
+          <a:lnRef idx="2">
+            <a:schemeClr val="accent1">
+              <a:shade val="50000"/>
+            </a:schemeClr>
           </a:lnRef>
-          <a:fillRef idx="3">
-            <a:schemeClr val="accent4"/>
+          <a:fillRef idx="1">
+            <a:schemeClr val="accent1"/>
           </a:fillRef>
-          <a:effectRef idx="3">
-            <a:schemeClr val="accent4"/>
+          <a:effectRef idx="0">
+            <a:schemeClr val="accent1"/>
           </a:effectRef>
           <a:fontRef idx="minor">
             <a:schemeClr val="lt1"/>
@@ -4393,70 +4518,14 @@
           <a:lstStyle/>
           <a:p>
             <a:pPr algn="ctr"/>
-            <a:endParaRPr lang="en-US">
-              <a:solidFill>
-                <a:schemeClr val="tx1"/>
-              </a:solidFill>
-            </a:endParaRPr>
-          </a:p>
-        </p:txBody>
-      </p:sp>
-      <p:sp>
-        <p:nvSpPr>
-          <p:cNvPr id="5" name="Arrow: Curved Left 4">
-            <a:extLst>
-              <a:ext uri="{FF2B5EF4-FFF2-40B4-BE49-F238E27FC236}">
-                <a16:creationId xmlns:a16="http://schemas.microsoft.com/office/drawing/2014/main" id="{D8C208C2-D625-476D-AB9B-A5A8754B6CBB}"/>
-              </a:ext>
-            </a:extLst>
-          </p:cNvPr>
-          <p:cNvSpPr/>
-          <p:nvPr/>
-        </p:nvSpPr>
-        <p:spPr>
-          <a:xfrm rot="10800000" flipV="1">
-            <a:off x="4803359" y="2796504"/>
-            <a:ext cx="887825" cy="1737395"/>
-          </a:xfrm>
-          <a:prstGeom prst="curvedLeftArrow">
-            <a:avLst>
-              <a:gd name="adj1" fmla="val 18048"/>
-              <a:gd name="adj2" fmla="val 50000"/>
-              <a:gd name="adj3" fmla="val 39338"/>
-            </a:avLst>
-          </a:prstGeom>
-        </p:spPr>
-        <p:style>
-          <a:lnRef idx="0">
-            <a:schemeClr val="accent4"/>
-          </a:lnRef>
-          <a:fillRef idx="3">
-            <a:schemeClr val="accent4"/>
-          </a:fillRef>
-          <a:effectRef idx="3">
-            <a:schemeClr val="accent4"/>
-          </a:effectRef>
-          <a:fontRef idx="minor">
-            <a:schemeClr val="lt1"/>
-          </a:fontRef>
-        </p:style>
-        <p:txBody>
-          <a:bodyPr rtlCol="0" anchor="ctr"/>
-          <a:lstStyle/>
-          <a:p>
-            <a:pPr algn="ctr"/>
-            <a:endParaRPr lang="en-US">
-              <a:solidFill>
-                <a:schemeClr val="tx1"/>
-              </a:solidFill>
-            </a:endParaRPr>
+            <a:endParaRPr lang="en-US"/>
           </a:p>
         </p:txBody>
       </p:sp>
     </p:spTree>
     <p:extLst>
       <p:ext uri="{BB962C8B-B14F-4D97-AF65-F5344CB8AC3E}">
-        <p14:creationId xmlns:p14="http://schemas.microsoft.com/office/powerpoint/2010/main" val="3077491938"/>
+        <p14:creationId xmlns:p14="http://schemas.microsoft.com/office/powerpoint/2010/main" val="3490472520"/>
       </p:ext>
     </p:extLst>
   </p:cSld>
@@ -4616,6 +4685,332 @@
           </a:p>
         </p:txBody>
       </p:sp>
+    </p:spTree>
+    <p:extLst>
+      <p:ext uri="{BB962C8B-B14F-4D97-AF65-F5344CB8AC3E}">
+        <p14:creationId xmlns:p14="http://schemas.microsoft.com/office/powerpoint/2010/main" val="3255219281"/>
+      </p:ext>
+    </p:extLst>
+  </p:cSld>
+  <p:clrMapOvr>
+    <a:masterClrMapping/>
+  </p:clrMapOvr>
+</p:sld>
+</file>
+
+<file path=ppt/slides/slide5.xml><?xml version="1.0" encoding="utf-8"?>
+<p:sld xmlns:a="http://schemas.openxmlformats.org/drawingml/2006/main" xmlns:r="http://schemas.openxmlformats.org/officeDocument/2006/relationships" xmlns:p="http://schemas.openxmlformats.org/presentationml/2006/main">
+  <p:cSld>
+    <p:spTree>
+      <p:nvGrpSpPr>
+        <p:cNvPr id="1" name=""/>
+        <p:cNvGrpSpPr/>
+        <p:nvPr/>
+      </p:nvGrpSpPr>
+      <p:grpSpPr>
+        <a:xfrm>
+          <a:off x="0" y="0"/>
+          <a:ext cx="0" cy="0"/>
+          <a:chOff x="0" y="0"/>
+          <a:chExt cx="0" cy="0"/>
+        </a:xfrm>
+      </p:grpSpPr>
+      <p:pic>
+        <p:nvPicPr>
+          <p:cNvPr id="2" name="Picture 1">
+            <a:extLst>
+              <a:ext uri="{FF2B5EF4-FFF2-40B4-BE49-F238E27FC236}">
+                <a16:creationId xmlns:a16="http://schemas.microsoft.com/office/drawing/2014/main" id="{3F346B1C-146E-40B6-A156-9ECCC04E1773}"/>
+              </a:ext>
+            </a:extLst>
+          </p:cNvPr>
+          <p:cNvPicPr>
+            <a:picLocks noChangeAspect="1"/>
+          </p:cNvPicPr>
+          <p:nvPr/>
+        </p:nvPicPr>
+        <p:blipFill rotWithShape="1">
+          <a:blip r:embed="rId3"/>
+          <a:srcRect l="18443" t="8911" r="39760" b="52305"/>
+          <a:stretch/>
+        </p:blipFill>
+        <p:spPr>
+          <a:xfrm>
+            <a:off x="4476751" y="2170750"/>
+            <a:ext cx="3035300" cy="2807650"/>
+          </a:xfrm>
+          <a:prstGeom prst="rect">
+            <a:avLst/>
+          </a:prstGeom>
+        </p:spPr>
+      </p:pic>
+      <p:sp>
+        <p:nvSpPr>
+          <p:cNvPr id="3" name="Arrow: Curved Left 2">
+            <a:extLst>
+              <a:ext uri="{FF2B5EF4-FFF2-40B4-BE49-F238E27FC236}">
+                <a16:creationId xmlns:a16="http://schemas.microsoft.com/office/drawing/2014/main" id="{553EA8F3-3BF9-4F6A-9336-C8F36EEE5500}"/>
+              </a:ext>
+            </a:extLst>
+          </p:cNvPr>
+          <p:cNvSpPr/>
+          <p:nvPr/>
+        </p:nvSpPr>
+        <p:spPr>
+          <a:xfrm flipV="1">
+            <a:off x="6218240" y="2672680"/>
+            <a:ext cx="948528" cy="1737394"/>
+          </a:xfrm>
+          <a:prstGeom prst="curvedLeftArrow">
+            <a:avLst>
+              <a:gd name="adj1" fmla="val 18048"/>
+              <a:gd name="adj2" fmla="val 50000"/>
+              <a:gd name="adj3" fmla="val 39338"/>
+            </a:avLst>
+          </a:prstGeom>
+        </p:spPr>
+        <p:style>
+          <a:lnRef idx="0">
+            <a:schemeClr val="accent4"/>
+          </a:lnRef>
+          <a:fillRef idx="3">
+            <a:schemeClr val="accent4"/>
+          </a:fillRef>
+          <a:effectRef idx="3">
+            <a:schemeClr val="accent4"/>
+          </a:effectRef>
+          <a:fontRef idx="minor">
+            <a:schemeClr val="lt1"/>
+          </a:fontRef>
+        </p:style>
+        <p:txBody>
+          <a:bodyPr rtlCol="0" anchor="ctr"/>
+          <a:lstStyle/>
+          <a:p>
+            <a:pPr algn="ctr"/>
+            <a:endParaRPr lang="en-US">
+              <a:solidFill>
+                <a:schemeClr val="tx1"/>
+              </a:solidFill>
+            </a:endParaRPr>
+          </a:p>
+        </p:txBody>
+      </p:sp>
+      <p:sp>
+        <p:nvSpPr>
+          <p:cNvPr id="5" name="Arrow: Curved Left 4">
+            <a:extLst>
+              <a:ext uri="{FF2B5EF4-FFF2-40B4-BE49-F238E27FC236}">
+                <a16:creationId xmlns:a16="http://schemas.microsoft.com/office/drawing/2014/main" id="{D8C208C2-D625-476D-AB9B-A5A8754B6CBB}"/>
+              </a:ext>
+            </a:extLst>
+          </p:cNvPr>
+          <p:cNvSpPr/>
+          <p:nvPr/>
+        </p:nvSpPr>
+        <p:spPr>
+          <a:xfrm rot="10800000" flipV="1">
+            <a:off x="4803359" y="2796504"/>
+            <a:ext cx="887825" cy="1737395"/>
+          </a:xfrm>
+          <a:prstGeom prst="curvedLeftArrow">
+            <a:avLst>
+              <a:gd name="adj1" fmla="val 18048"/>
+              <a:gd name="adj2" fmla="val 50000"/>
+              <a:gd name="adj3" fmla="val 39338"/>
+            </a:avLst>
+          </a:prstGeom>
+        </p:spPr>
+        <p:style>
+          <a:lnRef idx="0">
+            <a:schemeClr val="accent4"/>
+          </a:lnRef>
+          <a:fillRef idx="3">
+            <a:schemeClr val="accent4"/>
+          </a:fillRef>
+          <a:effectRef idx="3">
+            <a:schemeClr val="accent4"/>
+          </a:effectRef>
+          <a:fontRef idx="minor">
+            <a:schemeClr val="lt1"/>
+          </a:fontRef>
+        </p:style>
+        <p:txBody>
+          <a:bodyPr rtlCol="0" anchor="ctr"/>
+          <a:lstStyle/>
+          <a:p>
+            <a:pPr algn="ctr"/>
+            <a:endParaRPr lang="en-US">
+              <a:solidFill>
+                <a:schemeClr val="tx1"/>
+              </a:solidFill>
+            </a:endParaRPr>
+          </a:p>
+        </p:txBody>
+      </p:sp>
+    </p:spTree>
+    <p:extLst>
+      <p:ext uri="{BB962C8B-B14F-4D97-AF65-F5344CB8AC3E}">
+        <p14:creationId xmlns:p14="http://schemas.microsoft.com/office/powerpoint/2010/main" val="3077491938"/>
+      </p:ext>
+    </p:extLst>
+  </p:cSld>
+  <p:clrMapOvr>
+    <a:masterClrMapping/>
+  </p:clrMapOvr>
+</p:sld>
+</file>
+
+<file path=ppt/slides/slide6.xml><?xml version="1.0" encoding="utf-8"?>
+<p:sld xmlns:a="http://schemas.openxmlformats.org/drawingml/2006/main" xmlns:r="http://schemas.openxmlformats.org/officeDocument/2006/relationships" xmlns:p="http://schemas.openxmlformats.org/presentationml/2006/main">
+  <p:cSld>
+    <p:spTree>
+      <p:nvGrpSpPr>
+        <p:cNvPr id="1" name=""/>
+        <p:cNvGrpSpPr/>
+        <p:nvPr/>
+      </p:nvGrpSpPr>
+      <p:grpSpPr>
+        <a:xfrm>
+          <a:off x="0" y="0"/>
+          <a:ext cx="0" cy="0"/>
+          <a:chOff x="0" y="0"/>
+          <a:chExt cx="0" cy="0"/>
+        </a:xfrm>
+      </p:grpSpPr>
+      <p:pic>
+        <p:nvPicPr>
+          <p:cNvPr id="2" name="Picture 1">
+            <a:extLst>
+              <a:ext uri="{FF2B5EF4-FFF2-40B4-BE49-F238E27FC236}">
+                <a16:creationId xmlns:a16="http://schemas.microsoft.com/office/drawing/2014/main" id="{3F346B1C-146E-40B6-A156-9ECCC04E1773}"/>
+              </a:ext>
+            </a:extLst>
+          </p:cNvPr>
+          <p:cNvPicPr>
+            <a:picLocks noChangeAspect="1"/>
+          </p:cNvPicPr>
+          <p:nvPr/>
+        </p:nvPicPr>
+        <p:blipFill rotWithShape="1">
+          <a:blip r:embed="rId3"/>
+          <a:srcRect l="18443" t="8911" r="39760" b="52305"/>
+          <a:stretch/>
+        </p:blipFill>
+        <p:spPr>
+          <a:xfrm>
+            <a:off x="4476751" y="2170750"/>
+            <a:ext cx="3035300" cy="2807650"/>
+          </a:xfrm>
+          <a:prstGeom prst="rect">
+            <a:avLst/>
+          </a:prstGeom>
+        </p:spPr>
+      </p:pic>
+      <p:sp>
+        <p:nvSpPr>
+          <p:cNvPr id="3" name="Arrow: Curved Left 2">
+            <a:extLst>
+              <a:ext uri="{FF2B5EF4-FFF2-40B4-BE49-F238E27FC236}">
+                <a16:creationId xmlns:a16="http://schemas.microsoft.com/office/drawing/2014/main" id="{553EA8F3-3BF9-4F6A-9336-C8F36EEE5500}"/>
+              </a:ext>
+            </a:extLst>
+          </p:cNvPr>
+          <p:cNvSpPr/>
+          <p:nvPr/>
+        </p:nvSpPr>
+        <p:spPr>
+          <a:xfrm>
+            <a:off x="6218240" y="2840957"/>
+            <a:ext cx="948528" cy="1737394"/>
+          </a:xfrm>
+          <a:prstGeom prst="curvedLeftArrow">
+            <a:avLst>
+              <a:gd name="adj1" fmla="val 18048"/>
+              <a:gd name="adj2" fmla="val 50000"/>
+              <a:gd name="adj3" fmla="val 39338"/>
+            </a:avLst>
+          </a:prstGeom>
+        </p:spPr>
+        <p:style>
+          <a:lnRef idx="0">
+            <a:schemeClr val="accent4"/>
+          </a:lnRef>
+          <a:fillRef idx="3">
+            <a:schemeClr val="accent4"/>
+          </a:fillRef>
+          <a:effectRef idx="3">
+            <a:schemeClr val="accent4"/>
+          </a:effectRef>
+          <a:fontRef idx="minor">
+            <a:schemeClr val="lt1"/>
+          </a:fontRef>
+        </p:style>
+        <p:txBody>
+          <a:bodyPr rtlCol="0" anchor="ctr"/>
+          <a:lstStyle/>
+          <a:p>
+            <a:pPr algn="ctr"/>
+            <a:endParaRPr lang="en-US">
+              <a:solidFill>
+                <a:schemeClr val="tx1"/>
+              </a:solidFill>
+            </a:endParaRPr>
+          </a:p>
+        </p:txBody>
+      </p:sp>
+      <p:sp>
+        <p:nvSpPr>
+          <p:cNvPr id="5" name="Arrow: Curved Left 4">
+            <a:extLst>
+              <a:ext uri="{FF2B5EF4-FFF2-40B4-BE49-F238E27FC236}">
+                <a16:creationId xmlns:a16="http://schemas.microsoft.com/office/drawing/2014/main" id="{D8C208C2-D625-476D-AB9B-A5A8754B6CBB}"/>
+              </a:ext>
+            </a:extLst>
+          </p:cNvPr>
+          <p:cNvSpPr/>
+          <p:nvPr/>
+        </p:nvSpPr>
+        <p:spPr>
+          <a:xfrm rot="10800000">
+            <a:off x="4812884" y="2691729"/>
+            <a:ext cx="887825" cy="1737395"/>
+          </a:xfrm>
+          <a:prstGeom prst="curvedLeftArrow">
+            <a:avLst>
+              <a:gd name="adj1" fmla="val 18048"/>
+              <a:gd name="adj2" fmla="val 50000"/>
+              <a:gd name="adj3" fmla="val 39338"/>
+            </a:avLst>
+          </a:prstGeom>
+        </p:spPr>
+        <p:style>
+          <a:lnRef idx="0">
+            <a:schemeClr val="accent4"/>
+          </a:lnRef>
+          <a:fillRef idx="3">
+            <a:schemeClr val="accent4"/>
+          </a:fillRef>
+          <a:effectRef idx="3">
+            <a:schemeClr val="accent4"/>
+          </a:effectRef>
+          <a:fontRef idx="minor">
+            <a:schemeClr val="lt1"/>
+          </a:fontRef>
+        </p:style>
+        <p:txBody>
+          <a:bodyPr rtlCol="0" anchor="ctr"/>
+          <a:lstStyle/>
+          <a:p>
+            <a:pPr algn="ctr"/>
+            <a:endParaRPr lang="en-US">
+              <a:solidFill>
+                <a:schemeClr val="tx1"/>
+              </a:solidFill>
+            </a:endParaRPr>
+          </a:p>
+        </p:txBody>
+      </p:sp>
       <p:sp>
         <p:nvSpPr>
           <p:cNvPr id="4" name="Rectangle 3">
@@ -4689,7 +5084,7 @@
 </p:sld>
 </file>
 
-<file path=ppt/slides/slide5.xml><?xml version="1.0" encoding="utf-8"?>
+<file path=ppt/slides/slide7.xml><?xml version="1.0" encoding="utf-8"?>
 <p:sld xmlns:a="http://schemas.openxmlformats.org/drawingml/2006/main" xmlns:r="http://schemas.openxmlformats.org/officeDocument/2006/relationships" xmlns:p="http://schemas.openxmlformats.org/presentationml/2006/main">
   <p:cSld>
     <p:spTree>

</xml_diff>

<commit_message>
spells fixes and save start
</commit_message>
<xml_diff>
--- a/Art/SpellImageWork.pptx
+++ b/Art/SpellImageWork.pptx
@@ -5,22 +5,26 @@
     <p:sldMasterId id="2147483648" r:id="rId1"/>
   </p:sldMasterIdLst>
   <p:notesMasterIdLst>
-    <p:notesMasterId r:id="rId15"/>
+    <p:notesMasterId r:id="rId19"/>
   </p:notesMasterIdLst>
   <p:sldIdLst>
     <p:sldId id="257" r:id="rId2"/>
-    <p:sldId id="261" r:id="rId3"/>
-    <p:sldId id="268" r:id="rId4"/>
-    <p:sldId id="262" r:id="rId5"/>
-    <p:sldId id="263" r:id="rId6"/>
-    <p:sldId id="265" r:id="rId7"/>
-    <p:sldId id="264" r:id="rId8"/>
-    <p:sldId id="266" r:id="rId9"/>
-    <p:sldId id="258" r:id="rId10"/>
-    <p:sldId id="267" r:id="rId11"/>
-    <p:sldId id="259" r:id="rId12"/>
-    <p:sldId id="260" r:id="rId13"/>
-    <p:sldId id="256" r:id="rId14"/>
+    <p:sldId id="269" r:id="rId3"/>
+    <p:sldId id="270" r:id="rId4"/>
+    <p:sldId id="271" r:id="rId5"/>
+    <p:sldId id="261" r:id="rId6"/>
+    <p:sldId id="268" r:id="rId7"/>
+    <p:sldId id="262" r:id="rId8"/>
+    <p:sldId id="272" r:id="rId9"/>
+    <p:sldId id="263" r:id="rId10"/>
+    <p:sldId id="265" r:id="rId11"/>
+    <p:sldId id="264" r:id="rId12"/>
+    <p:sldId id="266" r:id="rId13"/>
+    <p:sldId id="258" r:id="rId14"/>
+    <p:sldId id="267" r:id="rId15"/>
+    <p:sldId id="259" r:id="rId16"/>
+    <p:sldId id="260" r:id="rId17"/>
+    <p:sldId id="256" r:id="rId18"/>
   </p:sldIdLst>
   <p:sldSz cx="12192000" cy="6858000"/>
   <p:notesSz cx="6858000" cy="9144000"/>
@@ -213,7 +217,7 @@
           <a:p>
             <a:fld id="{885F340B-B2F0-44D2-B94A-CA6CE60D6424}" type="datetimeFigureOut">
               <a:rPr lang="en-US" smtClean="0"/>
-              <a:t>11/28/2017</a:t>
+              <a:t>11/29/2017</a:t>
             </a:fld>
             <a:endParaRPr lang="en-US"/>
           </a:p>
@@ -638,7 +642,7 @@
     </p:spTree>
     <p:extLst>
       <p:ext uri="{BB962C8B-B14F-4D97-AF65-F5344CB8AC3E}">
-        <p14:creationId xmlns:p14="http://schemas.microsoft.com/office/powerpoint/2010/main" val="1181008352"/>
+        <p14:creationId xmlns:p14="http://schemas.microsoft.com/office/powerpoint/2010/main" val="3071738978"/>
       </p:ext>
     </p:extLst>
   </p:cSld>
@@ -722,7 +726,7 @@
     </p:spTree>
     <p:extLst>
       <p:ext uri="{BB962C8B-B14F-4D97-AF65-F5344CB8AC3E}">
-        <p14:creationId xmlns:p14="http://schemas.microsoft.com/office/powerpoint/2010/main" val="1616101520"/>
+        <p14:creationId xmlns:p14="http://schemas.microsoft.com/office/powerpoint/2010/main" val="3507851252"/>
       </p:ext>
     </p:extLst>
   </p:cSld>
@@ -806,7 +810,7 @@
     </p:spTree>
     <p:extLst>
       <p:ext uri="{BB962C8B-B14F-4D97-AF65-F5344CB8AC3E}">
-        <p14:creationId xmlns:p14="http://schemas.microsoft.com/office/powerpoint/2010/main" val="1211650007"/>
+        <p14:creationId xmlns:p14="http://schemas.microsoft.com/office/powerpoint/2010/main" val="2227256533"/>
       </p:ext>
     </p:extLst>
   </p:cSld>
@@ -882,6 +886,342 @@
             <a:fld id="{5B19FFF6-9D3A-43A2-9BC5-0E29ACA647E9}" type="slidenum">
               <a:rPr lang="en-US" smtClean="0"/>
               <a:t>13</a:t>
+            </a:fld>
+            <a:endParaRPr lang="en-US"/>
+          </a:p>
+        </p:txBody>
+      </p:sp>
+    </p:spTree>
+    <p:extLst>
+      <p:ext uri="{BB962C8B-B14F-4D97-AF65-F5344CB8AC3E}">
+        <p14:creationId xmlns:p14="http://schemas.microsoft.com/office/powerpoint/2010/main" val="937330666"/>
+      </p:ext>
+    </p:extLst>
+  </p:cSld>
+  <p:clrMapOvr>
+    <a:masterClrMapping/>
+  </p:clrMapOvr>
+</p:notes>
+</file>
+
+<file path=ppt/notesSlides/notesSlide14.xml><?xml version="1.0" encoding="utf-8"?>
+<p:notes xmlns:a="http://schemas.openxmlformats.org/drawingml/2006/main" xmlns:r="http://schemas.openxmlformats.org/officeDocument/2006/relationships" xmlns:p="http://schemas.openxmlformats.org/presentationml/2006/main">
+  <p:cSld>
+    <p:spTree>
+      <p:nvGrpSpPr>
+        <p:cNvPr id="1" name=""/>
+        <p:cNvGrpSpPr/>
+        <p:nvPr/>
+      </p:nvGrpSpPr>
+      <p:grpSpPr>
+        <a:xfrm>
+          <a:off x="0" y="0"/>
+          <a:ext cx="0" cy="0"/>
+          <a:chOff x="0" y="0"/>
+          <a:chExt cx="0" cy="0"/>
+        </a:xfrm>
+      </p:grpSpPr>
+      <p:sp>
+        <p:nvSpPr>
+          <p:cNvPr id="2" name="Slide Image Placeholder 1"/>
+          <p:cNvSpPr>
+            <a:spLocks noGrp="1" noRot="1" noChangeAspect="1"/>
+          </p:cNvSpPr>
+          <p:nvPr>
+            <p:ph type="sldImg"/>
+          </p:nvPr>
+        </p:nvSpPr>
+        <p:spPr/>
+      </p:sp>
+      <p:sp>
+        <p:nvSpPr>
+          <p:cNvPr id="3" name="Notes Placeholder 2"/>
+          <p:cNvSpPr>
+            <a:spLocks noGrp="1"/>
+          </p:cNvSpPr>
+          <p:nvPr>
+            <p:ph type="body" idx="1"/>
+          </p:nvPr>
+        </p:nvSpPr>
+        <p:spPr/>
+        <p:txBody>
+          <a:bodyPr/>
+          <a:lstStyle/>
+          <a:p>
+            <a:endParaRPr lang="en-US"/>
+          </a:p>
+        </p:txBody>
+      </p:sp>
+      <p:sp>
+        <p:nvSpPr>
+          <p:cNvPr id="4" name="Slide Number Placeholder 3"/>
+          <p:cNvSpPr>
+            <a:spLocks noGrp="1"/>
+          </p:cNvSpPr>
+          <p:nvPr>
+            <p:ph type="sldNum" sz="quarter" idx="10"/>
+          </p:nvPr>
+        </p:nvSpPr>
+        <p:spPr/>
+        <p:txBody>
+          <a:bodyPr/>
+          <a:lstStyle/>
+          <a:p>
+            <a:fld id="{5B19FFF6-9D3A-43A2-9BC5-0E29ACA647E9}" type="slidenum">
+              <a:rPr lang="en-US" smtClean="0"/>
+              <a:t>14</a:t>
+            </a:fld>
+            <a:endParaRPr lang="en-US"/>
+          </a:p>
+        </p:txBody>
+      </p:sp>
+    </p:spTree>
+    <p:extLst>
+      <p:ext uri="{BB962C8B-B14F-4D97-AF65-F5344CB8AC3E}">
+        <p14:creationId xmlns:p14="http://schemas.microsoft.com/office/powerpoint/2010/main" val="1181008352"/>
+      </p:ext>
+    </p:extLst>
+  </p:cSld>
+  <p:clrMapOvr>
+    <a:masterClrMapping/>
+  </p:clrMapOvr>
+</p:notes>
+</file>
+
+<file path=ppt/notesSlides/notesSlide15.xml><?xml version="1.0" encoding="utf-8"?>
+<p:notes xmlns:a="http://schemas.openxmlformats.org/drawingml/2006/main" xmlns:r="http://schemas.openxmlformats.org/officeDocument/2006/relationships" xmlns:p="http://schemas.openxmlformats.org/presentationml/2006/main">
+  <p:cSld>
+    <p:spTree>
+      <p:nvGrpSpPr>
+        <p:cNvPr id="1" name=""/>
+        <p:cNvGrpSpPr/>
+        <p:nvPr/>
+      </p:nvGrpSpPr>
+      <p:grpSpPr>
+        <a:xfrm>
+          <a:off x="0" y="0"/>
+          <a:ext cx="0" cy="0"/>
+          <a:chOff x="0" y="0"/>
+          <a:chExt cx="0" cy="0"/>
+        </a:xfrm>
+      </p:grpSpPr>
+      <p:sp>
+        <p:nvSpPr>
+          <p:cNvPr id="2" name="Slide Image Placeholder 1"/>
+          <p:cNvSpPr>
+            <a:spLocks noGrp="1" noRot="1" noChangeAspect="1"/>
+          </p:cNvSpPr>
+          <p:nvPr>
+            <p:ph type="sldImg"/>
+          </p:nvPr>
+        </p:nvSpPr>
+        <p:spPr/>
+      </p:sp>
+      <p:sp>
+        <p:nvSpPr>
+          <p:cNvPr id="3" name="Notes Placeholder 2"/>
+          <p:cNvSpPr>
+            <a:spLocks noGrp="1"/>
+          </p:cNvSpPr>
+          <p:nvPr>
+            <p:ph type="body" idx="1"/>
+          </p:nvPr>
+        </p:nvSpPr>
+        <p:spPr/>
+        <p:txBody>
+          <a:bodyPr/>
+          <a:lstStyle/>
+          <a:p>
+            <a:endParaRPr lang="en-US"/>
+          </a:p>
+        </p:txBody>
+      </p:sp>
+      <p:sp>
+        <p:nvSpPr>
+          <p:cNvPr id="4" name="Slide Number Placeholder 3"/>
+          <p:cNvSpPr>
+            <a:spLocks noGrp="1"/>
+          </p:cNvSpPr>
+          <p:nvPr>
+            <p:ph type="sldNum" sz="quarter" idx="10"/>
+          </p:nvPr>
+        </p:nvSpPr>
+        <p:spPr/>
+        <p:txBody>
+          <a:bodyPr/>
+          <a:lstStyle/>
+          <a:p>
+            <a:fld id="{5B19FFF6-9D3A-43A2-9BC5-0E29ACA647E9}" type="slidenum">
+              <a:rPr lang="en-US" smtClean="0"/>
+              <a:t>15</a:t>
+            </a:fld>
+            <a:endParaRPr lang="en-US"/>
+          </a:p>
+        </p:txBody>
+      </p:sp>
+    </p:spTree>
+    <p:extLst>
+      <p:ext uri="{BB962C8B-B14F-4D97-AF65-F5344CB8AC3E}">
+        <p14:creationId xmlns:p14="http://schemas.microsoft.com/office/powerpoint/2010/main" val="1616101520"/>
+      </p:ext>
+    </p:extLst>
+  </p:cSld>
+  <p:clrMapOvr>
+    <a:masterClrMapping/>
+  </p:clrMapOvr>
+</p:notes>
+</file>
+
+<file path=ppt/notesSlides/notesSlide16.xml><?xml version="1.0" encoding="utf-8"?>
+<p:notes xmlns:a="http://schemas.openxmlformats.org/drawingml/2006/main" xmlns:r="http://schemas.openxmlformats.org/officeDocument/2006/relationships" xmlns:p="http://schemas.openxmlformats.org/presentationml/2006/main">
+  <p:cSld>
+    <p:spTree>
+      <p:nvGrpSpPr>
+        <p:cNvPr id="1" name=""/>
+        <p:cNvGrpSpPr/>
+        <p:nvPr/>
+      </p:nvGrpSpPr>
+      <p:grpSpPr>
+        <a:xfrm>
+          <a:off x="0" y="0"/>
+          <a:ext cx="0" cy="0"/>
+          <a:chOff x="0" y="0"/>
+          <a:chExt cx="0" cy="0"/>
+        </a:xfrm>
+      </p:grpSpPr>
+      <p:sp>
+        <p:nvSpPr>
+          <p:cNvPr id="2" name="Slide Image Placeholder 1"/>
+          <p:cNvSpPr>
+            <a:spLocks noGrp="1" noRot="1" noChangeAspect="1"/>
+          </p:cNvSpPr>
+          <p:nvPr>
+            <p:ph type="sldImg"/>
+          </p:nvPr>
+        </p:nvSpPr>
+        <p:spPr/>
+      </p:sp>
+      <p:sp>
+        <p:nvSpPr>
+          <p:cNvPr id="3" name="Notes Placeholder 2"/>
+          <p:cNvSpPr>
+            <a:spLocks noGrp="1"/>
+          </p:cNvSpPr>
+          <p:nvPr>
+            <p:ph type="body" idx="1"/>
+          </p:nvPr>
+        </p:nvSpPr>
+        <p:spPr/>
+        <p:txBody>
+          <a:bodyPr/>
+          <a:lstStyle/>
+          <a:p>
+            <a:endParaRPr lang="en-US"/>
+          </a:p>
+        </p:txBody>
+      </p:sp>
+      <p:sp>
+        <p:nvSpPr>
+          <p:cNvPr id="4" name="Slide Number Placeholder 3"/>
+          <p:cNvSpPr>
+            <a:spLocks noGrp="1"/>
+          </p:cNvSpPr>
+          <p:nvPr>
+            <p:ph type="sldNum" sz="quarter" idx="10"/>
+          </p:nvPr>
+        </p:nvSpPr>
+        <p:spPr/>
+        <p:txBody>
+          <a:bodyPr/>
+          <a:lstStyle/>
+          <a:p>
+            <a:fld id="{5B19FFF6-9D3A-43A2-9BC5-0E29ACA647E9}" type="slidenum">
+              <a:rPr lang="en-US" smtClean="0"/>
+              <a:t>16</a:t>
+            </a:fld>
+            <a:endParaRPr lang="en-US"/>
+          </a:p>
+        </p:txBody>
+      </p:sp>
+    </p:spTree>
+    <p:extLst>
+      <p:ext uri="{BB962C8B-B14F-4D97-AF65-F5344CB8AC3E}">
+        <p14:creationId xmlns:p14="http://schemas.microsoft.com/office/powerpoint/2010/main" val="1211650007"/>
+      </p:ext>
+    </p:extLst>
+  </p:cSld>
+  <p:clrMapOvr>
+    <a:masterClrMapping/>
+  </p:clrMapOvr>
+</p:notes>
+</file>
+
+<file path=ppt/notesSlides/notesSlide17.xml><?xml version="1.0" encoding="utf-8"?>
+<p:notes xmlns:a="http://schemas.openxmlformats.org/drawingml/2006/main" xmlns:r="http://schemas.openxmlformats.org/officeDocument/2006/relationships" xmlns:p="http://schemas.openxmlformats.org/presentationml/2006/main">
+  <p:cSld>
+    <p:spTree>
+      <p:nvGrpSpPr>
+        <p:cNvPr id="1" name=""/>
+        <p:cNvGrpSpPr/>
+        <p:nvPr/>
+      </p:nvGrpSpPr>
+      <p:grpSpPr>
+        <a:xfrm>
+          <a:off x="0" y="0"/>
+          <a:ext cx="0" cy="0"/>
+          <a:chOff x="0" y="0"/>
+          <a:chExt cx="0" cy="0"/>
+        </a:xfrm>
+      </p:grpSpPr>
+      <p:sp>
+        <p:nvSpPr>
+          <p:cNvPr id="2" name="Slide Image Placeholder 1"/>
+          <p:cNvSpPr>
+            <a:spLocks noGrp="1" noRot="1" noChangeAspect="1"/>
+          </p:cNvSpPr>
+          <p:nvPr>
+            <p:ph type="sldImg"/>
+          </p:nvPr>
+        </p:nvSpPr>
+        <p:spPr/>
+      </p:sp>
+      <p:sp>
+        <p:nvSpPr>
+          <p:cNvPr id="3" name="Notes Placeholder 2"/>
+          <p:cNvSpPr>
+            <a:spLocks noGrp="1"/>
+          </p:cNvSpPr>
+          <p:nvPr>
+            <p:ph type="body" idx="1"/>
+          </p:nvPr>
+        </p:nvSpPr>
+        <p:spPr/>
+        <p:txBody>
+          <a:bodyPr/>
+          <a:lstStyle/>
+          <a:p>
+            <a:endParaRPr lang="en-US"/>
+          </a:p>
+        </p:txBody>
+      </p:sp>
+      <p:sp>
+        <p:nvSpPr>
+          <p:cNvPr id="4" name="Slide Number Placeholder 3"/>
+          <p:cNvSpPr>
+            <a:spLocks noGrp="1"/>
+          </p:cNvSpPr>
+          <p:nvPr>
+            <p:ph type="sldNum" sz="quarter" idx="10"/>
+          </p:nvPr>
+        </p:nvSpPr>
+        <p:spPr/>
+        <p:txBody>
+          <a:bodyPr/>
+          <a:lstStyle/>
+          <a:p>
+            <a:fld id="{5B19FFF6-9D3A-43A2-9BC5-0E29ACA647E9}" type="slidenum">
+              <a:rPr lang="en-US" smtClean="0"/>
+              <a:t>17</a:t>
             </a:fld>
             <a:endParaRPr lang="en-US"/>
           </a:p>
@@ -974,7 +1314,7 @@
     </p:spTree>
     <p:extLst>
       <p:ext uri="{BB962C8B-B14F-4D97-AF65-F5344CB8AC3E}">
-        <p14:creationId xmlns:p14="http://schemas.microsoft.com/office/powerpoint/2010/main" val="1177702451"/>
+        <p14:creationId xmlns:p14="http://schemas.microsoft.com/office/powerpoint/2010/main" val="3787906890"/>
       </p:ext>
     </p:extLst>
   </p:cSld>
@@ -1058,7 +1398,7 @@
     </p:spTree>
     <p:extLst>
       <p:ext uri="{BB962C8B-B14F-4D97-AF65-F5344CB8AC3E}">
-        <p14:creationId xmlns:p14="http://schemas.microsoft.com/office/powerpoint/2010/main" val="3218174546"/>
+        <p14:creationId xmlns:p14="http://schemas.microsoft.com/office/powerpoint/2010/main" val="3464537560"/>
       </p:ext>
     </p:extLst>
   </p:cSld>
@@ -1142,7 +1482,7 @@
     </p:spTree>
     <p:extLst>
       <p:ext uri="{BB962C8B-B14F-4D97-AF65-F5344CB8AC3E}">
-        <p14:creationId xmlns:p14="http://schemas.microsoft.com/office/powerpoint/2010/main" val="612743181"/>
+        <p14:creationId xmlns:p14="http://schemas.microsoft.com/office/powerpoint/2010/main" val="689986934"/>
       </p:ext>
     </p:extLst>
   </p:cSld>
@@ -1226,7 +1566,7 @@
     </p:spTree>
     <p:extLst>
       <p:ext uri="{BB962C8B-B14F-4D97-AF65-F5344CB8AC3E}">
-        <p14:creationId xmlns:p14="http://schemas.microsoft.com/office/powerpoint/2010/main" val="1609716475"/>
+        <p14:creationId xmlns:p14="http://schemas.microsoft.com/office/powerpoint/2010/main" val="1177702451"/>
       </p:ext>
     </p:extLst>
   </p:cSld>
@@ -1310,7 +1650,7 @@
     </p:spTree>
     <p:extLst>
       <p:ext uri="{BB962C8B-B14F-4D97-AF65-F5344CB8AC3E}">
-        <p14:creationId xmlns:p14="http://schemas.microsoft.com/office/powerpoint/2010/main" val="3071738978"/>
+        <p14:creationId xmlns:p14="http://schemas.microsoft.com/office/powerpoint/2010/main" val="3218174546"/>
       </p:ext>
     </p:extLst>
   </p:cSld>
@@ -1394,7 +1734,7 @@
     </p:spTree>
     <p:extLst>
       <p:ext uri="{BB962C8B-B14F-4D97-AF65-F5344CB8AC3E}">
-        <p14:creationId xmlns:p14="http://schemas.microsoft.com/office/powerpoint/2010/main" val="3507851252"/>
+        <p14:creationId xmlns:p14="http://schemas.microsoft.com/office/powerpoint/2010/main" val="612743181"/>
       </p:ext>
     </p:extLst>
   </p:cSld>
@@ -1478,7 +1818,7 @@
     </p:spTree>
     <p:extLst>
       <p:ext uri="{BB962C8B-B14F-4D97-AF65-F5344CB8AC3E}">
-        <p14:creationId xmlns:p14="http://schemas.microsoft.com/office/powerpoint/2010/main" val="2227256533"/>
+        <p14:creationId xmlns:p14="http://schemas.microsoft.com/office/powerpoint/2010/main" val="2614273936"/>
       </p:ext>
     </p:extLst>
   </p:cSld>
@@ -1562,7 +1902,7 @@
     </p:spTree>
     <p:extLst>
       <p:ext uri="{BB962C8B-B14F-4D97-AF65-F5344CB8AC3E}">
-        <p14:creationId xmlns:p14="http://schemas.microsoft.com/office/powerpoint/2010/main" val="937330666"/>
+        <p14:creationId xmlns:p14="http://schemas.microsoft.com/office/powerpoint/2010/main" val="1609716475"/>
       </p:ext>
     </p:extLst>
   </p:cSld>
@@ -1719,7 +2059,7 @@
           <a:p>
             <a:fld id="{705F61FD-B4C5-4C11-9C2B-341349F118F3}" type="datetimeFigureOut">
               <a:rPr lang="en-US" smtClean="0"/>
-              <a:t>11/28/2017</a:t>
+              <a:t>11/29/2017</a:t>
             </a:fld>
             <a:endParaRPr lang="en-US"/>
           </a:p>
@@ -1917,7 +2257,7 @@
           <a:p>
             <a:fld id="{705F61FD-B4C5-4C11-9C2B-341349F118F3}" type="datetimeFigureOut">
               <a:rPr lang="en-US" smtClean="0"/>
-              <a:t>11/28/2017</a:t>
+              <a:t>11/29/2017</a:t>
             </a:fld>
             <a:endParaRPr lang="en-US"/>
           </a:p>
@@ -2125,7 +2465,7 @@
           <a:p>
             <a:fld id="{705F61FD-B4C5-4C11-9C2B-341349F118F3}" type="datetimeFigureOut">
               <a:rPr lang="en-US" smtClean="0"/>
-              <a:t>11/28/2017</a:t>
+              <a:t>11/29/2017</a:t>
             </a:fld>
             <a:endParaRPr lang="en-US"/>
           </a:p>
@@ -2323,7 +2663,7 @@
           <a:p>
             <a:fld id="{705F61FD-B4C5-4C11-9C2B-341349F118F3}" type="datetimeFigureOut">
               <a:rPr lang="en-US" smtClean="0"/>
-              <a:t>11/28/2017</a:t>
+              <a:t>11/29/2017</a:t>
             </a:fld>
             <a:endParaRPr lang="en-US"/>
           </a:p>
@@ -2598,7 +2938,7 @@
           <a:p>
             <a:fld id="{705F61FD-B4C5-4C11-9C2B-341349F118F3}" type="datetimeFigureOut">
               <a:rPr lang="en-US" smtClean="0"/>
-              <a:t>11/28/2017</a:t>
+              <a:t>11/29/2017</a:t>
             </a:fld>
             <a:endParaRPr lang="en-US"/>
           </a:p>
@@ -2863,7 +3203,7 @@
           <a:p>
             <a:fld id="{705F61FD-B4C5-4C11-9C2B-341349F118F3}" type="datetimeFigureOut">
               <a:rPr lang="en-US" smtClean="0"/>
-              <a:t>11/28/2017</a:t>
+              <a:t>11/29/2017</a:t>
             </a:fld>
             <a:endParaRPr lang="en-US"/>
           </a:p>
@@ -3275,7 +3615,7 @@
           <a:p>
             <a:fld id="{705F61FD-B4C5-4C11-9C2B-341349F118F3}" type="datetimeFigureOut">
               <a:rPr lang="en-US" smtClean="0"/>
-              <a:t>11/28/2017</a:t>
+              <a:t>11/29/2017</a:t>
             </a:fld>
             <a:endParaRPr lang="en-US"/>
           </a:p>
@@ -3416,7 +3756,7 @@
           <a:p>
             <a:fld id="{705F61FD-B4C5-4C11-9C2B-341349F118F3}" type="datetimeFigureOut">
               <a:rPr lang="en-US" smtClean="0"/>
-              <a:t>11/28/2017</a:t>
+              <a:t>11/29/2017</a:t>
             </a:fld>
             <a:endParaRPr lang="en-US"/>
           </a:p>
@@ -3529,7 +3869,7 @@
           <a:p>
             <a:fld id="{705F61FD-B4C5-4C11-9C2B-341349F118F3}" type="datetimeFigureOut">
               <a:rPr lang="en-US" smtClean="0"/>
-              <a:t>11/28/2017</a:t>
+              <a:t>11/29/2017</a:t>
             </a:fld>
             <a:endParaRPr lang="en-US"/>
           </a:p>
@@ -3840,7 +4180,7 @@
           <a:p>
             <a:fld id="{705F61FD-B4C5-4C11-9C2B-341349F118F3}" type="datetimeFigureOut">
               <a:rPr lang="en-US" smtClean="0"/>
-              <a:t>11/28/2017</a:t>
+              <a:t>11/29/2017</a:t>
             </a:fld>
             <a:endParaRPr lang="en-US"/>
           </a:p>
@@ -4128,7 +4468,7 @@
           <a:p>
             <a:fld id="{705F61FD-B4C5-4C11-9C2B-341349F118F3}" type="datetimeFigureOut">
               <a:rPr lang="en-US" smtClean="0"/>
-              <a:t>11/28/2017</a:t>
+              <a:t>11/29/2017</a:t>
             </a:fld>
             <a:endParaRPr lang="en-US"/>
           </a:p>
@@ -4369,7 +4709,7 @@
           <a:p>
             <a:fld id="{705F61FD-B4C5-4C11-9C2B-341349F118F3}" type="datetimeFigureOut">
               <a:rPr lang="en-US" smtClean="0"/>
-              <a:t>11/28/2017</a:t>
+              <a:t>11/29/2017</a:t>
             </a:fld>
             <a:endParaRPr lang="en-US"/>
           </a:p>
@@ -4851,6 +5191,439 @@
           <p:cNvPr id="2" name="Picture 1">
             <a:extLst>
               <a:ext uri="{FF2B5EF4-FFF2-40B4-BE49-F238E27FC236}">
+                <a16:creationId xmlns:a16="http://schemas.microsoft.com/office/drawing/2014/main" id="{810E4F26-075C-4F8E-B53A-135C51CBBCEC}"/>
+              </a:ext>
+            </a:extLst>
+          </p:cNvPr>
+          <p:cNvPicPr>
+            <a:picLocks noChangeAspect="1"/>
+          </p:cNvPicPr>
+          <p:nvPr/>
+        </p:nvPicPr>
+        <p:blipFill rotWithShape="1">
+          <a:blip r:embed="rId3"/>
+          <a:srcRect l="22135" t="582" r="23110" b="44060"/>
+          <a:stretch/>
+        </p:blipFill>
+        <p:spPr>
+          <a:xfrm>
+            <a:off x="3962400" y="1257299"/>
+            <a:ext cx="3638549" cy="3667125"/>
+          </a:xfrm>
+          <a:prstGeom prst="rect">
+            <a:avLst/>
+          </a:prstGeom>
+        </p:spPr>
+      </p:pic>
+      <p:sp>
+        <p:nvSpPr>
+          <p:cNvPr id="5" name="Rectangle 4">
+            <a:extLst>
+              <a:ext uri="{FF2B5EF4-FFF2-40B4-BE49-F238E27FC236}">
+                <a16:creationId xmlns:a16="http://schemas.microsoft.com/office/drawing/2014/main" id="{9C9D6F7C-D5B3-4ED3-A70C-9007FE21517F}"/>
+              </a:ext>
+            </a:extLst>
+          </p:cNvPr>
+          <p:cNvSpPr/>
+          <p:nvPr/>
+        </p:nvSpPr>
+        <p:spPr>
+          <a:xfrm rot="5400000">
+            <a:off x="4010025" y="2981325"/>
+            <a:ext cx="3533774" cy="209550"/>
+          </a:xfrm>
+          <a:prstGeom prst="rect">
+            <a:avLst/>
+          </a:prstGeom>
+          <a:solidFill>
+            <a:srgbClr val="FF0000"/>
+          </a:solidFill>
+        </p:spPr>
+        <p:style>
+          <a:lnRef idx="2">
+            <a:schemeClr val="accent1">
+              <a:shade val="50000"/>
+            </a:schemeClr>
+          </a:lnRef>
+          <a:fillRef idx="1">
+            <a:schemeClr val="accent1"/>
+          </a:fillRef>
+          <a:effectRef idx="0">
+            <a:schemeClr val="accent1"/>
+          </a:effectRef>
+          <a:fontRef idx="minor">
+            <a:schemeClr val="lt1"/>
+          </a:fontRef>
+        </p:style>
+        <p:txBody>
+          <a:bodyPr rtlCol="0" anchor="ctr"/>
+          <a:lstStyle/>
+          <a:p>
+            <a:pPr algn="ctr"/>
+            <a:endParaRPr lang="en-US"/>
+          </a:p>
+        </p:txBody>
+      </p:sp>
+    </p:spTree>
+    <p:extLst>
+      <p:ext uri="{BB962C8B-B14F-4D97-AF65-F5344CB8AC3E}">
+        <p14:creationId xmlns:p14="http://schemas.microsoft.com/office/powerpoint/2010/main" val="1572736565"/>
+      </p:ext>
+    </p:extLst>
+  </p:cSld>
+  <p:clrMapOvr>
+    <a:masterClrMapping/>
+  </p:clrMapOvr>
+</p:sld>
+</file>
+
+<file path=ppt/slides/slide11.xml><?xml version="1.0" encoding="utf-8"?>
+<p:sld xmlns:a="http://schemas.openxmlformats.org/drawingml/2006/main" xmlns:r="http://schemas.openxmlformats.org/officeDocument/2006/relationships" xmlns:p="http://schemas.openxmlformats.org/presentationml/2006/main">
+  <p:cSld>
+    <p:spTree>
+      <p:nvGrpSpPr>
+        <p:cNvPr id="1" name=""/>
+        <p:cNvGrpSpPr/>
+        <p:nvPr/>
+      </p:nvGrpSpPr>
+      <p:grpSpPr>
+        <a:xfrm>
+          <a:off x="0" y="0"/>
+          <a:ext cx="0" cy="0"/>
+          <a:chOff x="0" y="0"/>
+          <a:chExt cx="0" cy="0"/>
+        </a:xfrm>
+      </p:grpSpPr>
+      <p:pic>
+        <p:nvPicPr>
+          <p:cNvPr id="2" name="Picture 1">
+            <a:extLst>
+              <a:ext uri="{FF2B5EF4-FFF2-40B4-BE49-F238E27FC236}">
+                <a16:creationId xmlns:a16="http://schemas.microsoft.com/office/drawing/2014/main" id="{810E4F26-075C-4F8E-B53A-135C51CBBCEC}"/>
+              </a:ext>
+            </a:extLst>
+          </p:cNvPr>
+          <p:cNvPicPr>
+            <a:picLocks noChangeAspect="1"/>
+          </p:cNvPicPr>
+          <p:nvPr/>
+        </p:nvPicPr>
+        <p:blipFill rotWithShape="1">
+          <a:blip r:embed="rId3"/>
+          <a:srcRect l="22135" t="582" r="23110" b="44060"/>
+          <a:stretch/>
+        </p:blipFill>
+        <p:spPr>
+          <a:xfrm>
+            <a:off x="3962400" y="1257299"/>
+            <a:ext cx="3638549" cy="3667125"/>
+          </a:xfrm>
+          <a:prstGeom prst="rect">
+            <a:avLst/>
+          </a:prstGeom>
+        </p:spPr>
+      </p:pic>
+      <p:sp>
+        <p:nvSpPr>
+          <p:cNvPr id="4" name="TextBox 3">
+            <a:extLst>
+              <a:ext uri="{FF2B5EF4-FFF2-40B4-BE49-F238E27FC236}">
+                <a16:creationId xmlns:a16="http://schemas.microsoft.com/office/drawing/2014/main" id="{A58FC557-A667-4323-A120-60DA62E7AC47}"/>
+              </a:ext>
+            </a:extLst>
+          </p:cNvPr>
+          <p:cNvSpPr txBox="1"/>
+          <p:nvPr/>
+        </p:nvSpPr>
+        <p:spPr>
+          <a:xfrm>
+            <a:off x="4486274" y="-133099"/>
+            <a:ext cx="2886075" cy="6447919"/>
+          </a:xfrm>
+          <a:prstGeom prst="rect">
+            <a:avLst/>
+          </a:prstGeom>
+          <a:noFill/>
+        </p:spPr>
+        <p:txBody>
+          <a:bodyPr wrap="square" rtlCol="0">
+            <a:spAutoFit/>
+          </a:bodyPr>
+          <a:lstStyle/>
+          <a:p>
+            <a:r>
+              <a:rPr lang="en-US" sz="41300" dirty="0">
+                <a:solidFill>
+                  <a:srgbClr val="FFFF00"/>
+                </a:solidFill>
+                <a:effectLst>
+                  <a:outerShdw blurRad="50800" dist="38100" dir="10800000" algn="r" rotWithShape="0">
+                    <a:prstClr val="black">
+                      <a:alpha val="40000"/>
+                    </a:prstClr>
+                  </a:outerShdw>
+                </a:effectLst>
+              </a:rPr>
+              <a:t>?</a:t>
+            </a:r>
+          </a:p>
+        </p:txBody>
+      </p:sp>
+    </p:spTree>
+    <p:extLst>
+      <p:ext uri="{BB962C8B-B14F-4D97-AF65-F5344CB8AC3E}">
+        <p14:creationId xmlns:p14="http://schemas.microsoft.com/office/powerpoint/2010/main" val="3234151335"/>
+      </p:ext>
+    </p:extLst>
+  </p:cSld>
+  <p:clrMapOvr>
+    <a:masterClrMapping/>
+  </p:clrMapOvr>
+</p:sld>
+</file>
+
+<file path=ppt/slides/slide12.xml><?xml version="1.0" encoding="utf-8"?>
+<p:sld xmlns:a="http://schemas.openxmlformats.org/drawingml/2006/main" xmlns:r="http://schemas.openxmlformats.org/officeDocument/2006/relationships" xmlns:p="http://schemas.openxmlformats.org/presentationml/2006/main">
+  <p:cSld>
+    <p:spTree>
+      <p:nvGrpSpPr>
+        <p:cNvPr id="1" name=""/>
+        <p:cNvGrpSpPr/>
+        <p:nvPr/>
+      </p:nvGrpSpPr>
+      <p:grpSpPr>
+        <a:xfrm>
+          <a:off x="0" y="0"/>
+          <a:ext cx="0" cy="0"/>
+          <a:chOff x="0" y="0"/>
+          <a:chExt cx="0" cy="0"/>
+        </a:xfrm>
+      </p:grpSpPr>
+      <p:pic>
+        <p:nvPicPr>
+          <p:cNvPr id="2" name="Picture 1">
+            <a:extLst>
+              <a:ext uri="{FF2B5EF4-FFF2-40B4-BE49-F238E27FC236}">
+                <a16:creationId xmlns:a16="http://schemas.microsoft.com/office/drawing/2014/main" id="{810E4F26-075C-4F8E-B53A-135C51CBBCEC}"/>
+              </a:ext>
+            </a:extLst>
+          </p:cNvPr>
+          <p:cNvPicPr>
+            <a:picLocks noChangeAspect="1"/>
+          </p:cNvPicPr>
+          <p:nvPr/>
+        </p:nvPicPr>
+        <p:blipFill rotWithShape="1">
+          <a:blip r:embed="rId3"/>
+          <a:srcRect l="22135" t="582" r="23110" b="44060"/>
+          <a:stretch/>
+        </p:blipFill>
+        <p:spPr>
+          <a:xfrm>
+            <a:off x="3962400" y="1333499"/>
+            <a:ext cx="3638549" cy="3667125"/>
+          </a:xfrm>
+          <a:prstGeom prst="rect">
+            <a:avLst/>
+          </a:prstGeom>
+        </p:spPr>
+      </p:pic>
+      <p:sp>
+        <p:nvSpPr>
+          <p:cNvPr id="4" name="TextBox 3">
+            <a:extLst>
+              <a:ext uri="{FF2B5EF4-FFF2-40B4-BE49-F238E27FC236}">
+                <a16:creationId xmlns:a16="http://schemas.microsoft.com/office/drawing/2014/main" id="{A58FC557-A667-4323-A120-60DA62E7AC47}"/>
+              </a:ext>
+            </a:extLst>
+          </p:cNvPr>
+          <p:cNvSpPr txBox="1"/>
+          <p:nvPr/>
+        </p:nvSpPr>
+        <p:spPr>
+          <a:xfrm>
+            <a:off x="3867149" y="1658956"/>
+            <a:ext cx="7677150" cy="3016210"/>
+          </a:xfrm>
+          <a:prstGeom prst="rect">
+            <a:avLst/>
+          </a:prstGeom>
+          <a:noFill/>
+        </p:spPr>
+        <p:txBody>
+          <a:bodyPr wrap="square" rtlCol="0">
+            <a:spAutoFit/>
+            <a:scene3d>
+              <a:camera prst="orthographicFront"/>
+              <a:lightRig rig="soft" dir="t">
+                <a:rot lat="0" lon="0" rev="15600000"/>
+              </a:lightRig>
+            </a:scene3d>
+            <a:sp3d extrusionH="57150" prstMaterial="softEdge">
+              <a:bevelT w="25400" h="38100"/>
+            </a:sp3d>
+          </a:bodyPr>
+          <a:lstStyle/>
+          <a:p>
+            <a:r>
+              <a:rPr lang="en-US" sz="19000" b="1" dirty="0">
+                <a:ln/>
+                <a:solidFill>
+                  <a:srgbClr val="FFFF00"/>
+                </a:solidFill>
+                <a:effectLst>
+                  <a:outerShdw blurRad="50800" dist="38100" dir="10800000" algn="r" rotWithShape="0">
+                    <a:prstClr val="black">
+                      <a:alpha val="40000"/>
+                    </a:prstClr>
+                  </a:outerShdw>
+                </a:effectLst>
+              </a:rPr>
+              <a:t>?++</a:t>
+            </a:r>
+          </a:p>
+        </p:txBody>
+      </p:sp>
+    </p:spTree>
+    <p:extLst>
+      <p:ext uri="{BB962C8B-B14F-4D97-AF65-F5344CB8AC3E}">
+        <p14:creationId xmlns:p14="http://schemas.microsoft.com/office/powerpoint/2010/main" val="1323239356"/>
+      </p:ext>
+    </p:extLst>
+  </p:cSld>
+  <p:clrMapOvr>
+    <a:masterClrMapping/>
+  </p:clrMapOvr>
+</p:sld>
+</file>
+
+<file path=ppt/slides/slide13.xml><?xml version="1.0" encoding="utf-8"?>
+<p:sld xmlns:a="http://schemas.openxmlformats.org/drawingml/2006/main" xmlns:r="http://schemas.openxmlformats.org/officeDocument/2006/relationships" xmlns:p="http://schemas.openxmlformats.org/presentationml/2006/main">
+  <p:cSld>
+    <p:spTree>
+      <p:nvGrpSpPr>
+        <p:cNvPr id="1" name=""/>
+        <p:cNvGrpSpPr/>
+        <p:nvPr/>
+      </p:nvGrpSpPr>
+      <p:grpSpPr>
+        <a:xfrm>
+          <a:off x="0" y="0"/>
+          <a:ext cx="0" cy="0"/>
+          <a:chOff x="0" y="0"/>
+          <a:chExt cx="0" cy="0"/>
+        </a:xfrm>
+      </p:grpSpPr>
+      <p:pic>
+        <p:nvPicPr>
+          <p:cNvPr id="2" name="Picture 1">
+            <a:extLst>
+              <a:ext uri="{FF2B5EF4-FFF2-40B4-BE49-F238E27FC236}">
+                <a16:creationId xmlns:a16="http://schemas.microsoft.com/office/drawing/2014/main" id="{3F346B1C-146E-40B6-A156-9ECCC04E1773}"/>
+              </a:ext>
+            </a:extLst>
+          </p:cNvPr>
+          <p:cNvPicPr>
+            <a:picLocks noChangeAspect="1"/>
+          </p:cNvPicPr>
+          <p:nvPr/>
+        </p:nvPicPr>
+        <p:blipFill rotWithShape="1">
+          <a:blip r:embed="rId3"/>
+          <a:srcRect l="18443" t="8911" r="39760" b="52305"/>
+          <a:stretch/>
+        </p:blipFill>
+        <p:spPr>
+          <a:xfrm>
+            <a:off x="4476751" y="2170750"/>
+            <a:ext cx="3035300" cy="2807650"/>
+          </a:xfrm>
+          <a:prstGeom prst="rect">
+            <a:avLst/>
+          </a:prstGeom>
+        </p:spPr>
+      </p:pic>
+      <p:sp>
+        <p:nvSpPr>
+          <p:cNvPr id="6" name="TextBox 5">
+            <a:extLst>
+              <a:ext uri="{FF2B5EF4-FFF2-40B4-BE49-F238E27FC236}">
+                <a16:creationId xmlns:a16="http://schemas.microsoft.com/office/drawing/2014/main" id="{87D1A4C1-2E5C-4DB8-B708-131FAA7844C9}"/>
+              </a:ext>
+            </a:extLst>
+          </p:cNvPr>
+          <p:cNvSpPr txBox="1"/>
+          <p:nvPr/>
+        </p:nvSpPr>
+        <p:spPr>
+          <a:xfrm>
+            <a:off x="5476874" y="2643551"/>
+            <a:ext cx="2886075" cy="1862048"/>
+          </a:xfrm>
+          <a:prstGeom prst="rect">
+            <a:avLst/>
+          </a:prstGeom>
+          <a:noFill/>
+        </p:spPr>
+        <p:txBody>
+          <a:bodyPr wrap="square" rtlCol="0">
+            <a:spAutoFit/>
+          </a:bodyPr>
+          <a:lstStyle/>
+          <a:p>
+            <a:r>
+              <a:rPr lang="en-US" sz="11500" dirty="0">
+                <a:solidFill>
+                  <a:srgbClr val="FFFF00"/>
+                </a:solidFill>
+                <a:effectLst>
+                  <a:outerShdw blurRad="50800" dist="38100" dir="10800000" algn="r" rotWithShape="0">
+                    <a:prstClr val="black">
+                      <a:alpha val="40000"/>
+                    </a:prstClr>
+                  </a:outerShdw>
+                </a:effectLst>
+              </a:rPr>
+              <a:t>?</a:t>
+            </a:r>
+          </a:p>
+        </p:txBody>
+      </p:sp>
+    </p:spTree>
+    <p:extLst>
+      <p:ext uri="{BB962C8B-B14F-4D97-AF65-F5344CB8AC3E}">
+        <p14:creationId xmlns:p14="http://schemas.microsoft.com/office/powerpoint/2010/main" val="3255219281"/>
+      </p:ext>
+    </p:extLst>
+  </p:cSld>
+  <p:clrMapOvr>
+    <a:masterClrMapping/>
+  </p:clrMapOvr>
+</p:sld>
+</file>
+
+<file path=ppt/slides/slide14.xml><?xml version="1.0" encoding="utf-8"?>
+<p:sld xmlns:a="http://schemas.openxmlformats.org/drawingml/2006/main" xmlns:r="http://schemas.openxmlformats.org/officeDocument/2006/relationships" xmlns:p="http://schemas.openxmlformats.org/presentationml/2006/main">
+  <p:cSld>
+    <p:spTree>
+      <p:nvGrpSpPr>
+        <p:cNvPr id="1" name=""/>
+        <p:cNvGrpSpPr/>
+        <p:nvPr/>
+      </p:nvGrpSpPr>
+      <p:grpSpPr>
+        <a:xfrm>
+          <a:off x="0" y="0"/>
+          <a:ext cx="0" cy="0"/>
+          <a:chOff x="0" y="0"/>
+          <a:chExt cx="0" cy="0"/>
+        </a:xfrm>
+      </p:grpSpPr>
+      <p:pic>
+        <p:nvPicPr>
+          <p:cNvPr id="2" name="Picture 1">
+            <a:extLst>
+              <a:ext uri="{FF2B5EF4-FFF2-40B4-BE49-F238E27FC236}">
                 <a16:creationId xmlns:a16="http://schemas.microsoft.com/office/drawing/2014/main" id="{3F346B1C-146E-40B6-A156-9ECCC04E1773}"/>
               </a:ext>
             </a:extLst>
@@ -5019,7 +5792,7 @@
 </p:sld>
 </file>
 
-<file path=ppt/slides/slide11.xml><?xml version="1.0" encoding="utf-8"?>
+<file path=ppt/slides/slide15.xml><?xml version="1.0" encoding="utf-8"?>
 <p:sld xmlns:a="http://schemas.openxmlformats.org/drawingml/2006/main" xmlns:r="http://schemas.openxmlformats.org/officeDocument/2006/relationships" xmlns:p="http://schemas.openxmlformats.org/presentationml/2006/main">
   <p:cSld>
     <p:spTree>
@@ -5188,7 +5961,7 @@
 </p:sld>
 </file>
 
-<file path=ppt/slides/slide12.xml><?xml version="1.0" encoding="utf-8"?>
+<file path=ppt/slides/slide16.xml><?xml version="1.0" encoding="utf-8"?>
 <p:sld xmlns:a="http://schemas.openxmlformats.org/drawingml/2006/main" xmlns:r="http://schemas.openxmlformats.org/officeDocument/2006/relationships" xmlns:p="http://schemas.openxmlformats.org/presentationml/2006/main">
   <p:cSld>
     <p:spTree>
@@ -5421,7 +6194,7 @@
 </p:sld>
 </file>
 
-<file path=ppt/slides/slide13.xml><?xml version="1.0" encoding="utf-8"?>
+<file path=ppt/slides/slide17.xml><?xml version="1.0" encoding="utf-8"?>
 <p:sld xmlns:a="http://schemas.openxmlformats.org/drawingml/2006/main" xmlns:r="http://schemas.openxmlformats.org/officeDocument/2006/relationships" xmlns:p="http://schemas.openxmlformats.org/presentationml/2006/main">
   <p:cSld>
     <p:spTree>
@@ -5564,6 +6337,980 @@
           <p:cNvPr id="2" name="Picture 1">
             <a:extLst>
               <a:ext uri="{FF2B5EF4-FFF2-40B4-BE49-F238E27FC236}">
+                <a16:creationId xmlns:a16="http://schemas.microsoft.com/office/drawing/2014/main" id="{29240589-68E1-4414-909A-68539D0C5055}"/>
+              </a:ext>
+            </a:extLst>
+          </p:cNvPr>
+          <p:cNvPicPr>
+            <a:picLocks noChangeAspect="1"/>
+          </p:cNvPicPr>
+          <p:nvPr/>
+        </p:nvPicPr>
+        <p:blipFill>
+          <a:blip r:embed="rId3"/>
+          <a:stretch>
+            <a:fillRect/>
+          </a:stretch>
+        </p:blipFill>
+        <p:spPr>
+          <a:xfrm>
+            <a:off x="4485114" y="1956983"/>
+            <a:ext cx="3221772" cy="2944033"/>
+          </a:xfrm>
+          <a:prstGeom prst="rect">
+            <a:avLst/>
+          </a:prstGeom>
+        </p:spPr>
+      </p:pic>
+      <p:cxnSp>
+        <p:nvCxnSpPr>
+          <p:cNvPr id="4" name="Straight Connector 3">
+            <a:extLst>
+              <a:ext uri="{FF2B5EF4-FFF2-40B4-BE49-F238E27FC236}">
+                <a16:creationId xmlns:a16="http://schemas.microsoft.com/office/drawing/2014/main" id="{548086B1-7A7F-4489-9827-E4E5B37F3345}"/>
+              </a:ext>
+            </a:extLst>
+          </p:cNvPr>
+          <p:cNvCxnSpPr/>
+          <p:nvPr/>
+        </p:nvCxnSpPr>
+        <p:spPr>
+          <a:xfrm>
+            <a:off x="5745192" y="3795623"/>
+            <a:ext cx="517585" cy="0"/>
+          </a:xfrm>
+          <a:prstGeom prst="line">
+            <a:avLst/>
+          </a:prstGeom>
+          <a:ln w="76200">
+            <a:solidFill>
+              <a:srgbClr val="FFFF00"/>
+            </a:solidFill>
+          </a:ln>
+        </p:spPr>
+        <p:style>
+          <a:lnRef idx="1">
+            <a:schemeClr val="accent1"/>
+          </a:lnRef>
+          <a:fillRef idx="0">
+            <a:schemeClr val="accent1"/>
+          </a:fillRef>
+          <a:effectRef idx="0">
+            <a:schemeClr val="accent1"/>
+          </a:effectRef>
+          <a:fontRef idx="minor">
+            <a:schemeClr val="tx1"/>
+          </a:fontRef>
+        </p:style>
+      </p:cxnSp>
+    </p:spTree>
+    <p:extLst>
+      <p:ext uri="{BB962C8B-B14F-4D97-AF65-F5344CB8AC3E}">
+        <p14:creationId xmlns:p14="http://schemas.microsoft.com/office/powerpoint/2010/main" val="2555105417"/>
+      </p:ext>
+    </p:extLst>
+  </p:cSld>
+  <p:clrMapOvr>
+    <a:masterClrMapping/>
+  </p:clrMapOvr>
+</p:sld>
+</file>
+
+<file path=ppt/slides/slide3.xml><?xml version="1.0" encoding="utf-8"?>
+<p:sld xmlns:a="http://schemas.openxmlformats.org/drawingml/2006/main" xmlns:r="http://schemas.openxmlformats.org/officeDocument/2006/relationships" xmlns:p="http://schemas.openxmlformats.org/presentationml/2006/main">
+  <p:cSld>
+    <p:spTree>
+      <p:nvGrpSpPr>
+        <p:cNvPr id="1" name=""/>
+        <p:cNvGrpSpPr/>
+        <p:nvPr/>
+      </p:nvGrpSpPr>
+      <p:grpSpPr>
+        <a:xfrm>
+          <a:off x="0" y="0"/>
+          <a:ext cx="0" cy="0"/>
+          <a:chOff x="0" y="0"/>
+          <a:chExt cx="0" cy="0"/>
+        </a:xfrm>
+      </p:grpSpPr>
+      <p:pic>
+        <p:nvPicPr>
+          <p:cNvPr id="2" name="Picture 1">
+            <a:extLst>
+              <a:ext uri="{FF2B5EF4-FFF2-40B4-BE49-F238E27FC236}">
+                <a16:creationId xmlns:a16="http://schemas.microsoft.com/office/drawing/2014/main" id="{CE2FEDC3-DBAC-4AF6-A5AA-0E7E0204C52C}"/>
+              </a:ext>
+            </a:extLst>
+          </p:cNvPr>
+          <p:cNvPicPr>
+            <a:picLocks noChangeAspect="1"/>
+          </p:cNvPicPr>
+          <p:nvPr/>
+        </p:nvPicPr>
+        <p:blipFill>
+          <a:blip r:embed="rId3"/>
+          <a:stretch>
+            <a:fillRect/>
+          </a:stretch>
+        </p:blipFill>
+        <p:spPr>
+          <a:xfrm>
+            <a:off x="4623758" y="1767671"/>
+            <a:ext cx="3159964" cy="3007676"/>
+          </a:xfrm>
+          <a:prstGeom prst="rect">
+            <a:avLst/>
+          </a:prstGeom>
+        </p:spPr>
+      </p:pic>
+      <p:cxnSp>
+        <p:nvCxnSpPr>
+          <p:cNvPr id="3" name="Straight Connector 2">
+            <a:extLst>
+              <a:ext uri="{FF2B5EF4-FFF2-40B4-BE49-F238E27FC236}">
+                <a16:creationId xmlns:a16="http://schemas.microsoft.com/office/drawing/2014/main" id="{23C40F50-9E42-4720-977F-DB272784E453}"/>
+              </a:ext>
+            </a:extLst>
+          </p:cNvPr>
+          <p:cNvCxnSpPr/>
+          <p:nvPr/>
+        </p:nvCxnSpPr>
+        <p:spPr>
+          <a:xfrm>
+            <a:off x="5003321" y="4537495"/>
+            <a:ext cx="517585" cy="0"/>
+          </a:xfrm>
+          <a:prstGeom prst="line">
+            <a:avLst/>
+          </a:prstGeom>
+          <a:ln w="76200">
+            <a:solidFill>
+              <a:srgbClr val="FFFF00"/>
+            </a:solidFill>
+          </a:ln>
+        </p:spPr>
+        <p:style>
+          <a:lnRef idx="1">
+            <a:schemeClr val="accent1"/>
+          </a:lnRef>
+          <a:fillRef idx="0">
+            <a:schemeClr val="accent1"/>
+          </a:fillRef>
+          <a:effectRef idx="0">
+            <a:schemeClr val="accent1"/>
+          </a:effectRef>
+          <a:fontRef idx="minor">
+            <a:schemeClr val="tx1"/>
+          </a:fontRef>
+        </p:style>
+      </p:cxnSp>
+      <p:cxnSp>
+        <p:nvCxnSpPr>
+          <p:cNvPr id="4" name="Straight Connector 3">
+            <a:extLst>
+              <a:ext uri="{FF2B5EF4-FFF2-40B4-BE49-F238E27FC236}">
+                <a16:creationId xmlns:a16="http://schemas.microsoft.com/office/drawing/2014/main" id="{A30E2BBC-E0BF-4B37-8140-E0D952E6C625}"/>
+              </a:ext>
+            </a:extLst>
+          </p:cNvPr>
+          <p:cNvCxnSpPr/>
+          <p:nvPr/>
+        </p:nvCxnSpPr>
+        <p:spPr>
+          <a:xfrm>
+            <a:off x="6901131" y="3605842"/>
+            <a:ext cx="517585" cy="0"/>
+          </a:xfrm>
+          <a:prstGeom prst="line">
+            <a:avLst/>
+          </a:prstGeom>
+          <a:ln w="76200">
+            <a:solidFill>
+              <a:srgbClr val="FFFF00"/>
+            </a:solidFill>
+          </a:ln>
+        </p:spPr>
+        <p:style>
+          <a:lnRef idx="1">
+            <a:schemeClr val="accent1"/>
+          </a:lnRef>
+          <a:fillRef idx="0">
+            <a:schemeClr val="accent1"/>
+          </a:fillRef>
+          <a:effectRef idx="0">
+            <a:schemeClr val="accent1"/>
+          </a:effectRef>
+          <a:fontRef idx="minor">
+            <a:schemeClr val="tx1"/>
+          </a:fontRef>
+        </p:style>
+      </p:cxnSp>
+      <p:cxnSp>
+        <p:nvCxnSpPr>
+          <p:cNvPr id="5" name="Straight Connector 4">
+            <a:extLst>
+              <a:ext uri="{FF2B5EF4-FFF2-40B4-BE49-F238E27FC236}">
+                <a16:creationId xmlns:a16="http://schemas.microsoft.com/office/drawing/2014/main" id="{5D45D4A4-9C14-4AE9-BAE2-A34670E4FC57}"/>
+              </a:ext>
+            </a:extLst>
+          </p:cNvPr>
+          <p:cNvCxnSpPr/>
+          <p:nvPr/>
+        </p:nvCxnSpPr>
+        <p:spPr>
+          <a:xfrm>
+            <a:off x="5003321" y="2622431"/>
+            <a:ext cx="517585" cy="0"/>
+          </a:xfrm>
+          <a:prstGeom prst="line">
+            <a:avLst/>
+          </a:prstGeom>
+          <a:ln w="76200">
+            <a:solidFill>
+              <a:srgbClr val="FFFF00"/>
+            </a:solidFill>
+          </a:ln>
+        </p:spPr>
+        <p:style>
+          <a:lnRef idx="1">
+            <a:schemeClr val="accent1"/>
+          </a:lnRef>
+          <a:fillRef idx="0">
+            <a:schemeClr val="accent1"/>
+          </a:fillRef>
+          <a:effectRef idx="0">
+            <a:schemeClr val="accent1"/>
+          </a:effectRef>
+          <a:fontRef idx="minor">
+            <a:schemeClr val="tx1"/>
+          </a:fontRef>
+        </p:style>
+      </p:cxnSp>
+    </p:spTree>
+    <p:extLst>
+      <p:ext uri="{BB962C8B-B14F-4D97-AF65-F5344CB8AC3E}">
+        <p14:creationId xmlns:p14="http://schemas.microsoft.com/office/powerpoint/2010/main" val="1843518693"/>
+      </p:ext>
+    </p:extLst>
+  </p:cSld>
+  <p:clrMapOvr>
+    <a:masterClrMapping/>
+  </p:clrMapOvr>
+</p:sld>
+</file>
+
+<file path=ppt/slides/slide4.xml><?xml version="1.0" encoding="utf-8"?>
+<p:sld xmlns:a="http://schemas.openxmlformats.org/drawingml/2006/main" xmlns:r="http://schemas.openxmlformats.org/officeDocument/2006/relationships" xmlns:p="http://schemas.openxmlformats.org/presentationml/2006/main">
+  <p:cSld>
+    <p:spTree>
+      <p:nvGrpSpPr>
+        <p:cNvPr id="1" name=""/>
+        <p:cNvGrpSpPr/>
+        <p:nvPr/>
+      </p:nvGrpSpPr>
+      <p:grpSpPr>
+        <a:xfrm>
+          <a:off x="0" y="0"/>
+          <a:ext cx="0" cy="0"/>
+          <a:chOff x="0" y="0"/>
+          <a:chExt cx="0" cy="0"/>
+        </a:xfrm>
+      </p:grpSpPr>
+      <p:pic>
+        <p:nvPicPr>
+          <p:cNvPr id="2" name="Picture 1">
+            <a:extLst>
+              <a:ext uri="{FF2B5EF4-FFF2-40B4-BE49-F238E27FC236}">
+                <a16:creationId xmlns:a16="http://schemas.microsoft.com/office/drawing/2014/main" id="{CE2FEDC3-DBAC-4AF6-A5AA-0E7E0204C52C}"/>
+              </a:ext>
+            </a:extLst>
+          </p:cNvPr>
+          <p:cNvPicPr>
+            <a:picLocks noChangeAspect="1"/>
+          </p:cNvPicPr>
+          <p:nvPr/>
+        </p:nvPicPr>
+        <p:blipFill>
+          <a:blip r:embed="rId3"/>
+          <a:stretch>
+            <a:fillRect/>
+          </a:stretch>
+        </p:blipFill>
+        <p:spPr>
+          <a:xfrm>
+            <a:off x="4623758" y="1767671"/>
+            <a:ext cx="3159964" cy="3007676"/>
+          </a:xfrm>
+          <a:prstGeom prst="rect">
+            <a:avLst/>
+          </a:prstGeom>
+        </p:spPr>
+      </p:pic>
+      <p:sp>
+        <p:nvSpPr>
+          <p:cNvPr id="6" name="TextBox 5">
+            <a:extLst>
+              <a:ext uri="{FF2B5EF4-FFF2-40B4-BE49-F238E27FC236}">
+                <a16:creationId xmlns:a16="http://schemas.microsoft.com/office/drawing/2014/main" id="{BC853962-F4F5-4D04-8481-082A5573B1F2}"/>
+              </a:ext>
+            </a:extLst>
+          </p:cNvPr>
+          <p:cNvSpPr txBox="1"/>
+          <p:nvPr/>
+        </p:nvSpPr>
+        <p:spPr>
+          <a:xfrm>
+            <a:off x="1161319" y="2058650"/>
+            <a:ext cx="1492155" cy="1446550"/>
+          </a:xfrm>
+          <a:prstGeom prst="rect">
+            <a:avLst/>
+          </a:prstGeom>
+          <a:solidFill>
+            <a:srgbClr val="1E3E77">
+              <a:alpha val="36863"/>
+            </a:srgbClr>
+          </a:solidFill>
+          <a:ln>
+            <a:solidFill>
+              <a:srgbClr val="000000">
+                <a:alpha val="25882"/>
+              </a:srgbClr>
+            </a:solidFill>
+          </a:ln>
+          <a:effectLst>
+            <a:outerShdw blurRad="50800" dist="38100" dir="13500000" algn="br" rotWithShape="0">
+              <a:prstClr val="black">
+                <a:alpha val="40000"/>
+              </a:prstClr>
+            </a:outerShdw>
+          </a:effectLst>
+        </p:spPr>
+        <p:txBody>
+          <a:bodyPr wrap="square" rtlCol="0">
+            <a:spAutoFit/>
+          </a:bodyPr>
+          <a:lstStyle/>
+          <a:p>
+            <a:pPr algn="ctr"/>
+            <a:r>
+              <a:rPr lang="en-US" sz="4400" dirty="0">
+                <a:solidFill>
+                  <a:srgbClr val="FFFF00"/>
+                </a:solidFill>
+              </a:rPr>
+              <a:t>AE</a:t>
+            </a:r>
+          </a:p>
+          <a:p>
+            <a:pPr algn="ctr"/>
+            <a:r>
+              <a:rPr lang="en-US" sz="4400" dirty="0">
+                <a:solidFill>
+                  <a:srgbClr val="FFFF00"/>
+                </a:solidFill>
+              </a:rPr>
+              <a:t>IOU</a:t>
+            </a:r>
+          </a:p>
+        </p:txBody>
+      </p:sp>
+      <p:sp>
+        <p:nvSpPr>
+          <p:cNvPr id="7" name="TextBox 6">
+            <a:extLst>
+              <a:ext uri="{FF2B5EF4-FFF2-40B4-BE49-F238E27FC236}">
+                <a16:creationId xmlns:a16="http://schemas.microsoft.com/office/drawing/2014/main" id="{312E0FDC-C94E-4860-9E51-0D08DA9955DE}"/>
+              </a:ext>
+            </a:extLst>
+          </p:cNvPr>
+          <p:cNvSpPr txBox="1"/>
+          <p:nvPr/>
+        </p:nvSpPr>
+        <p:spPr>
+          <a:xfrm>
+            <a:off x="1999519" y="4052072"/>
+            <a:ext cx="1492155" cy="1446550"/>
+          </a:xfrm>
+          <a:prstGeom prst="rect">
+            <a:avLst/>
+          </a:prstGeom>
+          <a:solidFill>
+            <a:srgbClr val="1E3E77">
+              <a:alpha val="36863"/>
+            </a:srgbClr>
+          </a:solidFill>
+          <a:ln>
+            <a:solidFill>
+              <a:srgbClr val="000000">
+                <a:alpha val="25882"/>
+              </a:srgbClr>
+            </a:solidFill>
+          </a:ln>
+          <a:effectLst>
+            <a:outerShdw blurRad="50800" dist="38100" dir="13500000" algn="br" rotWithShape="0">
+              <a:prstClr val="black">
+                <a:alpha val="40000"/>
+              </a:prstClr>
+            </a:outerShdw>
+          </a:effectLst>
+        </p:spPr>
+        <p:txBody>
+          <a:bodyPr wrap="square" rtlCol="0">
+            <a:spAutoFit/>
+          </a:bodyPr>
+          <a:lstStyle/>
+          <a:p>
+            <a:pPr algn="ctr"/>
+            <a:r>
+              <a:rPr lang="en-US" sz="4400" dirty="0">
+                <a:solidFill>
+                  <a:srgbClr val="FFFF00"/>
+                </a:solidFill>
+              </a:rPr>
+              <a:t>AE</a:t>
+            </a:r>
+          </a:p>
+          <a:p>
+            <a:pPr algn="ctr"/>
+            <a:r>
+              <a:rPr lang="en-US" sz="4400" dirty="0">
+                <a:solidFill>
+                  <a:srgbClr val="FFFF00"/>
+                </a:solidFill>
+              </a:rPr>
+              <a:t>IOU</a:t>
+            </a:r>
+          </a:p>
+        </p:txBody>
+      </p:sp>
+      <p:sp>
+        <p:nvSpPr>
+          <p:cNvPr id="8" name="TextBox 7">
+            <a:extLst>
+              <a:ext uri="{FF2B5EF4-FFF2-40B4-BE49-F238E27FC236}">
+                <a16:creationId xmlns:a16="http://schemas.microsoft.com/office/drawing/2014/main" id="{DE18C712-5DEC-4DD8-A448-F28B147317F5}"/>
+              </a:ext>
+            </a:extLst>
+          </p:cNvPr>
+          <p:cNvSpPr txBox="1"/>
+          <p:nvPr/>
+        </p:nvSpPr>
+        <p:spPr>
+          <a:xfrm>
+            <a:off x="5745101" y="2353128"/>
+            <a:ext cx="423832" cy="769441"/>
+          </a:xfrm>
+          <a:prstGeom prst="rect">
+            <a:avLst/>
+          </a:prstGeom>
+          <a:solidFill>
+            <a:schemeClr val="bg2">
+              <a:lumMod val="25000"/>
+              <a:alpha val="36863"/>
+            </a:schemeClr>
+          </a:solidFill>
+          <a:ln>
+            <a:solidFill>
+              <a:srgbClr val="000000">
+                <a:alpha val="25882"/>
+              </a:srgbClr>
+            </a:solidFill>
+          </a:ln>
+          <a:effectLst>
+            <a:outerShdw blurRad="50800" dist="38100" dir="13500000" algn="br" rotWithShape="0">
+              <a:prstClr val="black">
+                <a:alpha val="40000"/>
+              </a:prstClr>
+            </a:outerShdw>
+          </a:effectLst>
+        </p:spPr>
+        <p:txBody>
+          <a:bodyPr wrap="square" rtlCol="0">
+            <a:spAutoFit/>
+          </a:bodyPr>
+          <a:lstStyle/>
+          <a:p>
+            <a:pPr algn="ctr"/>
+            <a:r>
+              <a:rPr lang="en-US" sz="4400" dirty="0">
+                <a:solidFill>
+                  <a:srgbClr val="FFFF00"/>
+                </a:solidFill>
+              </a:rPr>
+              <a:t>A</a:t>
+            </a:r>
+          </a:p>
+        </p:txBody>
+      </p:sp>
+      <p:sp>
+        <p:nvSpPr>
+          <p:cNvPr id="9" name="TextBox 8">
+            <a:extLst>
+              <a:ext uri="{FF2B5EF4-FFF2-40B4-BE49-F238E27FC236}">
+                <a16:creationId xmlns:a16="http://schemas.microsoft.com/office/drawing/2014/main" id="{5BC92F98-03B6-4D04-BED2-AD3F5139F237}"/>
+              </a:ext>
+            </a:extLst>
+          </p:cNvPr>
+          <p:cNvSpPr txBox="1"/>
+          <p:nvPr/>
+        </p:nvSpPr>
+        <p:spPr>
+          <a:xfrm>
+            <a:off x="9114694" y="1044396"/>
+            <a:ext cx="1492155" cy="1446550"/>
+          </a:xfrm>
+          <a:prstGeom prst="rect">
+            <a:avLst/>
+          </a:prstGeom>
+          <a:solidFill>
+            <a:srgbClr val="1E3E77">
+              <a:alpha val="36863"/>
+            </a:srgbClr>
+          </a:solidFill>
+          <a:ln>
+            <a:solidFill>
+              <a:srgbClr val="000000">
+                <a:alpha val="25882"/>
+              </a:srgbClr>
+            </a:solidFill>
+          </a:ln>
+          <a:effectLst>
+            <a:outerShdw blurRad="50800" dist="38100" dir="13500000" algn="br" rotWithShape="0">
+              <a:prstClr val="black">
+                <a:alpha val="40000"/>
+              </a:prstClr>
+            </a:outerShdw>
+          </a:effectLst>
+        </p:spPr>
+        <p:txBody>
+          <a:bodyPr wrap="square" rtlCol="0">
+            <a:spAutoFit/>
+          </a:bodyPr>
+          <a:lstStyle/>
+          <a:p>
+            <a:pPr algn="ctr"/>
+            <a:r>
+              <a:rPr lang="en-US" sz="4400" dirty="0">
+                <a:solidFill>
+                  <a:srgbClr val="FFFF00"/>
+                </a:solidFill>
+              </a:rPr>
+              <a:t>AE</a:t>
+            </a:r>
+          </a:p>
+          <a:p>
+            <a:pPr algn="ctr"/>
+            <a:r>
+              <a:rPr lang="en-US" sz="4400" dirty="0">
+                <a:solidFill>
+                  <a:srgbClr val="FFFF00"/>
+                </a:solidFill>
+              </a:rPr>
+              <a:t>IOU</a:t>
+            </a:r>
+          </a:p>
+        </p:txBody>
+      </p:sp>
+      <p:sp>
+        <p:nvSpPr>
+          <p:cNvPr id="10" name="TextBox 9">
+            <a:extLst>
+              <a:ext uri="{FF2B5EF4-FFF2-40B4-BE49-F238E27FC236}">
+                <a16:creationId xmlns:a16="http://schemas.microsoft.com/office/drawing/2014/main" id="{28194059-6220-434F-9AF1-BF6FA865C4EC}"/>
+              </a:ext>
+            </a:extLst>
+          </p:cNvPr>
+          <p:cNvSpPr txBox="1"/>
+          <p:nvPr/>
+        </p:nvSpPr>
+        <p:spPr>
+          <a:xfrm>
+            <a:off x="9446403" y="3887450"/>
+            <a:ext cx="1492155" cy="1446550"/>
+          </a:xfrm>
+          <a:prstGeom prst="rect">
+            <a:avLst/>
+          </a:prstGeom>
+          <a:solidFill>
+            <a:srgbClr val="1E3E77">
+              <a:alpha val="36863"/>
+            </a:srgbClr>
+          </a:solidFill>
+          <a:ln>
+            <a:solidFill>
+              <a:srgbClr val="000000">
+                <a:alpha val="25882"/>
+              </a:srgbClr>
+            </a:solidFill>
+          </a:ln>
+          <a:effectLst>
+            <a:outerShdw blurRad="50800" dist="38100" dir="13500000" algn="br" rotWithShape="0">
+              <a:prstClr val="black">
+                <a:alpha val="40000"/>
+              </a:prstClr>
+            </a:outerShdw>
+          </a:effectLst>
+        </p:spPr>
+        <p:txBody>
+          <a:bodyPr wrap="square" rtlCol="0">
+            <a:spAutoFit/>
+          </a:bodyPr>
+          <a:lstStyle/>
+          <a:p>
+            <a:pPr algn="ctr"/>
+            <a:r>
+              <a:rPr lang="en-US" sz="4400" dirty="0">
+                <a:solidFill>
+                  <a:srgbClr val="FFFF00"/>
+                </a:solidFill>
+              </a:rPr>
+              <a:t>AE</a:t>
+            </a:r>
+          </a:p>
+          <a:p>
+            <a:pPr algn="ctr"/>
+            <a:r>
+              <a:rPr lang="en-US" sz="4400" dirty="0">
+                <a:solidFill>
+                  <a:srgbClr val="FFFF00"/>
+                </a:solidFill>
+              </a:rPr>
+              <a:t>IOU</a:t>
+            </a:r>
+          </a:p>
+        </p:txBody>
+      </p:sp>
+      <p:sp>
+        <p:nvSpPr>
+          <p:cNvPr id="11" name="TextBox 10">
+            <a:extLst>
+              <a:ext uri="{FF2B5EF4-FFF2-40B4-BE49-F238E27FC236}">
+                <a16:creationId xmlns:a16="http://schemas.microsoft.com/office/drawing/2014/main" id="{D996A28B-5F2A-48E9-A6AE-79C36F4082D5}"/>
+              </a:ext>
+            </a:extLst>
+          </p:cNvPr>
+          <p:cNvSpPr txBox="1"/>
+          <p:nvPr/>
+        </p:nvSpPr>
+        <p:spPr>
+          <a:xfrm>
+            <a:off x="6309370" y="2353127"/>
+            <a:ext cx="423832" cy="769441"/>
+          </a:xfrm>
+          <a:prstGeom prst="rect">
+            <a:avLst/>
+          </a:prstGeom>
+          <a:solidFill>
+            <a:schemeClr val="bg2">
+              <a:lumMod val="25000"/>
+              <a:alpha val="36863"/>
+            </a:schemeClr>
+          </a:solidFill>
+          <a:ln>
+            <a:solidFill>
+              <a:srgbClr val="000000">
+                <a:alpha val="25882"/>
+              </a:srgbClr>
+            </a:solidFill>
+          </a:ln>
+          <a:effectLst>
+            <a:outerShdw blurRad="50800" dist="38100" dir="13500000" algn="br" rotWithShape="0">
+              <a:prstClr val="black">
+                <a:alpha val="40000"/>
+              </a:prstClr>
+            </a:outerShdw>
+          </a:effectLst>
+        </p:spPr>
+        <p:txBody>
+          <a:bodyPr wrap="square" rtlCol="0">
+            <a:spAutoFit/>
+          </a:bodyPr>
+          <a:lstStyle/>
+          <a:p>
+            <a:pPr algn="ctr"/>
+            <a:r>
+              <a:rPr lang="en-US" sz="4400" dirty="0">
+                <a:solidFill>
+                  <a:srgbClr val="FFFF00"/>
+                </a:solidFill>
+              </a:rPr>
+              <a:t>E</a:t>
+            </a:r>
+          </a:p>
+        </p:txBody>
+      </p:sp>
+      <p:sp>
+        <p:nvSpPr>
+          <p:cNvPr id="12" name="TextBox 11">
+            <a:extLst>
+              <a:ext uri="{FF2B5EF4-FFF2-40B4-BE49-F238E27FC236}">
+                <a16:creationId xmlns:a16="http://schemas.microsoft.com/office/drawing/2014/main" id="{C7933075-893D-46F5-838C-2DAF8173A225}"/>
+              </a:ext>
+            </a:extLst>
+          </p:cNvPr>
+          <p:cNvSpPr txBox="1"/>
+          <p:nvPr/>
+        </p:nvSpPr>
+        <p:spPr>
+          <a:xfrm>
+            <a:off x="5492958" y="3021644"/>
+            <a:ext cx="423832" cy="769441"/>
+          </a:xfrm>
+          <a:prstGeom prst="rect">
+            <a:avLst/>
+          </a:prstGeom>
+          <a:solidFill>
+            <a:schemeClr val="bg2">
+              <a:lumMod val="25000"/>
+              <a:alpha val="36863"/>
+            </a:schemeClr>
+          </a:solidFill>
+          <a:ln>
+            <a:solidFill>
+              <a:srgbClr val="000000">
+                <a:alpha val="25882"/>
+              </a:srgbClr>
+            </a:solidFill>
+          </a:ln>
+          <a:effectLst>
+            <a:outerShdw blurRad="50800" dist="38100" dir="13500000" algn="br" rotWithShape="0">
+              <a:prstClr val="black">
+                <a:alpha val="40000"/>
+              </a:prstClr>
+            </a:outerShdw>
+          </a:effectLst>
+        </p:spPr>
+        <p:txBody>
+          <a:bodyPr wrap="square" rtlCol="0">
+            <a:spAutoFit/>
+          </a:bodyPr>
+          <a:lstStyle/>
+          <a:p>
+            <a:pPr algn="ctr"/>
+            <a:r>
+              <a:rPr lang="en-US" sz="4400" dirty="0">
+                <a:solidFill>
+                  <a:srgbClr val="FFFF00"/>
+                </a:solidFill>
+              </a:rPr>
+              <a:t>I</a:t>
+            </a:r>
+          </a:p>
+        </p:txBody>
+      </p:sp>
+      <p:sp>
+        <p:nvSpPr>
+          <p:cNvPr id="13" name="TextBox 12">
+            <a:extLst>
+              <a:ext uri="{FF2B5EF4-FFF2-40B4-BE49-F238E27FC236}">
+                <a16:creationId xmlns:a16="http://schemas.microsoft.com/office/drawing/2014/main" id="{FA56F437-2190-47A8-ABF3-EEEB7D7B19D8}"/>
+              </a:ext>
+            </a:extLst>
+          </p:cNvPr>
+          <p:cNvSpPr txBox="1"/>
+          <p:nvPr/>
+        </p:nvSpPr>
+        <p:spPr>
+          <a:xfrm>
+            <a:off x="5966029" y="3316218"/>
+            <a:ext cx="423832" cy="769441"/>
+          </a:xfrm>
+          <a:prstGeom prst="rect">
+            <a:avLst/>
+          </a:prstGeom>
+          <a:solidFill>
+            <a:schemeClr val="bg2">
+              <a:lumMod val="25000"/>
+              <a:alpha val="36863"/>
+            </a:schemeClr>
+          </a:solidFill>
+          <a:ln>
+            <a:solidFill>
+              <a:srgbClr val="000000">
+                <a:alpha val="25882"/>
+              </a:srgbClr>
+            </a:solidFill>
+          </a:ln>
+          <a:effectLst>
+            <a:outerShdw blurRad="50800" dist="38100" dir="13500000" algn="br" rotWithShape="0">
+              <a:prstClr val="black">
+                <a:alpha val="40000"/>
+              </a:prstClr>
+            </a:outerShdw>
+          </a:effectLst>
+        </p:spPr>
+        <p:txBody>
+          <a:bodyPr wrap="square" rtlCol="0">
+            <a:spAutoFit/>
+          </a:bodyPr>
+          <a:lstStyle/>
+          <a:p>
+            <a:pPr algn="ctr"/>
+            <a:r>
+              <a:rPr lang="en-US" sz="4400" dirty="0">
+                <a:solidFill>
+                  <a:srgbClr val="FFFF00"/>
+                </a:solidFill>
+              </a:rPr>
+              <a:t>O</a:t>
+            </a:r>
+          </a:p>
+        </p:txBody>
+      </p:sp>
+      <p:sp>
+        <p:nvSpPr>
+          <p:cNvPr id="14" name="TextBox 13">
+            <a:extLst>
+              <a:ext uri="{FF2B5EF4-FFF2-40B4-BE49-F238E27FC236}">
+                <a16:creationId xmlns:a16="http://schemas.microsoft.com/office/drawing/2014/main" id="{A4B55A36-BD9F-4D5A-BEA4-35BF17FC98CF}"/>
+              </a:ext>
+            </a:extLst>
+          </p:cNvPr>
+          <p:cNvSpPr txBox="1"/>
+          <p:nvPr/>
+        </p:nvSpPr>
+        <p:spPr>
+          <a:xfrm>
+            <a:off x="6445389" y="3021644"/>
+            <a:ext cx="423832" cy="769441"/>
+          </a:xfrm>
+          <a:prstGeom prst="rect">
+            <a:avLst/>
+          </a:prstGeom>
+          <a:solidFill>
+            <a:schemeClr val="bg2">
+              <a:lumMod val="25000"/>
+              <a:alpha val="36863"/>
+            </a:schemeClr>
+          </a:solidFill>
+          <a:ln>
+            <a:solidFill>
+              <a:srgbClr val="000000">
+                <a:alpha val="25882"/>
+              </a:srgbClr>
+            </a:solidFill>
+          </a:ln>
+          <a:effectLst>
+            <a:outerShdw blurRad="50800" dist="38100" dir="13500000" algn="br" rotWithShape="0">
+              <a:prstClr val="black">
+                <a:alpha val="40000"/>
+              </a:prstClr>
+            </a:outerShdw>
+          </a:effectLst>
+        </p:spPr>
+        <p:txBody>
+          <a:bodyPr wrap="square" rtlCol="0">
+            <a:spAutoFit/>
+          </a:bodyPr>
+          <a:lstStyle/>
+          <a:p>
+            <a:pPr algn="ctr"/>
+            <a:r>
+              <a:rPr lang="en-US" sz="4400" dirty="0">
+                <a:solidFill>
+                  <a:srgbClr val="FFFF00"/>
+                </a:solidFill>
+              </a:rPr>
+              <a:t>U</a:t>
+            </a:r>
+          </a:p>
+        </p:txBody>
+      </p:sp>
+      <p:sp>
+        <p:nvSpPr>
+          <p:cNvPr id="15" name="TextBox 14">
+            <a:extLst>
+              <a:ext uri="{FF2B5EF4-FFF2-40B4-BE49-F238E27FC236}">
+                <a16:creationId xmlns:a16="http://schemas.microsoft.com/office/drawing/2014/main" id="{67721360-4027-4FC4-8530-C15B9CDDCE30}"/>
+              </a:ext>
+            </a:extLst>
+          </p:cNvPr>
+          <p:cNvSpPr txBox="1"/>
+          <p:nvPr/>
+        </p:nvSpPr>
+        <p:spPr>
+          <a:xfrm>
+            <a:off x="5983646" y="2847063"/>
+            <a:ext cx="423832" cy="769441"/>
+          </a:xfrm>
+          <a:prstGeom prst="rect">
+            <a:avLst/>
+          </a:prstGeom>
+          <a:solidFill>
+            <a:schemeClr val="bg2">
+              <a:lumMod val="25000"/>
+              <a:alpha val="36863"/>
+            </a:schemeClr>
+          </a:solidFill>
+          <a:ln>
+            <a:solidFill>
+              <a:srgbClr val="000000">
+                <a:alpha val="25882"/>
+              </a:srgbClr>
+            </a:solidFill>
+          </a:ln>
+          <a:effectLst>
+            <a:outerShdw blurRad="50800" dist="38100" dir="13500000" algn="br" rotWithShape="0">
+              <a:prstClr val="black">
+                <a:alpha val="40000"/>
+              </a:prstClr>
+            </a:outerShdw>
+          </a:effectLst>
+        </p:spPr>
+        <p:txBody>
+          <a:bodyPr wrap="square" rtlCol="0">
+            <a:spAutoFit/>
+          </a:bodyPr>
+          <a:lstStyle/>
+          <a:p>
+            <a:pPr algn="ctr"/>
+            <a:r>
+              <a:rPr lang="en-US" sz="4400" dirty="0">
+                <a:solidFill>
+                  <a:srgbClr val="FFFF00"/>
+                </a:solidFill>
+              </a:rPr>
+              <a:t>?</a:t>
+            </a:r>
+          </a:p>
+        </p:txBody>
+      </p:sp>
+    </p:spTree>
+    <p:extLst>
+      <p:ext uri="{BB962C8B-B14F-4D97-AF65-F5344CB8AC3E}">
+        <p14:creationId xmlns:p14="http://schemas.microsoft.com/office/powerpoint/2010/main" val="3640517660"/>
+      </p:ext>
+    </p:extLst>
+  </p:cSld>
+  <p:clrMapOvr>
+    <a:masterClrMapping/>
+  </p:clrMapOvr>
+</p:sld>
+</file>
+
+<file path=ppt/slides/slide5.xml><?xml version="1.0" encoding="utf-8"?>
+<p:sld xmlns:a="http://schemas.openxmlformats.org/drawingml/2006/main" xmlns:r="http://schemas.openxmlformats.org/officeDocument/2006/relationships" xmlns:p="http://schemas.openxmlformats.org/presentationml/2006/main">
+  <p:cSld>
+    <p:spTree>
+      <p:nvGrpSpPr>
+        <p:cNvPr id="1" name=""/>
+        <p:cNvGrpSpPr/>
+        <p:nvPr/>
+      </p:nvGrpSpPr>
+      <p:grpSpPr>
+        <a:xfrm>
+          <a:off x="0" y="0"/>
+          <a:ext cx="0" cy="0"/>
+          <a:chOff x="0" y="0"/>
+          <a:chExt cx="0" cy="0"/>
+        </a:xfrm>
+      </p:grpSpPr>
+      <p:pic>
+        <p:nvPicPr>
+          <p:cNvPr id="2" name="Picture 1">
+            <a:extLst>
+              <a:ext uri="{FF2B5EF4-FFF2-40B4-BE49-F238E27FC236}">
                 <a16:creationId xmlns:a16="http://schemas.microsoft.com/office/drawing/2014/main" id="{810E4F26-075C-4F8E-B53A-135C51CBBCEC}"/>
               </a:ext>
             </a:extLst>
@@ -5650,7 +7397,7 @@
 </p:sld>
 </file>
 
-<file path=ppt/slides/slide3.xml><?xml version="1.0" encoding="utf-8"?>
+<file path=ppt/slides/slide6.xml><?xml version="1.0" encoding="utf-8"?>
 <p:sld xmlns:a="http://schemas.openxmlformats.org/drawingml/2006/main" xmlns:r="http://schemas.openxmlformats.org/officeDocument/2006/relationships" xmlns:p="http://schemas.openxmlformats.org/presentationml/2006/main">
   <p:cSld>
     <p:spTree>
@@ -5710,7 +7457,7 @@
 </p:sld>
 </file>
 
-<file path=ppt/slides/slide4.xml><?xml version="1.0" encoding="utf-8"?>
+<file path=ppt/slides/slide7.xml><?xml version="1.0" encoding="utf-8"?>
 <p:sld xmlns:a="http://schemas.openxmlformats.org/drawingml/2006/main" xmlns:r="http://schemas.openxmlformats.org/officeDocument/2006/relationships" xmlns:p="http://schemas.openxmlformats.org/presentationml/2006/main">
   <p:cSld>
     <p:spTree>
@@ -5758,334 +7505,187 @@
       </p:pic>
       <p:sp>
         <p:nvSpPr>
-          <p:cNvPr id="3" name="Multiplication Sign 2">
-            <a:extLst>
-              <a:ext uri="{FF2B5EF4-FFF2-40B4-BE49-F238E27FC236}">
-                <a16:creationId xmlns:a16="http://schemas.microsoft.com/office/drawing/2014/main" id="{D250D44B-F387-4D84-B7E5-EC1CAE256365}"/>
-              </a:ext>
-            </a:extLst>
-          </p:cNvPr>
-          <p:cNvSpPr/>
+          <p:cNvPr id="5" name="TextBox 4">
+            <a:extLst>
+              <a:ext uri="{FF2B5EF4-FFF2-40B4-BE49-F238E27FC236}">
+                <a16:creationId xmlns:a16="http://schemas.microsoft.com/office/drawing/2014/main" id="{AC7FE29A-2A8B-4D62-952C-7E47C0D4AFBF}"/>
+              </a:ext>
+            </a:extLst>
+          </p:cNvPr>
+          <p:cNvSpPr txBox="1"/>
           <p:nvPr/>
         </p:nvSpPr>
         <p:spPr>
-          <a:xfrm>
-            <a:off x="4090986" y="1643061"/>
-            <a:ext cx="3381375" cy="2895600"/>
-          </a:xfrm>
-          <a:prstGeom prst="mathMultiply">
-            <a:avLst/>
-          </a:prstGeom>
-          <a:solidFill>
-            <a:srgbClr val="FF0000"/>
-          </a:solidFill>
-        </p:spPr>
-        <p:style>
-          <a:lnRef idx="2">
-            <a:schemeClr val="accent1">
-              <a:shade val="50000"/>
-            </a:schemeClr>
-          </a:lnRef>
-          <a:fillRef idx="1">
-            <a:schemeClr val="accent1"/>
-          </a:fillRef>
-          <a:effectRef idx="0">
-            <a:schemeClr val="accent1"/>
-          </a:effectRef>
-          <a:fontRef idx="minor">
-            <a:schemeClr val="lt1"/>
-          </a:fontRef>
-        </p:style>
-        <p:txBody>
-          <a:bodyPr rtlCol="0" anchor="ctr"/>
-          <a:lstStyle/>
-          <a:p>
-            <a:pPr algn="ctr"/>
-            <a:endParaRPr lang="en-US"/>
-          </a:p>
-        </p:txBody>
-      </p:sp>
-    </p:spTree>
-    <p:extLst>
-      <p:ext uri="{BB962C8B-B14F-4D97-AF65-F5344CB8AC3E}">
-        <p14:creationId xmlns:p14="http://schemas.microsoft.com/office/powerpoint/2010/main" val="3490472520"/>
-      </p:ext>
-    </p:extLst>
-  </p:cSld>
-  <p:clrMapOvr>
-    <a:masterClrMapping/>
-  </p:clrMapOvr>
-</p:sld>
-</file>
-
-<file path=ppt/slides/slide5.xml><?xml version="1.0" encoding="utf-8"?>
-<p:sld xmlns:a="http://schemas.openxmlformats.org/drawingml/2006/main" xmlns:r="http://schemas.openxmlformats.org/officeDocument/2006/relationships" xmlns:p="http://schemas.openxmlformats.org/presentationml/2006/main">
-  <p:cSld>
-    <p:spTree>
-      <p:nvGrpSpPr>
-        <p:cNvPr id="1" name=""/>
-        <p:cNvGrpSpPr/>
-        <p:nvPr/>
-      </p:nvGrpSpPr>
-      <p:grpSpPr>
-        <a:xfrm>
-          <a:off x="0" y="0"/>
-          <a:ext cx="0" cy="0"/>
-          <a:chOff x="0" y="0"/>
-          <a:chExt cx="0" cy="0"/>
-        </a:xfrm>
-      </p:grpSpPr>
-      <p:pic>
-        <p:nvPicPr>
-          <p:cNvPr id="2" name="Picture 1">
-            <a:extLst>
-              <a:ext uri="{FF2B5EF4-FFF2-40B4-BE49-F238E27FC236}">
-                <a16:creationId xmlns:a16="http://schemas.microsoft.com/office/drawing/2014/main" id="{810E4F26-075C-4F8E-B53A-135C51CBBCEC}"/>
-              </a:ext>
-            </a:extLst>
-          </p:cNvPr>
-          <p:cNvPicPr>
-            <a:picLocks noChangeAspect="1"/>
-          </p:cNvPicPr>
-          <p:nvPr/>
-        </p:nvPicPr>
-        <p:blipFill rotWithShape="1">
-          <a:blip r:embed="rId3"/>
-          <a:srcRect l="22135" t="582" r="23110" b="44060"/>
-          <a:stretch/>
-        </p:blipFill>
-        <p:spPr>
-          <a:xfrm>
-            <a:off x="3962400" y="1257299"/>
-            <a:ext cx="3638549" cy="3667125"/>
-          </a:xfrm>
-          <a:prstGeom prst="rect">
-            <a:avLst/>
-          </a:prstGeom>
-        </p:spPr>
-      </p:pic>
-      <p:sp>
-        <p:nvSpPr>
-          <p:cNvPr id="5" name="Rectangle 4">
-            <a:extLst>
-              <a:ext uri="{FF2B5EF4-FFF2-40B4-BE49-F238E27FC236}">
-                <a16:creationId xmlns:a16="http://schemas.microsoft.com/office/drawing/2014/main" id="{9C9D6F7C-D5B3-4ED3-A70C-9007FE21517F}"/>
-              </a:ext>
-            </a:extLst>
-          </p:cNvPr>
-          <p:cNvSpPr/>
-          <p:nvPr/>
-        </p:nvSpPr>
-        <p:spPr>
-          <a:xfrm>
-            <a:off x="4010025" y="2981325"/>
-            <a:ext cx="3533774" cy="209550"/>
+          <a:xfrm rot="20947113">
+            <a:off x="4136026" y="1914315"/>
+            <a:ext cx="423832" cy="769441"/>
           </a:xfrm>
           <a:prstGeom prst="rect">
             <a:avLst/>
           </a:prstGeom>
           <a:solidFill>
-            <a:srgbClr val="FF0000"/>
+            <a:schemeClr val="bg2">
+              <a:lumMod val="25000"/>
+              <a:alpha val="36863"/>
+            </a:schemeClr>
           </a:solidFill>
+          <a:ln>
+            <a:solidFill>
+              <a:srgbClr val="000000">
+                <a:alpha val="25882"/>
+              </a:srgbClr>
+            </a:solidFill>
+          </a:ln>
+          <a:effectLst>
+            <a:outerShdw blurRad="50800" dist="38100" dir="13500000" algn="br" rotWithShape="0">
+              <a:prstClr val="black">
+                <a:alpha val="40000"/>
+              </a:prstClr>
+            </a:outerShdw>
+          </a:effectLst>
         </p:spPr>
-        <p:style>
-          <a:lnRef idx="2">
-            <a:schemeClr val="accent1">
-              <a:shade val="50000"/>
-            </a:schemeClr>
-          </a:lnRef>
-          <a:fillRef idx="1">
-            <a:schemeClr val="accent1"/>
-          </a:fillRef>
-          <a:effectRef idx="0">
-            <a:schemeClr val="accent1"/>
-          </a:effectRef>
-          <a:fontRef idx="minor">
-            <a:schemeClr val="lt1"/>
-          </a:fontRef>
-        </p:style>
-        <p:txBody>
-          <a:bodyPr rtlCol="0" anchor="ctr"/>
+        <p:txBody>
+          <a:bodyPr wrap="square" rtlCol="0">
+            <a:spAutoFit/>
+          </a:bodyPr>
           <a:lstStyle/>
           <a:p>
             <a:pPr algn="ctr"/>
-            <a:endParaRPr lang="en-US"/>
-          </a:p>
-        </p:txBody>
-      </p:sp>
-    </p:spTree>
-    <p:extLst>
-      <p:ext uri="{BB962C8B-B14F-4D97-AF65-F5344CB8AC3E}">
-        <p14:creationId xmlns:p14="http://schemas.microsoft.com/office/powerpoint/2010/main" val="872767627"/>
-      </p:ext>
-    </p:extLst>
-  </p:cSld>
-  <p:clrMapOvr>
-    <a:masterClrMapping/>
-  </p:clrMapOvr>
-</p:sld>
-</file>
-
-<file path=ppt/slides/slide6.xml><?xml version="1.0" encoding="utf-8"?>
-<p:sld xmlns:a="http://schemas.openxmlformats.org/drawingml/2006/main" xmlns:r="http://schemas.openxmlformats.org/officeDocument/2006/relationships" xmlns:p="http://schemas.openxmlformats.org/presentationml/2006/main">
-  <p:cSld>
-    <p:spTree>
-      <p:nvGrpSpPr>
-        <p:cNvPr id="1" name=""/>
-        <p:cNvGrpSpPr/>
-        <p:nvPr/>
-      </p:nvGrpSpPr>
-      <p:grpSpPr>
-        <a:xfrm>
-          <a:off x="0" y="0"/>
-          <a:ext cx="0" cy="0"/>
-          <a:chOff x="0" y="0"/>
-          <a:chExt cx="0" cy="0"/>
-        </a:xfrm>
-      </p:grpSpPr>
-      <p:pic>
-        <p:nvPicPr>
-          <p:cNvPr id="2" name="Picture 1">
-            <a:extLst>
-              <a:ext uri="{FF2B5EF4-FFF2-40B4-BE49-F238E27FC236}">
-                <a16:creationId xmlns:a16="http://schemas.microsoft.com/office/drawing/2014/main" id="{810E4F26-075C-4F8E-B53A-135C51CBBCEC}"/>
-              </a:ext>
-            </a:extLst>
-          </p:cNvPr>
-          <p:cNvPicPr>
-            <a:picLocks noChangeAspect="1"/>
-          </p:cNvPicPr>
+            <a:r>
+              <a:rPr lang="en-US" sz="4400" dirty="0">
+                <a:solidFill>
+                  <a:srgbClr val="FFFF00"/>
+                </a:solidFill>
+              </a:rPr>
+              <a:t>A</a:t>
+            </a:r>
+          </a:p>
+        </p:txBody>
+      </p:sp>
+      <p:sp>
+        <p:nvSpPr>
+          <p:cNvPr id="6" name="TextBox 5">
+            <a:extLst>
+              <a:ext uri="{FF2B5EF4-FFF2-40B4-BE49-F238E27FC236}">
+                <a16:creationId xmlns:a16="http://schemas.microsoft.com/office/drawing/2014/main" id="{17EC2F55-8F40-41D5-B5D6-A30B89A454EF}"/>
+              </a:ext>
+            </a:extLst>
+          </p:cNvPr>
+          <p:cNvSpPr txBox="1"/>
           <p:nvPr/>
-        </p:nvPicPr>
-        <p:blipFill rotWithShape="1">
-          <a:blip r:embed="rId3"/>
-          <a:srcRect l="22135" t="582" r="23110" b="44060"/>
-          <a:stretch/>
-        </p:blipFill>
+        </p:nvSpPr>
         <p:spPr>
-          <a:xfrm>
-            <a:off x="3962400" y="1257299"/>
-            <a:ext cx="3638549" cy="3667125"/>
-          </a:xfrm>
-          <a:prstGeom prst="rect">
-            <a:avLst/>
-          </a:prstGeom>
-        </p:spPr>
-      </p:pic>
-      <p:sp>
-        <p:nvSpPr>
-          <p:cNvPr id="5" name="Rectangle 4">
-            <a:extLst>
-              <a:ext uri="{FF2B5EF4-FFF2-40B4-BE49-F238E27FC236}">
-                <a16:creationId xmlns:a16="http://schemas.microsoft.com/office/drawing/2014/main" id="{9C9D6F7C-D5B3-4ED3-A70C-9007FE21517F}"/>
-              </a:ext>
-            </a:extLst>
-          </p:cNvPr>
-          <p:cNvSpPr/>
-          <p:nvPr/>
-        </p:nvSpPr>
-        <p:spPr>
-          <a:xfrm rot="5400000">
-            <a:off x="4010025" y="2981325"/>
-            <a:ext cx="3533774" cy="209550"/>
+          <a:xfrm rot="20693841">
+            <a:off x="6299845" y="1278887"/>
+            <a:ext cx="423832" cy="769441"/>
           </a:xfrm>
           <a:prstGeom prst="rect">
             <a:avLst/>
           </a:prstGeom>
           <a:solidFill>
-            <a:srgbClr val="FF0000"/>
+            <a:schemeClr val="bg2">
+              <a:lumMod val="25000"/>
+              <a:alpha val="36863"/>
+            </a:schemeClr>
           </a:solidFill>
+          <a:ln>
+            <a:solidFill>
+              <a:srgbClr val="000000">
+                <a:alpha val="25882"/>
+              </a:srgbClr>
+            </a:solidFill>
+          </a:ln>
+          <a:effectLst>
+            <a:outerShdw blurRad="50800" dist="38100" dir="13500000" algn="br" rotWithShape="0">
+              <a:prstClr val="black">
+                <a:alpha val="40000"/>
+              </a:prstClr>
+            </a:outerShdw>
+          </a:effectLst>
         </p:spPr>
-        <p:style>
-          <a:lnRef idx="2">
-            <a:schemeClr val="accent1">
-              <a:shade val="50000"/>
-            </a:schemeClr>
-          </a:lnRef>
-          <a:fillRef idx="1">
-            <a:schemeClr val="accent1"/>
-          </a:fillRef>
-          <a:effectRef idx="0">
-            <a:schemeClr val="accent1"/>
-          </a:effectRef>
-          <a:fontRef idx="minor">
-            <a:schemeClr val="lt1"/>
-          </a:fontRef>
-        </p:style>
-        <p:txBody>
-          <a:bodyPr rtlCol="0" anchor="ctr"/>
+        <p:txBody>
+          <a:bodyPr wrap="square" rtlCol="0">
+            <a:spAutoFit/>
+          </a:bodyPr>
           <a:lstStyle/>
           <a:p>
             <a:pPr algn="ctr"/>
-            <a:endParaRPr lang="en-US"/>
-          </a:p>
-        </p:txBody>
-      </p:sp>
-    </p:spTree>
-    <p:extLst>
-      <p:ext uri="{BB962C8B-B14F-4D97-AF65-F5344CB8AC3E}">
-        <p14:creationId xmlns:p14="http://schemas.microsoft.com/office/powerpoint/2010/main" val="1572736565"/>
-      </p:ext>
-    </p:extLst>
-  </p:cSld>
-  <p:clrMapOvr>
-    <a:masterClrMapping/>
-  </p:clrMapOvr>
-</p:sld>
-</file>
-
-<file path=ppt/slides/slide7.xml><?xml version="1.0" encoding="utf-8"?>
-<p:sld xmlns:a="http://schemas.openxmlformats.org/drawingml/2006/main" xmlns:r="http://schemas.openxmlformats.org/officeDocument/2006/relationships" xmlns:p="http://schemas.openxmlformats.org/presentationml/2006/main">
-  <p:cSld>
-    <p:spTree>
-      <p:nvGrpSpPr>
-        <p:cNvPr id="1" name=""/>
-        <p:cNvGrpSpPr/>
-        <p:nvPr/>
-      </p:nvGrpSpPr>
-      <p:grpSpPr>
-        <a:xfrm>
-          <a:off x="0" y="0"/>
-          <a:ext cx="0" cy="0"/>
-          <a:chOff x="0" y="0"/>
-          <a:chExt cx="0" cy="0"/>
-        </a:xfrm>
-      </p:grpSpPr>
-      <p:pic>
-        <p:nvPicPr>
-          <p:cNvPr id="2" name="Picture 1">
-            <a:extLst>
-              <a:ext uri="{FF2B5EF4-FFF2-40B4-BE49-F238E27FC236}">
-                <a16:creationId xmlns:a16="http://schemas.microsoft.com/office/drawing/2014/main" id="{810E4F26-075C-4F8E-B53A-135C51CBBCEC}"/>
-              </a:ext>
-            </a:extLst>
-          </p:cNvPr>
-          <p:cNvPicPr>
-            <a:picLocks noChangeAspect="1"/>
-          </p:cNvPicPr>
+            <a:r>
+              <a:rPr lang="en-US" sz="4400" dirty="0">
+                <a:solidFill>
+                  <a:srgbClr val="FFFF00"/>
+                </a:solidFill>
+              </a:rPr>
+              <a:t>E</a:t>
+            </a:r>
+          </a:p>
+        </p:txBody>
+      </p:sp>
+      <p:sp>
+        <p:nvSpPr>
+          <p:cNvPr id="7" name="TextBox 6">
+            <a:extLst>
+              <a:ext uri="{FF2B5EF4-FFF2-40B4-BE49-F238E27FC236}">
+                <a16:creationId xmlns:a16="http://schemas.microsoft.com/office/drawing/2014/main" id="{8EC8A142-B420-4B23-9553-14CCD75EA5B0}"/>
+              </a:ext>
+            </a:extLst>
+          </p:cNvPr>
+          <p:cNvSpPr txBox="1"/>
           <p:nvPr/>
-        </p:nvPicPr>
-        <p:blipFill rotWithShape="1">
-          <a:blip r:embed="rId3"/>
-          <a:srcRect l="22135" t="582" r="23110" b="44060"/>
-          <a:stretch/>
-        </p:blipFill>
+        </p:nvSpPr>
         <p:spPr>
-          <a:xfrm>
-            <a:off x="3962400" y="1257299"/>
-            <a:ext cx="3638549" cy="3667125"/>
+          <a:xfrm rot="20863819">
+            <a:off x="4892883" y="3469454"/>
+            <a:ext cx="423832" cy="769441"/>
           </a:xfrm>
           <a:prstGeom prst="rect">
             <a:avLst/>
           </a:prstGeom>
+          <a:solidFill>
+            <a:schemeClr val="bg2">
+              <a:lumMod val="25000"/>
+              <a:alpha val="36863"/>
+            </a:schemeClr>
+          </a:solidFill>
+          <a:ln>
+            <a:solidFill>
+              <a:srgbClr val="000000">
+                <a:alpha val="25882"/>
+              </a:srgbClr>
+            </a:solidFill>
+          </a:ln>
+          <a:effectLst>
+            <a:outerShdw blurRad="50800" dist="38100" dir="13500000" algn="br" rotWithShape="0">
+              <a:prstClr val="black">
+                <a:alpha val="40000"/>
+              </a:prstClr>
+            </a:outerShdw>
+          </a:effectLst>
         </p:spPr>
-      </p:pic>
-      <p:sp>
-        <p:nvSpPr>
-          <p:cNvPr id="4" name="TextBox 3">
-            <a:extLst>
-              <a:ext uri="{FF2B5EF4-FFF2-40B4-BE49-F238E27FC236}">
-                <a16:creationId xmlns:a16="http://schemas.microsoft.com/office/drawing/2014/main" id="{A58FC557-A667-4323-A120-60DA62E7AC47}"/>
+        <p:txBody>
+          <a:bodyPr wrap="square" rtlCol="0">
+            <a:spAutoFit/>
+          </a:bodyPr>
+          <a:lstStyle/>
+          <a:p>
+            <a:pPr algn="ctr"/>
+            <a:r>
+              <a:rPr lang="en-US" sz="4400" dirty="0">
+                <a:solidFill>
+                  <a:srgbClr val="FFFF00"/>
+                </a:solidFill>
+              </a:rPr>
+              <a:t>I</a:t>
+            </a:r>
+          </a:p>
+        </p:txBody>
+      </p:sp>
+      <p:sp>
+        <p:nvSpPr>
+          <p:cNvPr id="8" name="TextBox 7">
+            <a:extLst>
+              <a:ext uri="{FF2B5EF4-FFF2-40B4-BE49-F238E27FC236}">
+                <a16:creationId xmlns:a16="http://schemas.microsoft.com/office/drawing/2014/main" id="{B1CBA3A2-0662-43DD-9C42-3425F58DC3A7}"/>
               </a:ext>
             </a:extLst>
           </p:cNvPr>
@@ -6093,14 +7693,33 @@
           <p:nvPr/>
         </p:nvSpPr>
         <p:spPr>
-          <a:xfrm>
-            <a:off x="4486274" y="-133099"/>
-            <a:ext cx="2886075" cy="6447919"/>
+          <a:xfrm rot="20592803">
+            <a:off x="6331130" y="3429000"/>
+            <a:ext cx="423832" cy="769441"/>
           </a:xfrm>
           <a:prstGeom prst="rect">
             <a:avLst/>
           </a:prstGeom>
-          <a:noFill/>
+          <a:solidFill>
+            <a:schemeClr val="bg2">
+              <a:lumMod val="25000"/>
+              <a:alpha val="36863"/>
+            </a:schemeClr>
+          </a:solidFill>
+          <a:ln>
+            <a:solidFill>
+              <a:srgbClr val="000000">
+                <a:alpha val="25882"/>
+              </a:srgbClr>
+            </a:solidFill>
+          </a:ln>
+          <a:effectLst>
+            <a:outerShdw blurRad="50800" dist="38100" dir="13500000" algn="br" rotWithShape="0">
+              <a:prstClr val="black">
+                <a:alpha val="40000"/>
+              </a:prstClr>
+            </a:outerShdw>
+          </a:effectLst>
         </p:spPr>
         <p:txBody>
           <a:bodyPr wrap="square" rtlCol="0">
@@ -6108,18 +7727,130 @@
           </a:bodyPr>
           <a:lstStyle/>
           <a:p>
-            <a:r>
-              <a:rPr lang="en-US" sz="41300" dirty="0">
+            <a:pPr algn="ctr"/>
+            <a:r>
+              <a:rPr lang="en-US" sz="4400" dirty="0">
                 <a:solidFill>
                   <a:srgbClr val="FFFF00"/>
                 </a:solidFill>
-                <a:effectLst>
-                  <a:outerShdw blurRad="50800" dist="38100" dir="10800000" algn="r" rotWithShape="0">
-                    <a:prstClr val="black">
-                      <a:alpha val="40000"/>
-                    </a:prstClr>
-                  </a:outerShdw>
-                </a:effectLst>
+              </a:rPr>
+              <a:t>O</a:t>
+            </a:r>
+          </a:p>
+        </p:txBody>
+      </p:sp>
+      <p:sp>
+        <p:nvSpPr>
+          <p:cNvPr id="9" name="TextBox 8">
+            <a:extLst>
+              <a:ext uri="{FF2B5EF4-FFF2-40B4-BE49-F238E27FC236}">
+                <a16:creationId xmlns:a16="http://schemas.microsoft.com/office/drawing/2014/main" id="{B6E4853B-91FF-49D3-988F-55DEF748F9E3}"/>
+              </a:ext>
+            </a:extLst>
+          </p:cNvPr>
+          <p:cNvSpPr txBox="1"/>
+          <p:nvPr/>
+        </p:nvSpPr>
+        <p:spPr>
+          <a:xfrm rot="20600239">
+            <a:off x="5598224" y="4154983"/>
+            <a:ext cx="423832" cy="769441"/>
+          </a:xfrm>
+          <a:prstGeom prst="rect">
+            <a:avLst/>
+          </a:prstGeom>
+          <a:solidFill>
+            <a:schemeClr val="bg2">
+              <a:lumMod val="25000"/>
+              <a:alpha val="36863"/>
+            </a:schemeClr>
+          </a:solidFill>
+          <a:ln>
+            <a:solidFill>
+              <a:srgbClr val="000000">
+                <a:alpha val="25882"/>
+              </a:srgbClr>
+            </a:solidFill>
+          </a:ln>
+          <a:effectLst>
+            <a:outerShdw blurRad="50800" dist="38100" dir="13500000" algn="br" rotWithShape="0">
+              <a:prstClr val="black">
+                <a:alpha val="40000"/>
+              </a:prstClr>
+            </a:outerShdw>
+          </a:effectLst>
+        </p:spPr>
+        <p:txBody>
+          <a:bodyPr wrap="square" rtlCol="0">
+            <a:spAutoFit/>
+          </a:bodyPr>
+          <a:lstStyle/>
+          <a:p>
+            <a:pPr algn="ctr"/>
+            <a:r>
+              <a:rPr lang="en-US" sz="4400" dirty="0">
+                <a:solidFill>
+                  <a:srgbClr val="FFFF00"/>
+                </a:solidFill>
+              </a:rPr>
+              <a:t>U</a:t>
+            </a:r>
+          </a:p>
+        </p:txBody>
+      </p:sp>
+      <p:sp>
+        <p:nvSpPr>
+          <p:cNvPr id="10" name="TextBox 9">
+            <a:extLst>
+              <a:ext uri="{FF2B5EF4-FFF2-40B4-BE49-F238E27FC236}">
+                <a16:creationId xmlns:a16="http://schemas.microsoft.com/office/drawing/2014/main" id="{9383E76B-4379-4CA5-A9BB-9EB8EC9718A0}"/>
+              </a:ext>
+            </a:extLst>
+          </p:cNvPr>
+          <p:cNvSpPr txBox="1"/>
+          <p:nvPr/>
+        </p:nvSpPr>
+        <p:spPr>
+          <a:xfrm>
+            <a:off x="1811696" y="2542263"/>
+            <a:ext cx="423832" cy="769441"/>
+          </a:xfrm>
+          <a:prstGeom prst="rect">
+            <a:avLst/>
+          </a:prstGeom>
+          <a:solidFill>
+            <a:schemeClr val="bg2">
+              <a:lumMod val="25000"/>
+              <a:alpha val="36863"/>
+            </a:schemeClr>
+          </a:solidFill>
+          <a:ln>
+            <a:solidFill>
+              <a:srgbClr val="000000">
+                <a:alpha val="25882"/>
+              </a:srgbClr>
+            </a:solidFill>
+          </a:ln>
+          <a:effectLst>
+            <a:outerShdw blurRad="50800" dist="38100" dir="13500000" algn="br" rotWithShape="0">
+              <a:prstClr val="black">
+                <a:alpha val="40000"/>
+              </a:prstClr>
+            </a:outerShdw>
+          </a:effectLst>
+        </p:spPr>
+        <p:txBody>
+          <a:bodyPr wrap="square" rtlCol="0">
+            <a:spAutoFit/>
+          </a:bodyPr>
+          <a:lstStyle/>
+          <a:p>
+            <a:pPr algn="ctr"/>
+            <a:r>
+              <a:rPr lang="en-US" sz="4400" dirty="0">
+                <a:solidFill>
+                  <a:srgbClr val="FFFF00"/>
+                </a:solidFill>
               </a:rPr>
               <a:t>?</a:t>
             </a:r>
@@ -6129,7 +7860,7 @@
     </p:spTree>
     <p:extLst>
       <p:ext uri="{BB962C8B-B14F-4D97-AF65-F5344CB8AC3E}">
-        <p14:creationId xmlns:p14="http://schemas.microsoft.com/office/powerpoint/2010/main" val="3234151335"/>
+        <p14:creationId xmlns:p14="http://schemas.microsoft.com/office/powerpoint/2010/main" val="3490472520"/>
       </p:ext>
     </p:extLst>
   </p:cSld>
@@ -6177,7 +7908,7 @@
         </p:blipFill>
         <p:spPr>
           <a:xfrm>
-            <a:off x="3962400" y="1333499"/>
+            <a:off x="3962400" y="1257299"/>
             <a:ext cx="3638549" cy="3667125"/>
           </a:xfrm>
           <a:prstGeom prst="rect">
@@ -6187,64 +7918,57 @@
       </p:pic>
       <p:sp>
         <p:nvSpPr>
-          <p:cNvPr id="4" name="TextBox 3">
-            <a:extLst>
-              <a:ext uri="{FF2B5EF4-FFF2-40B4-BE49-F238E27FC236}">
-                <a16:creationId xmlns:a16="http://schemas.microsoft.com/office/drawing/2014/main" id="{A58FC557-A667-4323-A120-60DA62E7AC47}"/>
-              </a:ext>
-            </a:extLst>
-          </p:cNvPr>
-          <p:cNvSpPr txBox="1"/>
+          <p:cNvPr id="3" name="Multiplication Sign 2">
+            <a:extLst>
+              <a:ext uri="{FF2B5EF4-FFF2-40B4-BE49-F238E27FC236}">
+                <a16:creationId xmlns:a16="http://schemas.microsoft.com/office/drawing/2014/main" id="{D250D44B-F387-4D84-B7E5-EC1CAE256365}"/>
+              </a:ext>
+            </a:extLst>
+          </p:cNvPr>
+          <p:cNvSpPr/>
           <p:nvPr/>
         </p:nvSpPr>
         <p:spPr>
           <a:xfrm>
-            <a:off x="3867149" y="1658956"/>
-            <a:ext cx="7677150" cy="3016210"/>
+            <a:off x="4090986" y="1643061"/>
+            <a:ext cx="3381375" cy="2895600"/>
           </a:xfrm>
-          <a:prstGeom prst="rect">
+          <a:prstGeom prst="mathMultiply">
             <a:avLst/>
           </a:prstGeom>
-          <a:noFill/>
+          <a:solidFill>
+            <a:srgbClr val="FF0000"/>
+          </a:solidFill>
         </p:spPr>
-        <p:txBody>
-          <a:bodyPr wrap="square" rtlCol="0">
-            <a:spAutoFit/>
-            <a:scene3d>
-              <a:camera prst="orthographicFront"/>
-              <a:lightRig rig="soft" dir="t">
-                <a:rot lat="0" lon="0" rev="15600000"/>
-              </a:lightRig>
-            </a:scene3d>
-            <a:sp3d extrusionH="57150" prstMaterial="softEdge">
-              <a:bevelT w="25400" h="38100"/>
-            </a:sp3d>
-          </a:bodyPr>
-          <a:lstStyle/>
-          <a:p>
-            <a:r>
-              <a:rPr lang="en-US" sz="19000" b="1" dirty="0">
-                <a:ln/>
-                <a:solidFill>
-                  <a:srgbClr val="FFFF00"/>
-                </a:solidFill>
-                <a:effectLst>
-                  <a:outerShdw blurRad="50800" dist="38100" dir="10800000" algn="r" rotWithShape="0">
-                    <a:prstClr val="black">
-                      <a:alpha val="40000"/>
-                    </a:prstClr>
-                  </a:outerShdw>
-                </a:effectLst>
-              </a:rPr>
-              <a:t>?++</a:t>
-            </a:r>
+        <p:style>
+          <a:lnRef idx="2">
+            <a:schemeClr val="accent1">
+              <a:shade val="50000"/>
+            </a:schemeClr>
+          </a:lnRef>
+          <a:fillRef idx="1">
+            <a:schemeClr val="accent1"/>
+          </a:fillRef>
+          <a:effectRef idx="0">
+            <a:schemeClr val="accent1"/>
+          </a:effectRef>
+          <a:fontRef idx="minor">
+            <a:schemeClr val="lt1"/>
+          </a:fontRef>
+        </p:style>
+        <p:txBody>
+          <a:bodyPr rtlCol="0" anchor="ctr"/>
+          <a:lstStyle/>
+          <a:p>
+            <a:pPr algn="ctr"/>
+            <a:endParaRPr lang="en-US"/>
           </a:p>
         </p:txBody>
       </p:sp>
     </p:spTree>
     <p:extLst>
       <p:ext uri="{BB962C8B-B14F-4D97-AF65-F5344CB8AC3E}">
-        <p14:creationId xmlns:p14="http://schemas.microsoft.com/office/powerpoint/2010/main" val="1323239356"/>
+        <p14:creationId xmlns:p14="http://schemas.microsoft.com/office/powerpoint/2010/main" val="1157997097"/>
       </p:ext>
     </p:extLst>
   </p:cSld>
@@ -6276,7 +8000,7 @@
           <p:cNvPr id="2" name="Picture 1">
             <a:extLst>
               <a:ext uri="{FF2B5EF4-FFF2-40B4-BE49-F238E27FC236}">
-                <a16:creationId xmlns:a16="http://schemas.microsoft.com/office/drawing/2014/main" id="{3F346B1C-146E-40B6-A156-9ECCC04E1773}"/>
+                <a16:creationId xmlns:a16="http://schemas.microsoft.com/office/drawing/2014/main" id="{810E4F26-075C-4F8E-B53A-135C51CBBCEC}"/>
               </a:ext>
             </a:extLst>
           </p:cNvPr>
@@ -6287,13 +8011,13 @@
         </p:nvPicPr>
         <p:blipFill rotWithShape="1">
           <a:blip r:embed="rId3"/>
-          <a:srcRect l="18443" t="8911" r="39760" b="52305"/>
+          <a:srcRect l="22135" t="582" r="23110" b="44060"/>
           <a:stretch/>
         </p:blipFill>
         <p:spPr>
           <a:xfrm>
-            <a:off x="4476751" y="2170750"/>
-            <a:ext cx="3035300" cy="2807650"/>
+            <a:off x="3962400" y="1257299"/>
+            <a:ext cx="3638549" cy="3667125"/>
           </a:xfrm>
           <a:prstGeom prst="rect">
             <a:avLst/>
@@ -6302,54 +8026,57 @@
       </p:pic>
       <p:sp>
         <p:nvSpPr>
-          <p:cNvPr id="6" name="TextBox 5">
-            <a:extLst>
-              <a:ext uri="{FF2B5EF4-FFF2-40B4-BE49-F238E27FC236}">
-                <a16:creationId xmlns:a16="http://schemas.microsoft.com/office/drawing/2014/main" id="{87D1A4C1-2E5C-4DB8-B708-131FAA7844C9}"/>
-              </a:ext>
-            </a:extLst>
-          </p:cNvPr>
-          <p:cNvSpPr txBox="1"/>
+          <p:cNvPr id="5" name="Rectangle 4">
+            <a:extLst>
+              <a:ext uri="{FF2B5EF4-FFF2-40B4-BE49-F238E27FC236}">
+                <a16:creationId xmlns:a16="http://schemas.microsoft.com/office/drawing/2014/main" id="{9C9D6F7C-D5B3-4ED3-A70C-9007FE21517F}"/>
+              </a:ext>
+            </a:extLst>
+          </p:cNvPr>
+          <p:cNvSpPr/>
           <p:nvPr/>
         </p:nvSpPr>
         <p:spPr>
           <a:xfrm>
-            <a:off x="5476874" y="2643551"/>
-            <a:ext cx="2886075" cy="1862048"/>
+            <a:off x="4010025" y="2981325"/>
+            <a:ext cx="3533774" cy="209550"/>
           </a:xfrm>
           <a:prstGeom prst="rect">
             <a:avLst/>
           </a:prstGeom>
-          <a:noFill/>
+          <a:solidFill>
+            <a:srgbClr val="FF0000"/>
+          </a:solidFill>
         </p:spPr>
-        <p:txBody>
-          <a:bodyPr wrap="square" rtlCol="0">
-            <a:spAutoFit/>
-          </a:bodyPr>
-          <a:lstStyle/>
-          <a:p>
-            <a:r>
-              <a:rPr lang="en-US" sz="11500" dirty="0">
-                <a:solidFill>
-                  <a:srgbClr val="FFFF00"/>
-                </a:solidFill>
-                <a:effectLst>
-                  <a:outerShdw blurRad="50800" dist="38100" dir="10800000" algn="r" rotWithShape="0">
-                    <a:prstClr val="black">
-                      <a:alpha val="40000"/>
-                    </a:prstClr>
-                  </a:outerShdw>
-                </a:effectLst>
-              </a:rPr>
-              <a:t>?</a:t>
-            </a:r>
+        <p:style>
+          <a:lnRef idx="2">
+            <a:schemeClr val="accent1">
+              <a:shade val="50000"/>
+            </a:schemeClr>
+          </a:lnRef>
+          <a:fillRef idx="1">
+            <a:schemeClr val="accent1"/>
+          </a:fillRef>
+          <a:effectRef idx="0">
+            <a:schemeClr val="accent1"/>
+          </a:effectRef>
+          <a:fontRef idx="minor">
+            <a:schemeClr val="lt1"/>
+          </a:fontRef>
+        </p:style>
+        <p:txBody>
+          <a:bodyPr rtlCol="0" anchor="ctr"/>
+          <a:lstStyle/>
+          <a:p>
+            <a:pPr algn="ctr"/>
+            <a:endParaRPr lang="en-US"/>
           </a:p>
         </p:txBody>
       </p:sp>
     </p:spTree>
     <p:extLst>
       <p:ext uri="{BB962C8B-B14F-4D97-AF65-F5344CB8AC3E}">
-        <p14:creationId xmlns:p14="http://schemas.microsoft.com/office/powerpoint/2010/main" val="3255219281"/>
+        <p14:creationId xmlns:p14="http://schemas.microsoft.com/office/powerpoint/2010/main" val="872767627"/>
       </p:ext>
     </p:extLst>
   </p:cSld>

</xml_diff>

<commit_message>
Cleanup and PPT Art updates
</commit_message>
<xml_diff>
--- a/Art/SpellImageWork.pptx
+++ b/Art/SpellImageWork.pptx
@@ -5,26 +5,27 @@
     <p:sldMasterId id="2147483648" r:id="rId1"/>
   </p:sldMasterIdLst>
   <p:notesMasterIdLst>
-    <p:notesMasterId r:id="rId19"/>
+    <p:notesMasterId r:id="rId20"/>
   </p:notesMasterIdLst>
   <p:sldIdLst>
-    <p:sldId id="257" r:id="rId2"/>
-    <p:sldId id="269" r:id="rId3"/>
-    <p:sldId id="270" r:id="rId4"/>
-    <p:sldId id="271" r:id="rId5"/>
-    <p:sldId id="261" r:id="rId6"/>
-    <p:sldId id="268" r:id="rId7"/>
-    <p:sldId id="262" r:id="rId8"/>
-    <p:sldId id="272" r:id="rId9"/>
-    <p:sldId id="263" r:id="rId10"/>
-    <p:sldId id="265" r:id="rId11"/>
-    <p:sldId id="264" r:id="rId12"/>
-    <p:sldId id="266" r:id="rId13"/>
-    <p:sldId id="258" r:id="rId14"/>
-    <p:sldId id="267" r:id="rId15"/>
-    <p:sldId id="259" r:id="rId16"/>
-    <p:sldId id="260" r:id="rId17"/>
-    <p:sldId id="256" r:id="rId18"/>
+    <p:sldId id="273" r:id="rId2"/>
+    <p:sldId id="257" r:id="rId3"/>
+    <p:sldId id="269" r:id="rId4"/>
+    <p:sldId id="270" r:id="rId5"/>
+    <p:sldId id="271" r:id="rId6"/>
+    <p:sldId id="261" r:id="rId7"/>
+    <p:sldId id="268" r:id="rId8"/>
+    <p:sldId id="262" r:id="rId9"/>
+    <p:sldId id="272" r:id="rId10"/>
+    <p:sldId id="263" r:id="rId11"/>
+    <p:sldId id="265" r:id="rId12"/>
+    <p:sldId id="264" r:id="rId13"/>
+    <p:sldId id="266" r:id="rId14"/>
+    <p:sldId id="258" r:id="rId15"/>
+    <p:sldId id="267" r:id="rId16"/>
+    <p:sldId id="259" r:id="rId17"/>
+    <p:sldId id="260" r:id="rId18"/>
+    <p:sldId id="256" r:id="rId19"/>
   </p:sldIdLst>
   <p:sldSz cx="12192000" cy="6858000"/>
   <p:notesSz cx="6858000" cy="9144000"/>
@@ -217,7 +218,7 @@
           <a:p>
             <a:fld id="{885F340B-B2F0-44D2-B94A-CA6CE60D6424}" type="datetimeFigureOut">
               <a:rPr lang="en-US" smtClean="0"/>
-              <a:t>11/29/2017</a:t>
+              <a:t>12/6/2017</a:t>
             </a:fld>
             <a:endParaRPr lang="en-US"/>
           </a:p>
@@ -558,7 +559,7 @@
     </p:spTree>
     <p:extLst>
       <p:ext uri="{BB962C8B-B14F-4D97-AF65-F5344CB8AC3E}">
-        <p14:creationId xmlns:p14="http://schemas.microsoft.com/office/powerpoint/2010/main" val="3469315353"/>
+        <p14:creationId xmlns:p14="http://schemas.microsoft.com/office/powerpoint/2010/main" val="348541555"/>
       </p:ext>
     </p:extLst>
   </p:cSld>
@@ -642,7 +643,7 @@
     </p:spTree>
     <p:extLst>
       <p:ext uri="{BB962C8B-B14F-4D97-AF65-F5344CB8AC3E}">
-        <p14:creationId xmlns:p14="http://schemas.microsoft.com/office/powerpoint/2010/main" val="3071738978"/>
+        <p14:creationId xmlns:p14="http://schemas.microsoft.com/office/powerpoint/2010/main" val="1609716475"/>
       </p:ext>
     </p:extLst>
   </p:cSld>
@@ -726,7 +727,7 @@
     </p:spTree>
     <p:extLst>
       <p:ext uri="{BB962C8B-B14F-4D97-AF65-F5344CB8AC3E}">
-        <p14:creationId xmlns:p14="http://schemas.microsoft.com/office/powerpoint/2010/main" val="3507851252"/>
+        <p14:creationId xmlns:p14="http://schemas.microsoft.com/office/powerpoint/2010/main" val="3071738978"/>
       </p:ext>
     </p:extLst>
   </p:cSld>
@@ -810,7 +811,7 @@
     </p:spTree>
     <p:extLst>
       <p:ext uri="{BB962C8B-B14F-4D97-AF65-F5344CB8AC3E}">
-        <p14:creationId xmlns:p14="http://schemas.microsoft.com/office/powerpoint/2010/main" val="2227256533"/>
+        <p14:creationId xmlns:p14="http://schemas.microsoft.com/office/powerpoint/2010/main" val="3507851252"/>
       </p:ext>
     </p:extLst>
   </p:cSld>
@@ -894,7 +895,7 @@
     </p:spTree>
     <p:extLst>
       <p:ext uri="{BB962C8B-B14F-4D97-AF65-F5344CB8AC3E}">
-        <p14:creationId xmlns:p14="http://schemas.microsoft.com/office/powerpoint/2010/main" val="937330666"/>
+        <p14:creationId xmlns:p14="http://schemas.microsoft.com/office/powerpoint/2010/main" val="2227256533"/>
       </p:ext>
     </p:extLst>
   </p:cSld>
@@ -978,7 +979,7 @@
     </p:spTree>
     <p:extLst>
       <p:ext uri="{BB962C8B-B14F-4D97-AF65-F5344CB8AC3E}">
-        <p14:creationId xmlns:p14="http://schemas.microsoft.com/office/powerpoint/2010/main" val="1181008352"/>
+        <p14:creationId xmlns:p14="http://schemas.microsoft.com/office/powerpoint/2010/main" val="937330666"/>
       </p:ext>
     </p:extLst>
   </p:cSld>
@@ -1062,7 +1063,7 @@
     </p:spTree>
     <p:extLst>
       <p:ext uri="{BB962C8B-B14F-4D97-AF65-F5344CB8AC3E}">
-        <p14:creationId xmlns:p14="http://schemas.microsoft.com/office/powerpoint/2010/main" val="1616101520"/>
+        <p14:creationId xmlns:p14="http://schemas.microsoft.com/office/powerpoint/2010/main" val="1181008352"/>
       </p:ext>
     </p:extLst>
   </p:cSld>
@@ -1146,7 +1147,7 @@
     </p:spTree>
     <p:extLst>
       <p:ext uri="{BB962C8B-B14F-4D97-AF65-F5344CB8AC3E}">
-        <p14:creationId xmlns:p14="http://schemas.microsoft.com/office/powerpoint/2010/main" val="1211650007"/>
+        <p14:creationId xmlns:p14="http://schemas.microsoft.com/office/powerpoint/2010/main" val="1616101520"/>
       </p:ext>
     </p:extLst>
   </p:cSld>
@@ -1222,6 +1223,90 @@
             <a:fld id="{5B19FFF6-9D3A-43A2-9BC5-0E29ACA647E9}" type="slidenum">
               <a:rPr lang="en-US" smtClean="0"/>
               <a:t>17</a:t>
+            </a:fld>
+            <a:endParaRPr lang="en-US"/>
+          </a:p>
+        </p:txBody>
+      </p:sp>
+    </p:spTree>
+    <p:extLst>
+      <p:ext uri="{BB962C8B-B14F-4D97-AF65-F5344CB8AC3E}">
+        <p14:creationId xmlns:p14="http://schemas.microsoft.com/office/powerpoint/2010/main" val="1211650007"/>
+      </p:ext>
+    </p:extLst>
+  </p:cSld>
+  <p:clrMapOvr>
+    <a:masterClrMapping/>
+  </p:clrMapOvr>
+</p:notes>
+</file>
+
+<file path=ppt/notesSlides/notesSlide18.xml><?xml version="1.0" encoding="utf-8"?>
+<p:notes xmlns:a="http://schemas.openxmlformats.org/drawingml/2006/main" xmlns:r="http://schemas.openxmlformats.org/officeDocument/2006/relationships" xmlns:p="http://schemas.openxmlformats.org/presentationml/2006/main">
+  <p:cSld>
+    <p:spTree>
+      <p:nvGrpSpPr>
+        <p:cNvPr id="1" name=""/>
+        <p:cNvGrpSpPr/>
+        <p:nvPr/>
+      </p:nvGrpSpPr>
+      <p:grpSpPr>
+        <a:xfrm>
+          <a:off x="0" y="0"/>
+          <a:ext cx="0" cy="0"/>
+          <a:chOff x="0" y="0"/>
+          <a:chExt cx="0" cy="0"/>
+        </a:xfrm>
+      </p:grpSpPr>
+      <p:sp>
+        <p:nvSpPr>
+          <p:cNvPr id="2" name="Slide Image Placeholder 1"/>
+          <p:cNvSpPr>
+            <a:spLocks noGrp="1" noRot="1" noChangeAspect="1"/>
+          </p:cNvSpPr>
+          <p:nvPr>
+            <p:ph type="sldImg"/>
+          </p:nvPr>
+        </p:nvSpPr>
+        <p:spPr/>
+      </p:sp>
+      <p:sp>
+        <p:nvSpPr>
+          <p:cNvPr id="3" name="Notes Placeholder 2"/>
+          <p:cNvSpPr>
+            <a:spLocks noGrp="1"/>
+          </p:cNvSpPr>
+          <p:nvPr>
+            <p:ph type="body" idx="1"/>
+          </p:nvPr>
+        </p:nvSpPr>
+        <p:spPr/>
+        <p:txBody>
+          <a:bodyPr/>
+          <a:lstStyle/>
+          <a:p>
+            <a:endParaRPr lang="en-US"/>
+          </a:p>
+        </p:txBody>
+      </p:sp>
+      <p:sp>
+        <p:nvSpPr>
+          <p:cNvPr id="4" name="Slide Number Placeholder 3"/>
+          <p:cNvSpPr>
+            <a:spLocks noGrp="1"/>
+          </p:cNvSpPr>
+          <p:nvPr>
+            <p:ph type="sldNum" sz="quarter" idx="10"/>
+          </p:nvPr>
+        </p:nvSpPr>
+        <p:spPr/>
+        <p:txBody>
+          <a:bodyPr/>
+          <a:lstStyle/>
+          <a:p>
+            <a:fld id="{5B19FFF6-9D3A-43A2-9BC5-0E29ACA647E9}" type="slidenum">
+              <a:rPr lang="en-US" smtClean="0"/>
+              <a:t>18</a:t>
             </a:fld>
             <a:endParaRPr lang="en-US"/>
           </a:p>
@@ -1314,7 +1399,7 @@
     </p:spTree>
     <p:extLst>
       <p:ext uri="{BB962C8B-B14F-4D97-AF65-F5344CB8AC3E}">
-        <p14:creationId xmlns:p14="http://schemas.microsoft.com/office/powerpoint/2010/main" val="3787906890"/>
+        <p14:creationId xmlns:p14="http://schemas.microsoft.com/office/powerpoint/2010/main" val="3469315353"/>
       </p:ext>
     </p:extLst>
   </p:cSld>
@@ -1398,7 +1483,7 @@
     </p:spTree>
     <p:extLst>
       <p:ext uri="{BB962C8B-B14F-4D97-AF65-F5344CB8AC3E}">
-        <p14:creationId xmlns:p14="http://schemas.microsoft.com/office/powerpoint/2010/main" val="3464537560"/>
+        <p14:creationId xmlns:p14="http://schemas.microsoft.com/office/powerpoint/2010/main" val="3787906890"/>
       </p:ext>
     </p:extLst>
   </p:cSld>
@@ -1482,7 +1567,7 @@
     </p:spTree>
     <p:extLst>
       <p:ext uri="{BB962C8B-B14F-4D97-AF65-F5344CB8AC3E}">
-        <p14:creationId xmlns:p14="http://schemas.microsoft.com/office/powerpoint/2010/main" val="689986934"/>
+        <p14:creationId xmlns:p14="http://schemas.microsoft.com/office/powerpoint/2010/main" val="3464537560"/>
       </p:ext>
     </p:extLst>
   </p:cSld>
@@ -1566,7 +1651,7 @@
     </p:spTree>
     <p:extLst>
       <p:ext uri="{BB962C8B-B14F-4D97-AF65-F5344CB8AC3E}">
-        <p14:creationId xmlns:p14="http://schemas.microsoft.com/office/powerpoint/2010/main" val="1177702451"/>
+        <p14:creationId xmlns:p14="http://schemas.microsoft.com/office/powerpoint/2010/main" val="689986934"/>
       </p:ext>
     </p:extLst>
   </p:cSld>
@@ -1650,7 +1735,7 @@
     </p:spTree>
     <p:extLst>
       <p:ext uri="{BB962C8B-B14F-4D97-AF65-F5344CB8AC3E}">
-        <p14:creationId xmlns:p14="http://schemas.microsoft.com/office/powerpoint/2010/main" val="3218174546"/>
+        <p14:creationId xmlns:p14="http://schemas.microsoft.com/office/powerpoint/2010/main" val="1177702451"/>
       </p:ext>
     </p:extLst>
   </p:cSld>
@@ -1734,7 +1819,7 @@
     </p:spTree>
     <p:extLst>
       <p:ext uri="{BB962C8B-B14F-4D97-AF65-F5344CB8AC3E}">
-        <p14:creationId xmlns:p14="http://schemas.microsoft.com/office/powerpoint/2010/main" val="612743181"/>
+        <p14:creationId xmlns:p14="http://schemas.microsoft.com/office/powerpoint/2010/main" val="3218174546"/>
       </p:ext>
     </p:extLst>
   </p:cSld>
@@ -1818,7 +1903,7 @@
     </p:spTree>
     <p:extLst>
       <p:ext uri="{BB962C8B-B14F-4D97-AF65-F5344CB8AC3E}">
-        <p14:creationId xmlns:p14="http://schemas.microsoft.com/office/powerpoint/2010/main" val="2614273936"/>
+        <p14:creationId xmlns:p14="http://schemas.microsoft.com/office/powerpoint/2010/main" val="612743181"/>
       </p:ext>
     </p:extLst>
   </p:cSld>
@@ -1902,7 +1987,7 @@
     </p:spTree>
     <p:extLst>
       <p:ext uri="{BB962C8B-B14F-4D97-AF65-F5344CB8AC3E}">
-        <p14:creationId xmlns:p14="http://schemas.microsoft.com/office/powerpoint/2010/main" val="1609716475"/>
+        <p14:creationId xmlns:p14="http://schemas.microsoft.com/office/powerpoint/2010/main" val="2614273936"/>
       </p:ext>
     </p:extLst>
   </p:cSld>
@@ -2059,7 +2144,7 @@
           <a:p>
             <a:fld id="{705F61FD-B4C5-4C11-9C2B-341349F118F3}" type="datetimeFigureOut">
               <a:rPr lang="en-US" smtClean="0"/>
-              <a:t>11/29/2017</a:t>
+              <a:t>12/6/2017</a:t>
             </a:fld>
             <a:endParaRPr lang="en-US"/>
           </a:p>
@@ -2257,7 +2342,7 @@
           <a:p>
             <a:fld id="{705F61FD-B4C5-4C11-9C2B-341349F118F3}" type="datetimeFigureOut">
               <a:rPr lang="en-US" smtClean="0"/>
-              <a:t>11/29/2017</a:t>
+              <a:t>12/6/2017</a:t>
             </a:fld>
             <a:endParaRPr lang="en-US"/>
           </a:p>
@@ -2465,7 +2550,7 @@
           <a:p>
             <a:fld id="{705F61FD-B4C5-4C11-9C2B-341349F118F3}" type="datetimeFigureOut">
               <a:rPr lang="en-US" smtClean="0"/>
-              <a:t>11/29/2017</a:t>
+              <a:t>12/6/2017</a:t>
             </a:fld>
             <a:endParaRPr lang="en-US"/>
           </a:p>
@@ -2663,7 +2748,7 @@
           <a:p>
             <a:fld id="{705F61FD-B4C5-4C11-9C2B-341349F118F3}" type="datetimeFigureOut">
               <a:rPr lang="en-US" smtClean="0"/>
-              <a:t>11/29/2017</a:t>
+              <a:t>12/6/2017</a:t>
             </a:fld>
             <a:endParaRPr lang="en-US"/>
           </a:p>
@@ -2938,7 +3023,7 @@
           <a:p>
             <a:fld id="{705F61FD-B4C5-4C11-9C2B-341349F118F3}" type="datetimeFigureOut">
               <a:rPr lang="en-US" smtClean="0"/>
-              <a:t>11/29/2017</a:t>
+              <a:t>12/6/2017</a:t>
             </a:fld>
             <a:endParaRPr lang="en-US"/>
           </a:p>
@@ -3203,7 +3288,7 @@
           <a:p>
             <a:fld id="{705F61FD-B4C5-4C11-9C2B-341349F118F3}" type="datetimeFigureOut">
               <a:rPr lang="en-US" smtClean="0"/>
-              <a:t>11/29/2017</a:t>
+              <a:t>12/6/2017</a:t>
             </a:fld>
             <a:endParaRPr lang="en-US"/>
           </a:p>
@@ -3615,7 +3700,7 @@
           <a:p>
             <a:fld id="{705F61FD-B4C5-4C11-9C2B-341349F118F3}" type="datetimeFigureOut">
               <a:rPr lang="en-US" smtClean="0"/>
-              <a:t>11/29/2017</a:t>
+              <a:t>12/6/2017</a:t>
             </a:fld>
             <a:endParaRPr lang="en-US"/>
           </a:p>
@@ -3756,7 +3841,7 @@
           <a:p>
             <a:fld id="{705F61FD-B4C5-4C11-9C2B-341349F118F3}" type="datetimeFigureOut">
               <a:rPr lang="en-US" smtClean="0"/>
-              <a:t>11/29/2017</a:t>
+              <a:t>12/6/2017</a:t>
             </a:fld>
             <a:endParaRPr lang="en-US"/>
           </a:p>
@@ -3869,7 +3954,7 @@
           <a:p>
             <a:fld id="{705F61FD-B4C5-4C11-9C2B-341349F118F3}" type="datetimeFigureOut">
               <a:rPr lang="en-US" smtClean="0"/>
-              <a:t>11/29/2017</a:t>
+              <a:t>12/6/2017</a:t>
             </a:fld>
             <a:endParaRPr lang="en-US"/>
           </a:p>
@@ -4180,7 +4265,7 @@
           <a:p>
             <a:fld id="{705F61FD-B4C5-4C11-9C2B-341349F118F3}" type="datetimeFigureOut">
               <a:rPr lang="en-US" smtClean="0"/>
-              <a:t>11/29/2017</a:t>
+              <a:t>12/6/2017</a:t>
             </a:fld>
             <a:endParaRPr lang="en-US"/>
           </a:p>
@@ -4468,7 +4553,7 @@
           <a:p>
             <a:fld id="{705F61FD-B4C5-4C11-9C2B-341349F118F3}" type="datetimeFigureOut">
               <a:rPr lang="en-US" smtClean="0"/>
-              <a:t>11/29/2017</a:t>
+              <a:t>12/6/2017</a:t>
             </a:fld>
             <a:endParaRPr lang="en-US"/>
           </a:p>
@@ -4709,7 +4794,7 @@
           <a:p>
             <a:fld id="{705F61FD-B4C5-4C11-9C2B-341349F118F3}" type="datetimeFigureOut">
               <a:rPr lang="en-US" smtClean="0"/>
-              <a:t>11/29/2017</a:t>
+              <a:t>12/6/2017</a:t>
             </a:fld>
             <a:endParaRPr lang="en-US"/>
           </a:p>
@@ -5126,6 +5211,1237 @@
           <a:chExt cx="0" cy="0"/>
         </a:xfrm>
       </p:grpSpPr>
+      <p:sp>
+        <p:nvSpPr>
+          <p:cNvPr id="5" name="Rectangle 4">
+            <a:extLst>
+              <a:ext uri="{FF2B5EF4-FFF2-40B4-BE49-F238E27FC236}">
+                <a16:creationId xmlns:a16="http://schemas.microsoft.com/office/drawing/2014/main" id="{F82BDAA7-AEB6-480A-BB48-ECACB9BD6187}"/>
+              </a:ext>
+            </a:extLst>
+          </p:cNvPr>
+          <p:cNvSpPr/>
+          <p:nvPr/>
+        </p:nvSpPr>
+        <p:spPr>
+          <a:xfrm>
+            <a:off x="2352907" y="747132"/>
+            <a:ext cx="5675971" cy="4438185"/>
+          </a:xfrm>
+          <a:prstGeom prst="rect">
+            <a:avLst/>
+          </a:prstGeom>
+          <a:solidFill>
+            <a:schemeClr val="tx1"/>
+          </a:solidFill>
+        </p:spPr>
+        <p:style>
+          <a:lnRef idx="2">
+            <a:schemeClr val="accent1">
+              <a:shade val="50000"/>
+            </a:schemeClr>
+          </a:lnRef>
+          <a:fillRef idx="1">
+            <a:schemeClr val="accent1"/>
+          </a:fillRef>
+          <a:effectRef idx="0">
+            <a:schemeClr val="accent1"/>
+          </a:effectRef>
+          <a:fontRef idx="minor">
+            <a:schemeClr val="lt1"/>
+          </a:fontRef>
+        </p:style>
+        <p:txBody>
+          <a:bodyPr rtlCol="0" anchor="ctr"/>
+          <a:lstStyle/>
+          <a:p>
+            <a:pPr algn="ctr"/>
+            <a:endParaRPr lang="en-US"/>
+          </a:p>
+        </p:txBody>
+      </p:sp>
+      <p:sp>
+        <p:nvSpPr>
+          <p:cNvPr id="2" name="Rectangle 1">
+            <a:extLst>
+              <a:ext uri="{FF2B5EF4-FFF2-40B4-BE49-F238E27FC236}">
+                <a16:creationId xmlns:a16="http://schemas.microsoft.com/office/drawing/2014/main" id="{4640F013-6274-48A2-8C75-00AF7FFE0617}"/>
+              </a:ext>
+            </a:extLst>
+          </p:cNvPr>
+          <p:cNvSpPr/>
+          <p:nvPr/>
+        </p:nvSpPr>
+        <p:spPr>
+          <a:xfrm>
+            <a:off x="4661210" y="2888166"/>
+            <a:ext cx="925551" cy="167268"/>
+          </a:xfrm>
+          <a:prstGeom prst="rect">
+            <a:avLst/>
+          </a:prstGeom>
+        </p:spPr>
+        <p:style>
+          <a:lnRef idx="2">
+            <a:schemeClr val="dk1"/>
+          </a:lnRef>
+          <a:fillRef idx="1">
+            <a:schemeClr val="lt1"/>
+          </a:fillRef>
+          <a:effectRef idx="0">
+            <a:schemeClr val="dk1"/>
+          </a:effectRef>
+          <a:fontRef idx="minor">
+            <a:schemeClr val="dk1"/>
+          </a:fontRef>
+        </p:style>
+        <p:txBody>
+          <a:bodyPr rtlCol="0" anchor="ctr"/>
+          <a:lstStyle/>
+          <a:p>
+            <a:pPr algn="ctr"/>
+            <a:endParaRPr lang="en-US"/>
+          </a:p>
+        </p:txBody>
+      </p:sp>
+      <p:sp>
+        <p:nvSpPr>
+          <p:cNvPr id="3" name="Flowchart: Delay 2">
+            <a:extLst>
+              <a:ext uri="{FF2B5EF4-FFF2-40B4-BE49-F238E27FC236}">
+                <a16:creationId xmlns:a16="http://schemas.microsoft.com/office/drawing/2014/main" id="{2C87A8D5-78E4-473B-BD19-442DBEA084C0}"/>
+              </a:ext>
+            </a:extLst>
+          </p:cNvPr>
+          <p:cNvSpPr/>
+          <p:nvPr/>
+        </p:nvSpPr>
+        <p:spPr>
+          <a:xfrm rot="16200000">
+            <a:off x="5040350" y="2263695"/>
+            <a:ext cx="167269" cy="925551"/>
+          </a:xfrm>
+          <a:prstGeom prst="flowChartDelay">
+            <a:avLst/>
+          </a:prstGeom>
+        </p:spPr>
+        <p:style>
+          <a:lnRef idx="2">
+            <a:schemeClr val="dk1"/>
+          </a:lnRef>
+          <a:fillRef idx="1">
+            <a:schemeClr val="lt1"/>
+          </a:fillRef>
+          <a:effectRef idx="0">
+            <a:schemeClr val="dk1"/>
+          </a:effectRef>
+          <a:fontRef idx="minor">
+            <a:schemeClr val="dk1"/>
+          </a:fontRef>
+        </p:style>
+        <p:txBody>
+          <a:bodyPr rtlCol="0" anchor="ctr"/>
+          <a:lstStyle/>
+          <a:p>
+            <a:pPr algn="ctr"/>
+            <a:endParaRPr lang="en-US"/>
+          </a:p>
+        </p:txBody>
+      </p:sp>
+      <p:sp>
+        <p:nvSpPr>
+          <p:cNvPr id="4" name="Flowchart: Delay 3">
+            <a:extLst>
+              <a:ext uri="{FF2B5EF4-FFF2-40B4-BE49-F238E27FC236}">
+                <a16:creationId xmlns:a16="http://schemas.microsoft.com/office/drawing/2014/main" id="{26A7524A-1E67-4D17-B54E-FA9B5444B4BC}"/>
+              </a:ext>
+            </a:extLst>
+          </p:cNvPr>
+          <p:cNvSpPr/>
+          <p:nvPr/>
+        </p:nvSpPr>
+        <p:spPr>
+          <a:xfrm rot="5400000" flipV="1">
+            <a:off x="5040350" y="2754354"/>
+            <a:ext cx="167270" cy="925551"/>
+          </a:xfrm>
+          <a:prstGeom prst="flowChartDelay">
+            <a:avLst/>
+          </a:prstGeom>
+        </p:spPr>
+        <p:style>
+          <a:lnRef idx="2">
+            <a:schemeClr val="dk1"/>
+          </a:lnRef>
+          <a:fillRef idx="1">
+            <a:schemeClr val="lt1"/>
+          </a:fillRef>
+          <a:effectRef idx="0">
+            <a:schemeClr val="dk1"/>
+          </a:effectRef>
+          <a:fontRef idx="minor">
+            <a:schemeClr val="dk1"/>
+          </a:fontRef>
+        </p:style>
+        <p:txBody>
+          <a:bodyPr rtlCol="0" anchor="ctr"/>
+          <a:lstStyle/>
+          <a:p>
+            <a:pPr algn="ctr"/>
+            <a:endParaRPr lang="en-US"/>
+          </a:p>
+        </p:txBody>
+      </p:sp>
+    </p:spTree>
+    <p:extLst>
+      <p:ext uri="{BB962C8B-B14F-4D97-AF65-F5344CB8AC3E}">
+        <p14:creationId xmlns:p14="http://schemas.microsoft.com/office/powerpoint/2010/main" val="2843766234"/>
+      </p:ext>
+    </p:extLst>
+  </p:cSld>
+  <p:clrMapOvr>
+    <a:masterClrMapping/>
+  </p:clrMapOvr>
+</p:sld>
+</file>
+
+<file path=ppt/slides/slide10.xml><?xml version="1.0" encoding="utf-8"?>
+<p:sld xmlns:a="http://schemas.openxmlformats.org/drawingml/2006/main" xmlns:r="http://schemas.openxmlformats.org/officeDocument/2006/relationships" xmlns:p="http://schemas.openxmlformats.org/presentationml/2006/main">
+  <p:cSld>
+    <p:spTree>
+      <p:nvGrpSpPr>
+        <p:cNvPr id="1" name=""/>
+        <p:cNvGrpSpPr/>
+        <p:nvPr/>
+      </p:nvGrpSpPr>
+      <p:grpSpPr>
+        <a:xfrm>
+          <a:off x="0" y="0"/>
+          <a:ext cx="0" cy="0"/>
+          <a:chOff x="0" y="0"/>
+          <a:chExt cx="0" cy="0"/>
+        </a:xfrm>
+      </p:grpSpPr>
+      <p:pic>
+        <p:nvPicPr>
+          <p:cNvPr id="2" name="Picture 1">
+            <a:extLst>
+              <a:ext uri="{FF2B5EF4-FFF2-40B4-BE49-F238E27FC236}">
+                <a16:creationId xmlns:a16="http://schemas.microsoft.com/office/drawing/2014/main" id="{810E4F26-075C-4F8E-B53A-135C51CBBCEC}"/>
+              </a:ext>
+            </a:extLst>
+          </p:cNvPr>
+          <p:cNvPicPr>
+            <a:picLocks noChangeAspect="1"/>
+          </p:cNvPicPr>
+          <p:nvPr/>
+        </p:nvPicPr>
+        <p:blipFill rotWithShape="1">
+          <a:blip r:embed="rId3"/>
+          <a:srcRect l="22135" t="582" r="23110" b="44060"/>
+          <a:stretch/>
+        </p:blipFill>
+        <p:spPr>
+          <a:xfrm>
+            <a:off x="3962400" y="1257299"/>
+            <a:ext cx="3638549" cy="3667125"/>
+          </a:xfrm>
+          <a:prstGeom prst="rect">
+            <a:avLst/>
+          </a:prstGeom>
+        </p:spPr>
+      </p:pic>
+      <p:sp>
+        <p:nvSpPr>
+          <p:cNvPr id="5" name="Rectangle 4">
+            <a:extLst>
+              <a:ext uri="{FF2B5EF4-FFF2-40B4-BE49-F238E27FC236}">
+                <a16:creationId xmlns:a16="http://schemas.microsoft.com/office/drawing/2014/main" id="{9C9D6F7C-D5B3-4ED3-A70C-9007FE21517F}"/>
+              </a:ext>
+            </a:extLst>
+          </p:cNvPr>
+          <p:cNvSpPr/>
+          <p:nvPr/>
+        </p:nvSpPr>
+        <p:spPr>
+          <a:xfrm>
+            <a:off x="4010025" y="2981325"/>
+            <a:ext cx="3533774" cy="209550"/>
+          </a:xfrm>
+          <a:prstGeom prst="rect">
+            <a:avLst/>
+          </a:prstGeom>
+          <a:solidFill>
+            <a:srgbClr val="FF0000"/>
+          </a:solidFill>
+        </p:spPr>
+        <p:style>
+          <a:lnRef idx="2">
+            <a:schemeClr val="accent1">
+              <a:shade val="50000"/>
+            </a:schemeClr>
+          </a:lnRef>
+          <a:fillRef idx="1">
+            <a:schemeClr val="accent1"/>
+          </a:fillRef>
+          <a:effectRef idx="0">
+            <a:schemeClr val="accent1"/>
+          </a:effectRef>
+          <a:fontRef idx="minor">
+            <a:schemeClr val="lt1"/>
+          </a:fontRef>
+        </p:style>
+        <p:txBody>
+          <a:bodyPr rtlCol="0" anchor="ctr"/>
+          <a:lstStyle/>
+          <a:p>
+            <a:pPr algn="ctr"/>
+            <a:endParaRPr lang="en-US"/>
+          </a:p>
+        </p:txBody>
+      </p:sp>
+    </p:spTree>
+    <p:extLst>
+      <p:ext uri="{BB962C8B-B14F-4D97-AF65-F5344CB8AC3E}">
+        <p14:creationId xmlns:p14="http://schemas.microsoft.com/office/powerpoint/2010/main" val="872767627"/>
+      </p:ext>
+    </p:extLst>
+  </p:cSld>
+  <p:clrMapOvr>
+    <a:masterClrMapping/>
+  </p:clrMapOvr>
+</p:sld>
+</file>
+
+<file path=ppt/slides/slide11.xml><?xml version="1.0" encoding="utf-8"?>
+<p:sld xmlns:a="http://schemas.openxmlformats.org/drawingml/2006/main" xmlns:r="http://schemas.openxmlformats.org/officeDocument/2006/relationships" xmlns:p="http://schemas.openxmlformats.org/presentationml/2006/main">
+  <p:cSld>
+    <p:spTree>
+      <p:nvGrpSpPr>
+        <p:cNvPr id="1" name=""/>
+        <p:cNvGrpSpPr/>
+        <p:nvPr/>
+      </p:nvGrpSpPr>
+      <p:grpSpPr>
+        <a:xfrm>
+          <a:off x="0" y="0"/>
+          <a:ext cx="0" cy="0"/>
+          <a:chOff x="0" y="0"/>
+          <a:chExt cx="0" cy="0"/>
+        </a:xfrm>
+      </p:grpSpPr>
+      <p:pic>
+        <p:nvPicPr>
+          <p:cNvPr id="2" name="Picture 1">
+            <a:extLst>
+              <a:ext uri="{FF2B5EF4-FFF2-40B4-BE49-F238E27FC236}">
+                <a16:creationId xmlns:a16="http://schemas.microsoft.com/office/drawing/2014/main" id="{810E4F26-075C-4F8E-B53A-135C51CBBCEC}"/>
+              </a:ext>
+            </a:extLst>
+          </p:cNvPr>
+          <p:cNvPicPr>
+            <a:picLocks noChangeAspect="1"/>
+          </p:cNvPicPr>
+          <p:nvPr/>
+        </p:nvPicPr>
+        <p:blipFill rotWithShape="1">
+          <a:blip r:embed="rId3"/>
+          <a:srcRect l="22135" t="582" r="23110" b="44060"/>
+          <a:stretch/>
+        </p:blipFill>
+        <p:spPr>
+          <a:xfrm>
+            <a:off x="3962400" y="1257299"/>
+            <a:ext cx="3638549" cy="3667125"/>
+          </a:xfrm>
+          <a:prstGeom prst="rect">
+            <a:avLst/>
+          </a:prstGeom>
+        </p:spPr>
+      </p:pic>
+      <p:sp>
+        <p:nvSpPr>
+          <p:cNvPr id="5" name="Rectangle 4">
+            <a:extLst>
+              <a:ext uri="{FF2B5EF4-FFF2-40B4-BE49-F238E27FC236}">
+                <a16:creationId xmlns:a16="http://schemas.microsoft.com/office/drawing/2014/main" id="{9C9D6F7C-D5B3-4ED3-A70C-9007FE21517F}"/>
+              </a:ext>
+            </a:extLst>
+          </p:cNvPr>
+          <p:cNvSpPr/>
+          <p:nvPr/>
+        </p:nvSpPr>
+        <p:spPr>
+          <a:xfrm rot="5400000">
+            <a:off x="4010025" y="2981325"/>
+            <a:ext cx="3533774" cy="209550"/>
+          </a:xfrm>
+          <a:prstGeom prst="rect">
+            <a:avLst/>
+          </a:prstGeom>
+          <a:solidFill>
+            <a:srgbClr val="FF0000"/>
+          </a:solidFill>
+        </p:spPr>
+        <p:style>
+          <a:lnRef idx="2">
+            <a:schemeClr val="accent1">
+              <a:shade val="50000"/>
+            </a:schemeClr>
+          </a:lnRef>
+          <a:fillRef idx="1">
+            <a:schemeClr val="accent1"/>
+          </a:fillRef>
+          <a:effectRef idx="0">
+            <a:schemeClr val="accent1"/>
+          </a:effectRef>
+          <a:fontRef idx="minor">
+            <a:schemeClr val="lt1"/>
+          </a:fontRef>
+        </p:style>
+        <p:txBody>
+          <a:bodyPr rtlCol="0" anchor="ctr"/>
+          <a:lstStyle/>
+          <a:p>
+            <a:pPr algn="ctr"/>
+            <a:endParaRPr lang="en-US"/>
+          </a:p>
+        </p:txBody>
+      </p:sp>
+    </p:spTree>
+    <p:extLst>
+      <p:ext uri="{BB962C8B-B14F-4D97-AF65-F5344CB8AC3E}">
+        <p14:creationId xmlns:p14="http://schemas.microsoft.com/office/powerpoint/2010/main" val="1572736565"/>
+      </p:ext>
+    </p:extLst>
+  </p:cSld>
+  <p:clrMapOvr>
+    <a:masterClrMapping/>
+  </p:clrMapOvr>
+</p:sld>
+</file>
+
+<file path=ppt/slides/slide12.xml><?xml version="1.0" encoding="utf-8"?>
+<p:sld xmlns:a="http://schemas.openxmlformats.org/drawingml/2006/main" xmlns:r="http://schemas.openxmlformats.org/officeDocument/2006/relationships" xmlns:p="http://schemas.openxmlformats.org/presentationml/2006/main">
+  <p:cSld>
+    <p:spTree>
+      <p:nvGrpSpPr>
+        <p:cNvPr id="1" name=""/>
+        <p:cNvGrpSpPr/>
+        <p:nvPr/>
+      </p:nvGrpSpPr>
+      <p:grpSpPr>
+        <a:xfrm>
+          <a:off x="0" y="0"/>
+          <a:ext cx="0" cy="0"/>
+          <a:chOff x="0" y="0"/>
+          <a:chExt cx="0" cy="0"/>
+        </a:xfrm>
+      </p:grpSpPr>
+      <p:pic>
+        <p:nvPicPr>
+          <p:cNvPr id="2" name="Picture 1">
+            <a:extLst>
+              <a:ext uri="{FF2B5EF4-FFF2-40B4-BE49-F238E27FC236}">
+                <a16:creationId xmlns:a16="http://schemas.microsoft.com/office/drawing/2014/main" id="{810E4F26-075C-4F8E-B53A-135C51CBBCEC}"/>
+              </a:ext>
+            </a:extLst>
+          </p:cNvPr>
+          <p:cNvPicPr>
+            <a:picLocks noChangeAspect="1"/>
+          </p:cNvPicPr>
+          <p:nvPr/>
+        </p:nvPicPr>
+        <p:blipFill rotWithShape="1">
+          <a:blip r:embed="rId3"/>
+          <a:srcRect l="22135" t="582" r="23110" b="44060"/>
+          <a:stretch/>
+        </p:blipFill>
+        <p:spPr>
+          <a:xfrm>
+            <a:off x="3962400" y="1257299"/>
+            <a:ext cx="3638549" cy="3667125"/>
+          </a:xfrm>
+          <a:prstGeom prst="rect">
+            <a:avLst/>
+          </a:prstGeom>
+        </p:spPr>
+      </p:pic>
+      <p:sp>
+        <p:nvSpPr>
+          <p:cNvPr id="4" name="TextBox 3">
+            <a:extLst>
+              <a:ext uri="{FF2B5EF4-FFF2-40B4-BE49-F238E27FC236}">
+                <a16:creationId xmlns:a16="http://schemas.microsoft.com/office/drawing/2014/main" id="{A58FC557-A667-4323-A120-60DA62E7AC47}"/>
+              </a:ext>
+            </a:extLst>
+          </p:cNvPr>
+          <p:cNvSpPr txBox="1"/>
+          <p:nvPr/>
+        </p:nvSpPr>
+        <p:spPr>
+          <a:xfrm>
+            <a:off x="4486274" y="-133099"/>
+            <a:ext cx="2886075" cy="6447919"/>
+          </a:xfrm>
+          <a:prstGeom prst="rect">
+            <a:avLst/>
+          </a:prstGeom>
+          <a:noFill/>
+        </p:spPr>
+        <p:txBody>
+          <a:bodyPr wrap="square" rtlCol="0">
+            <a:spAutoFit/>
+          </a:bodyPr>
+          <a:lstStyle/>
+          <a:p>
+            <a:r>
+              <a:rPr lang="en-US" sz="41300" dirty="0">
+                <a:solidFill>
+                  <a:srgbClr val="FFFF00"/>
+                </a:solidFill>
+                <a:effectLst>
+                  <a:outerShdw blurRad="50800" dist="38100" dir="10800000" algn="r" rotWithShape="0">
+                    <a:prstClr val="black">
+                      <a:alpha val="40000"/>
+                    </a:prstClr>
+                  </a:outerShdw>
+                </a:effectLst>
+              </a:rPr>
+              <a:t>?</a:t>
+            </a:r>
+          </a:p>
+        </p:txBody>
+      </p:sp>
+    </p:spTree>
+    <p:extLst>
+      <p:ext uri="{BB962C8B-B14F-4D97-AF65-F5344CB8AC3E}">
+        <p14:creationId xmlns:p14="http://schemas.microsoft.com/office/powerpoint/2010/main" val="3234151335"/>
+      </p:ext>
+    </p:extLst>
+  </p:cSld>
+  <p:clrMapOvr>
+    <a:masterClrMapping/>
+  </p:clrMapOvr>
+</p:sld>
+</file>
+
+<file path=ppt/slides/slide13.xml><?xml version="1.0" encoding="utf-8"?>
+<p:sld xmlns:a="http://schemas.openxmlformats.org/drawingml/2006/main" xmlns:r="http://schemas.openxmlformats.org/officeDocument/2006/relationships" xmlns:p="http://schemas.openxmlformats.org/presentationml/2006/main">
+  <p:cSld>
+    <p:spTree>
+      <p:nvGrpSpPr>
+        <p:cNvPr id="1" name=""/>
+        <p:cNvGrpSpPr/>
+        <p:nvPr/>
+      </p:nvGrpSpPr>
+      <p:grpSpPr>
+        <a:xfrm>
+          <a:off x="0" y="0"/>
+          <a:ext cx="0" cy="0"/>
+          <a:chOff x="0" y="0"/>
+          <a:chExt cx="0" cy="0"/>
+        </a:xfrm>
+      </p:grpSpPr>
+      <p:pic>
+        <p:nvPicPr>
+          <p:cNvPr id="2" name="Picture 1">
+            <a:extLst>
+              <a:ext uri="{FF2B5EF4-FFF2-40B4-BE49-F238E27FC236}">
+                <a16:creationId xmlns:a16="http://schemas.microsoft.com/office/drawing/2014/main" id="{810E4F26-075C-4F8E-B53A-135C51CBBCEC}"/>
+              </a:ext>
+            </a:extLst>
+          </p:cNvPr>
+          <p:cNvPicPr>
+            <a:picLocks noChangeAspect="1"/>
+          </p:cNvPicPr>
+          <p:nvPr/>
+        </p:nvPicPr>
+        <p:blipFill rotWithShape="1">
+          <a:blip r:embed="rId3"/>
+          <a:srcRect l="22135" t="582" r="23110" b="44060"/>
+          <a:stretch/>
+        </p:blipFill>
+        <p:spPr>
+          <a:xfrm>
+            <a:off x="3962400" y="1333499"/>
+            <a:ext cx="3638549" cy="3667125"/>
+          </a:xfrm>
+          <a:prstGeom prst="rect">
+            <a:avLst/>
+          </a:prstGeom>
+        </p:spPr>
+      </p:pic>
+      <p:sp>
+        <p:nvSpPr>
+          <p:cNvPr id="4" name="TextBox 3">
+            <a:extLst>
+              <a:ext uri="{FF2B5EF4-FFF2-40B4-BE49-F238E27FC236}">
+                <a16:creationId xmlns:a16="http://schemas.microsoft.com/office/drawing/2014/main" id="{A58FC557-A667-4323-A120-60DA62E7AC47}"/>
+              </a:ext>
+            </a:extLst>
+          </p:cNvPr>
+          <p:cNvSpPr txBox="1"/>
+          <p:nvPr/>
+        </p:nvSpPr>
+        <p:spPr>
+          <a:xfrm>
+            <a:off x="3867149" y="1658956"/>
+            <a:ext cx="7677150" cy="3016210"/>
+          </a:xfrm>
+          <a:prstGeom prst="rect">
+            <a:avLst/>
+          </a:prstGeom>
+          <a:noFill/>
+        </p:spPr>
+        <p:txBody>
+          <a:bodyPr wrap="square" rtlCol="0">
+            <a:spAutoFit/>
+            <a:scene3d>
+              <a:camera prst="orthographicFront"/>
+              <a:lightRig rig="soft" dir="t">
+                <a:rot lat="0" lon="0" rev="15600000"/>
+              </a:lightRig>
+            </a:scene3d>
+            <a:sp3d extrusionH="57150" prstMaterial="softEdge">
+              <a:bevelT w="25400" h="38100"/>
+            </a:sp3d>
+          </a:bodyPr>
+          <a:lstStyle/>
+          <a:p>
+            <a:r>
+              <a:rPr lang="en-US" sz="19000" b="1" dirty="0">
+                <a:ln/>
+                <a:solidFill>
+                  <a:srgbClr val="FFFF00"/>
+                </a:solidFill>
+                <a:effectLst>
+                  <a:outerShdw blurRad="50800" dist="38100" dir="10800000" algn="r" rotWithShape="0">
+                    <a:prstClr val="black">
+                      <a:alpha val="40000"/>
+                    </a:prstClr>
+                  </a:outerShdw>
+                </a:effectLst>
+              </a:rPr>
+              <a:t>?++</a:t>
+            </a:r>
+          </a:p>
+        </p:txBody>
+      </p:sp>
+    </p:spTree>
+    <p:extLst>
+      <p:ext uri="{BB962C8B-B14F-4D97-AF65-F5344CB8AC3E}">
+        <p14:creationId xmlns:p14="http://schemas.microsoft.com/office/powerpoint/2010/main" val="1323239356"/>
+      </p:ext>
+    </p:extLst>
+  </p:cSld>
+  <p:clrMapOvr>
+    <a:masterClrMapping/>
+  </p:clrMapOvr>
+</p:sld>
+</file>
+
+<file path=ppt/slides/slide14.xml><?xml version="1.0" encoding="utf-8"?>
+<p:sld xmlns:a="http://schemas.openxmlformats.org/drawingml/2006/main" xmlns:r="http://schemas.openxmlformats.org/officeDocument/2006/relationships" xmlns:p="http://schemas.openxmlformats.org/presentationml/2006/main">
+  <p:cSld>
+    <p:spTree>
+      <p:nvGrpSpPr>
+        <p:cNvPr id="1" name=""/>
+        <p:cNvGrpSpPr/>
+        <p:nvPr/>
+      </p:nvGrpSpPr>
+      <p:grpSpPr>
+        <a:xfrm>
+          <a:off x="0" y="0"/>
+          <a:ext cx="0" cy="0"/>
+          <a:chOff x="0" y="0"/>
+          <a:chExt cx="0" cy="0"/>
+        </a:xfrm>
+      </p:grpSpPr>
+      <p:pic>
+        <p:nvPicPr>
+          <p:cNvPr id="2" name="Picture 1">
+            <a:extLst>
+              <a:ext uri="{FF2B5EF4-FFF2-40B4-BE49-F238E27FC236}">
+                <a16:creationId xmlns:a16="http://schemas.microsoft.com/office/drawing/2014/main" id="{3F346B1C-146E-40B6-A156-9ECCC04E1773}"/>
+              </a:ext>
+            </a:extLst>
+          </p:cNvPr>
+          <p:cNvPicPr>
+            <a:picLocks noChangeAspect="1"/>
+          </p:cNvPicPr>
+          <p:nvPr/>
+        </p:nvPicPr>
+        <p:blipFill rotWithShape="1">
+          <a:blip r:embed="rId3"/>
+          <a:srcRect l="18443" t="8911" r="39760" b="52305"/>
+          <a:stretch/>
+        </p:blipFill>
+        <p:spPr>
+          <a:xfrm>
+            <a:off x="4476751" y="2170750"/>
+            <a:ext cx="3035300" cy="2807650"/>
+          </a:xfrm>
+          <a:prstGeom prst="rect">
+            <a:avLst/>
+          </a:prstGeom>
+        </p:spPr>
+      </p:pic>
+      <p:sp>
+        <p:nvSpPr>
+          <p:cNvPr id="6" name="TextBox 5">
+            <a:extLst>
+              <a:ext uri="{FF2B5EF4-FFF2-40B4-BE49-F238E27FC236}">
+                <a16:creationId xmlns:a16="http://schemas.microsoft.com/office/drawing/2014/main" id="{87D1A4C1-2E5C-4DB8-B708-131FAA7844C9}"/>
+              </a:ext>
+            </a:extLst>
+          </p:cNvPr>
+          <p:cNvSpPr txBox="1"/>
+          <p:nvPr/>
+        </p:nvSpPr>
+        <p:spPr>
+          <a:xfrm>
+            <a:off x="5476874" y="2643551"/>
+            <a:ext cx="2886075" cy="1862048"/>
+          </a:xfrm>
+          <a:prstGeom prst="rect">
+            <a:avLst/>
+          </a:prstGeom>
+          <a:noFill/>
+        </p:spPr>
+        <p:txBody>
+          <a:bodyPr wrap="square" rtlCol="0">
+            <a:spAutoFit/>
+          </a:bodyPr>
+          <a:lstStyle/>
+          <a:p>
+            <a:r>
+              <a:rPr lang="en-US" sz="11500" dirty="0">
+                <a:solidFill>
+                  <a:srgbClr val="FFFF00"/>
+                </a:solidFill>
+                <a:effectLst>
+                  <a:outerShdw blurRad="50800" dist="38100" dir="10800000" algn="r" rotWithShape="0">
+                    <a:prstClr val="black">
+                      <a:alpha val="40000"/>
+                    </a:prstClr>
+                  </a:outerShdw>
+                </a:effectLst>
+              </a:rPr>
+              <a:t>?</a:t>
+            </a:r>
+          </a:p>
+        </p:txBody>
+      </p:sp>
+    </p:spTree>
+    <p:extLst>
+      <p:ext uri="{BB962C8B-B14F-4D97-AF65-F5344CB8AC3E}">
+        <p14:creationId xmlns:p14="http://schemas.microsoft.com/office/powerpoint/2010/main" val="3255219281"/>
+      </p:ext>
+    </p:extLst>
+  </p:cSld>
+  <p:clrMapOvr>
+    <a:masterClrMapping/>
+  </p:clrMapOvr>
+</p:sld>
+</file>
+
+<file path=ppt/slides/slide15.xml><?xml version="1.0" encoding="utf-8"?>
+<p:sld xmlns:a="http://schemas.openxmlformats.org/drawingml/2006/main" xmlns:r="http://schemas.openxmlformats.org/officeDocument/2006/relationships" xmlns:p="http://schemas.openxmlformats.org/presentationml/2006/main">
+  <p:cSld>
+    <p:spTree>
+      <p:nvGrpSpPr>
+        <p:cNvPr id="1" name=""/>
+        <p:cNvGrpSpPr/>
+        <p:nvPr/>
+      </p:nvGrpSpPr>
+      <p:grpSpPr>
+        <a:xfrm>
+          <a:off x="0" y="0"/>
+          <a:ext cx="0" cy="0"/>
+          <a:chOff x="0" y="0"/>
+          <a:chExt cx="0" cy="0"/>
+        </a:xfrm>
+      </p:grpSpPr>
+      <p:pic>
+        <p:nvPicPr>
+          <p:cNvPr id="2" name="Picture 1">
+            <a:extLst>
+              <a:ext uri="{FF2B5EF4-FFF2-40B4-BE49-F238E27FC236}">
+                <a16:creationId xmlns:a16="http://schemas.microsoft.com/office/drawing/2014/main" id="{3F346B1C-146E-40B6-A156-9ECCC04E1773}"/>
+              </a:ext>
+            </a:extLst>
+          </p:cNvPr>
+          <p:cNvPicPr>
+            <a:picLocks noChangeAspect="1"/>
+          </p:cNvPicPr>
+          <p:nvPr/>
+        </p:nvPicPr>
+        <p:blipFill rotWithShape="1">
+          <a:blip r:embed="rId3"/>
+          <a:srcRect l="18443" t="8911" r="39760" b="52305"/>
+          <a:stretch/>
+        </p:blipFill>
+        <p:spPr>
+          <a:xfrm>
+            <a:off x="4476751" y="2170750"/>
+            <a:ext cx="3035300" cy="2807650"/>
+          </a:xfrm>
+          <a:prstGeom prst="rect">
+            <a:avLst/>
+          </a:prstGeom>
+        </p:spPr>
+      </p:pic>
+      <p:sp>
+        <p:nvSpPr>
+          <p:cNvPr id="6" name="Arrow: Curved Left 5">
+            <a:extLst>
+              <a:ext uri="{FF2B5EF4-FFF2-40B4-BE49-F238E27FC236}">
+                <a16:creationId xmlns:a16="http://schemas.microsoft.com/office/drawing/2014/main" id="{780E6BCA-7B56-4104-9993-08589BDB969A}"/>
+              </a:ext>
+            </a:extLst>
+          </p:cNvPr>
+          <p:cNvSpPr/>
+          <p:nvPr/>
+        </p:nvSpPr>
+        <p:spPr>
+          <a:xfrm rot="10800000" flipH="1" flipV="1">
+            <a:off x="5157889" y="2720898"/>
+            <a:ext cx="1876221" cy="2069479"/>
+          </a:xfrm>
+          <a:prstGeom prst="curvedLeftArrow">
+            <a:avLst>
+              <a:gd name="adj1" fmla="val 18048"/>
+              <a:gd name="adj2" fmla="val 50000"/>
+              <a:gd name="adj3" fmla="val 39338"/>
+            </a:avLst>
+          </a:prstGeom>
+          <a:solidFill>
+            <a:srgbClr val="FFFF00"/>
+          </a:solidFill>
+        </p:spPr>
+        <p:style>
+          <a:lnRef idx="0">
+            <a:schemeClr val="accent4"/>
+          </a:lnRef>
+          <a:fillRef idx="3">
+            <a:schemeClr val="accent4"/>
+          </a:fillRef>
+          <a:effectRef idx="3">
+            <a:schemeClr val="accent4"/>
+          </a:effectRef>
+          <a:fontRef idx="minor">
+            <a:schemeClr val="lt1"/>
+          </a:fontRef>
+        </p:style>
+        <p:txBody>
+          <a:bodyPr rtlCol="0" anchor="ctr"/>
+          <a:lstStyle/>
+          <a:p>
+            <a:pPr algn="ctr"/>
+            <a:endParaRPr lang="en-US">
+              <a:solidFill>
+                <a:schemeClr val="tx1"/>
+              </a:solidFill>
+            </a:endParaRPr>
+          </a:p>
+        </p:txBody>
+      </p:sp>
+    </p:spTree>
+    <p:extLst>
+      <p:ext uri="{BB962C8B-B14F-4D97-AF65-F5344CB8AC3E}">
+        <p14:creationId xmlns:p14="http://schemas.microsoft.com/office/powerpoint/2010/main" val="3695942885"/>
+      </p:ext>
+    </p:extLst>
+  </p:cSld>
+  <p:clrMapOvr>
+    <a:masterClrMapping/>
+  </p:clrMapOvr>
+</p:sld>
+</file>
+
+<file path=ppt/slides/slide16.xml><?xml version="1.0" encoding="utf-8"?>
+<p:sld xmlns:a="http://schemas.openxmlformats.org/drawingml/2006/main" xmlns:r="http://schemas.openxmlformats.org/officeDocument/2006/relationships" xmlns:p="http://schemas.openxmlformats.org/presentationml/2006/main">
+  <p:cSld>
+    <p:spTree>
+      <p:nvGrpSpPr>
+        <p:cNvPr id="1" name=""/>
+        <p:cNvGrpSpPr/>
+        <p:nvPr/>
+      </p:nvGrpSpPr>
+      <p:grpSpPr>
+        <a:xfrm>
+          <a:off x="0" y="0"/>
+          <a:ext cx="0" cy="0"/>
+          <a:chOff x="0" y="0"/>
+          <a:chExt cx="0" cy="0"/>
+        </a:xfrm>
+      </p:grpSpPr>
+      <p:pic>
+        <p:nvPicPr>
+          <p:cNvPr id="2" name="Picture 1">
+            <a:extLst>
+              <a:ext uri="{FF2B5EF4-FFF2-40B4-BE49-F238E27FC236}">
+                <a16:creationId xmlns:a16="http://schemas.microsoft.com/office/drawing/2014/main" id="{3F346B1C-146E-40B6-A156-9ECCC04E1773}"/>
+              </a:ext>
+            </a:extLst>
+          </p:cNvPr>
+          <p:cNvPicPr>
+            <a:picLocks noChangeAspect="1"/>
+          </p:cNvPicPr>
+          <p:nvPr/>
+        </p:nvPicPr>
+        <p:blipFill rotWithShape="1">
+          <a:blip r:embed="rId3"/>
+          <a:srcRect l="18443" t="8911" r="39760" b="52305"/>
+          <a:stretch/>
+        </p:blipFill>
+        <p:spPr>
+          <a:xfrm>
+            <a:off x="4476751" y="2170750"/>
+            <a:ext cx="3035300" cy="2807650"/>
+          </a:xfrm>
+          <a:prstGeom prst="rect">
+            <a:avLst/>
+          </a:prstGeom>
+        </p:spPr>
+      </p:pic>
+      <p:sp>
+        <p:nvSpPr>
+          <p:cNvPr id="5" name="Arrow: Curved Left 4">
+            <a:extLst>
+              <a:ext uri="{FF2B5EF4-FFF2-40B4-BE49-F238E27FC236}">
+                <a16:creationId xmlns:a16="http://schemas.microsoft.com/office/drawing/2014/main" id="{D8C208C2-D625-476D-AB9B-A5A8754B6CBB}"/>
+              </a:ext>
+            </a:extLst>
+          </p:cNvPr>
+          <p:cNvSpPr/>
+          <p:nvPr/>
+        </p:nvSpPr>
+        <p:spPr>
+          <a:xfrm rot="10800000" flipV="1">
+            <a:off x="4814508" y="2765503"/>
+            <a:ext cx="1876221" cy="2069479"/>
+          </a:xfrm>
+          <a:prstGeom prst="curvedLeftArrow">
+            <a:avLst>
+              <a:gd name="adj1" fmla="val 18048"/>
+              <a:gd name="adj2" fmla="val 50000"/>
+              <a:gd name="adj3" fmla="val 39338"/>
+            </a:avLst>
+          </a:prstGeom>
+          <a:solidFill>
+            <a:srgbClr val="FFFF00"/>
+          </a:solidFill>
+        </p:spPr>
+        <p:style>
+          <a:lnRef idx="0">
+            <a:schemeClr val="accent4"/>
+          </a:lnRef>
+          <a:fillRef idx="3">
+            <a:schemeClr val="accent4"/>
+          </a:fillRef>
+          <a:effectRef idx="3">
+            <a:schemeClr val="accent4"/>
+          </a:effectRef>
+          <a:fontRef idx="minor">
+            <a:schemeClr val="lt1"/>
+          </a:fontRef>
+        </p:style>
+        <p:txBody>
+          <a:bodyPr rtlCol="0" anchor="ctr"/>
+          <a:lstStyle/>
+          <a:p>
+            <a:pPr algn="ctr"/>
+            <a:endParaRPr lang="en-US" dirty="0">
+              <a:solidFill>
+                <a:schemeClr val="tx1"/>
+              </a:solidFill>
+            </a:endParaRPr>
+          </a:p>
+        </p:txBody>
+      </p:sp>
+    </p:spTree>
+    <p:extLst>
+      <p:ext uri="{BB962C8B-B14F-4D97-AF65-F5344CB8AC3E}">
+        <p14:creationId xmlns:p14="http://schemas.microsoft.com/office/powerpoint/2010/main" val="3077491938"/>
+      </p:ext>
+    </p:extLst>
+  </p:cSld>
+  <p:clrMapOvr>
+    <a:masterClrMapping/>
+  </p:clrMapOvr>
+</p:sld>
+</file>
+
+<file path=ppt/slides/slide17.xml><?xml version="1.0" encoding="utf-8"?>
+<p:sld xmlns:a="http://schemas.openxmlformats.org/drawingml/2006/main" xmlns:r="http://schemas.openxmlformats.org/officeDocument/2006/relationships" xmlns:p="http://schemas.openxmlformats.org/presentationml/2006/main">
+  <p:cSld>
+    <p:spTree>
+      <p:nvGrpSpPr>
+        <p:cNvPr id="1" name=""/>
+        <p:cNvGrpSpPr/>
+        <p:nvPr/>
+      </p:nvGrpSpPr>
+      <p:grpSpPr>
+        <a:xfrm>
+          <a:off x="0" y="0"/>
+          <a:ext cx="0" cy="0"/>
+          <a:chOff x="0" y="0"/>
+          <a:chExt cx="0" cy="0"/>
+        </a:xfrm>
+      </p:grpSpPr>
+      <p:pic>
+        <p:nvPicPr>
+          <p:cNvPr id="2" name="Picture 1">
+            <a:extLst>
+              <a:ext uri="{FF2B5EF4-FFF2-40B4-BE49-F238E27FC236}">
+                <a16:creationId xmlns:a16="http://schemas.microsoft.com/office/drawing/2014/main" id="{3F346B1C-146E-40B6-A156-9ECCC04E1773}"/>
+              </a:ext>
+            </a:extLst>
+          </p:cNvPr>
+          <p:cNvPicPr>
+            <a:picLocks noChangeAspect="1"/>
+          </p:cNvPicPr>
+          <p:nvPr/>
+        </p:nvPicPr>
+        <p:blipFill rotWithShape="1">
+          <a:blip r:embed="rId3"/>
+          <a:srcRect l="18443" t="8911" r="39760" b="52305"/>
+          <a:stretch/>
+        </p:blipFill>
+        <p:spPr>
+          <a:xfrm>
+            <a:off x="4476751" y="2170750"/>
+            <a:ext cx="3035300" cy="2807650"/>
+          </a:xfrm>
+          <a:prstGeom prst="rect">
+            <a:avLst/>
+          </a:prstGeom>
+        </p:spPr>
+      </p:pic>
+      <p:sp>
+        <p:nvSpPr>
+          <p:cNvPr id="4" name="Rectangle 3">
+            <a:extLst>
+              <a:ext uri="{FF2B5EF4-FFF2-40B4-BE49-F238E27FC236}">
+                <a16:creationId xmlns:a16="http://schemas.microsoft.com/office/drawing/2014/main" id="{7B0A359F-E561-4E2A-AF05-B22EF1230944}"/>
+              </a:ext>
+            </a:extLst>
+          </p:cNvPr>
+          <p:cNvSpPr/>
+          <p:nvPr/>
+        </p:nvSpPr>
+        <p:spPr>
+          <a:xfrm>
+            <a:off x="4476751" y="3138719"/>
+            <a:ext cx="3035301" cy="1038225"/>
+          </a:xfrm>
+          <a:prstGeom prst="rect">
+            <a:avLst/>
+          </a:prstGeom>
+          <a:noFill/>
+          <a:ln>
+            <a:noFill/>
+          </a:ln>
+        </p:spPr>
+        <p:style>
+          <a:lnRef idx="2">
+            <a:schemeClr val="accent1">
+              <a:shade val="50000"/>
+            </a:schemeClr>
+          </a:lnRef>
+          <a:fillRef idx="1">
+            <a:schemeClr val="accent1"/>
+          </a:fillRef>
+          <a:effectRef idx="0">
+            <a:schemeClr val="accent1"/>
+          </a:effectRef>
+          <a:fontRef idx="minor">
+            <a:schemeClr val="lt1"/>
+          </a:fontRef>
+        </p:style>
+        <p:txBody>
+          <a:bodyPr rtlCol="0" anchor="ctr"/>
+          <a:lstStyle/>
+          <a:p>
+            <a:pPr algn="ctr"/>
+            <a:r>
+              <a:rPr lang="en-US" sz="9600" b="1" dirty="0">
+                <a:ln w="9525">
+                  <a:solidFill>
+                    <a:schemeClr val="bg1"/>
+                  </a:solidFill>
+                  <a:prstDash val="solid"/>
+                </a:ln>
+                <a:solidFill>
+                  <a:srgbClr val="FFFF00"/>
+                </a:solidFill>
+                <a:effectLst>
+                  <a:outerShdw blurRad="12700" dist="38100" dir="2700000" algn="tl" rotWithShape="0">
+                    <a:schemeClr val="accent5">
+                      <a:lumMod val="60000"/>
+                      <a:lumOff val="40000"/>
+                    </a:schemeClr>
+                  </a:outerShdw>
+                </a:effectLst>
+              </a:rPr>
+              <a:t>180°</a:t>
+            </a:r>
+          </a:p>
+        </p:txBody>
+      </p:sp>
+    </p:spTree>
+    <p:extLst>
+      <p:ext uri="{BB962C8B-B14F-4D97-AF65-F5344CB8AC3E}">
+        <p14:creationId xmlns:p14="http://schemas.microsoft.com/office/powerpoint/2010/main" val="415986124"/>
+      </p:ext>
+    </p:extLst>
+  </p:cSld>
+  <p:clrMapOvr>
+    <a:masterClrMapping/>
+  </p:clrMapOvr>
+</p:sld>
+</file>
+
+<file path=ppt/slides/slide18.xml><?xml version="1.0" encoding="utf-8"?>
+<p:sld xmlns:a="http://schemas.openxmlformats.org/drawingml/2006/main" xmlns:r="http://schemas.openxmlformats.org/officeDocument/2006/relationships" xmlns:p="http://schemas.openxmlformats.org/presentationml/2006/main">
+  <p:cSld>
+    <p:spTree>
+      <p:nvGrpSpPr>
+        <p:cNvPr id="1" name=""/>
+        <p:cNvGrpSpPr/>
+        <p:nvPr/>
+      </p:nvGrpSpPr>
+      <p:grpSpPr>
+        <a:xfrm>
+          <a:off x="0" y="0"/>
+          <a:ext cx="0" cy="0"/>
+          <a:chOff x="0" y="0"/>
+          <a:chExt cx="0" cy="0"/>
+        </a:xfrm>
+      </p:grpSpPr>
+      <p:pic>
+        <p:nvPicPr>
+          <p:cNvPr id="7" name="Picture 6">
+            <a:extLst>
+              <a:ext uri="{FF2B5EF4-FFF2-40B4-BE49-F238E27FC236}">
+                <a16:creationId xmlns:a16="http://schemas.microsoft.com/office/drawing/2014/main" id="{FC6CC54F-4F24-47A6-AC28-00ECA2B89101}"/>
+              </a:ext>
+            </a:extLst>
+          </p:cNvPr>
+          <p:cNvPicPr>
+            <a:picLocks noChangeAspect="1"/>
+          </p:cNvPicPr>
+          <p:nvPr/>
+        </p:nvPicPr>
+        <p:blipFill>
+          <a:blip r:embed="rId3"/>
+          <a:stretch>
+            <a:fillRect/>
+          </a:stretch>
+        </p:blipFill>
+        <p:spPr>
+          <a:xfrm>
+            <a:off x="4361036" y="2143124"/>
+            <a:ext cx="2837082" cy="2250100"/>
+          </a:xfrm>
+          <a:prstGeom prst="rect">
+            <a:avLst/>
+          </a:prstGeom>
+        </p:spPr>
+      </p:pic>
+      <p:sp>
+        <p:nvSpPr>
+          <p:cNvPr id="8" name="Arrow: Left-Right 7">
+            <a:extLst>
+              <a:ext uri="{FF2B5EF4-FFF2-40B4-BE49-F238E27FC236}">
+                <a16:creationId xmlns:a16="http://schemas.microsoft.com/office/drawing/2014/main" id="{992E4B48-C2ED-435D-BE82-5BDA82DD4DA6}"/>
+              </a:ext>
+            </a:extLst>
+          </p:cNvPr>
+          <p:cNvSpPr/>
+          <p:nvPr/>
+        </p:nvSpPr>
+        <p:spPr>
+          <a:xfrm>
+            <a:off x="5467350" y="3036118"/>
+            <a:ext cx="628650" cy="540311"/>
+          </a:xfrm>
+          <a:prstGeom prst="leftRightArrow">
+            <a:avLst>
+              <a:gd name="adj1" fmla="val 18775"/>
+              <a:gd name="adj2" fmla="val 35555"/>
+            </a:avLst>
+          </a:prstGeom>
+          <a:solidFill>
+            <a:srgbClr val="FFFF00"/>
+          </a:solidFill>
+        </p:spPr>
+        <p:style>
+          <a:lnRef idx="0">
+            <a:schemeClr val="accent4"/>
+          </a:lnRef>
+          <a:fillRef idx="3">
+            <a:schemeClr val="accent4"/>
+          </a:fillRef>
+          <a:effectRef idx="3">
+            <a:schemeClr val="accent4"/>
+          </a:effectRef>
+          <a:fontRef idx="minor">
+            <a:schemeClr val="lt1"/>
+          </a:fontRef>
+        </p:style>
+        <p:txBody>
+          <a:bodyPr rtlCol="0" anchor="ctr"/>
+          <a:lstStyle/>
+          <a:p>
+            <a:pPr algn="ctr"/>
+            <a:endParaRPr lang="en-US">
+              <a:solidFill>
+                <a:srgbClr val="FFFF00"/>
+              </a:solidFill>
+              <a:effectLst>
+                <a:outerShdw blurRad="50800" dist="38100" dir="10800000" algn="r" rotWithShape="0">
+                  <a:prstClr val="black">
+                    <a:alpha val="40000"/>
+                  </a:prstClr>
+                </a:outerShdw>
+              </a:effectLst>
+            </a:endParaRPr>
+          </a:p>
+        </p:txBody>
+      </p:sp>
+    </p:spTree>
+    <p:extLst>
+      <p:ext uri="{BB962C8B-B14F-4D97-AF65-F5344CB8AC3E}">
+        <p14:creationId xmlns:p14="http://schemas.microsoft.com/office/powerpoint/2010/main" val="3246792119"/>
+      </p:ext>
+    </p:extLst>
+  </p:cSld>
+  <p:clrMapOvr>
+    <a:masterClrMapping/>
+  </p:clrMapOvr>
+</p:sld>
+</file>
+
+<file path=ppt/slides/slide2.xml><?xml version="1.0" encoding="utf-8"?>
+<p:sld xmlns:a="http://schemas.openxmlformats.org/drawingml/2006/main" xmlns:r="http://schemas.openxmlformats.org/officeDocument/2006/relationships" xmlns:p="http://schemas.openxmlformats.org/presentationml/2006/main">
+  <p:cSld>
+    <p:spTree>
+      <p:nvGrpSpPr>
+        <p:cNvPr id="1" name=""/>
+        <p:cNvGrpSpPr/>
+        <p:nvPr/>
+      </p:nvGrpSpPr>
+      <p:grpSpPr>
+        <a:xfrm>
+          <a:off x="0" y="0"/>
+          <a:ext cx="0" cy="0"/>
+          <a:chOff x="0" y="0"/>
+          <a:chExt cx="0" cy="0"/>
+        </a:xfrm>
+      </p:grpSpPr>
       <p:pic>
         <p:nvPicPr>
           <p:cNvPr id="2" name="Picture 1">
@@ -5169,1153 +6485,7 @@
 </p:sld>
 </file>
 
-<file path=ppt/slides/slide10.xml><?xml version="1.0" encoding="utf-8"?>
-<p:sld xmlns:a="http://schemas.openxmlformats.org/drawingml/2006/main" xmlns:r="http://schemas.openxmlformats.org/officeDocument/2006/relationships" xmlns:p="http://schemas.openxmlformats.org/presentationml/2006/main">
-  <p:cSld>
-    <p:spTree>
-      <p:nvGrpSpPr>
-        <p:cNvPr id="1" name=""/>
-        <p:cNvGrpSpPr/>
-        <p:nvPr/>
-      </p:nvGrpSpPr>
-      <p:grpSpPr>
-        <a:xfrm>
-          <a:off x="0" y="0"/>
-          <a:ext cx="0" cy="0"/>
-          <a:chOff x="0" y="0"/>
-          <a:chExt cx="0" cy="0"/>
-        </a:xfrm>
-      </p:grpSpPr>
-      <p:pic>
-        <p:nvPicPr>
-          <p:cNvPr id="2" name="Picture 1">
-            <a:extLst>
-              <a:ext uri="{FF2B5EF4-FFF2-40B4-BE49-F238E27FC236}">
-                <a16:creationId xmlns:a16="http://schemas.microsoft.com/office/drawing/2014/main" id="{810E4F26-075C-4F8E-B53A-135C51CBBCEC}"/>
-              </a:ext>
-            </a:extLst>
-          </p:cNvPr>
-          <p:cNvPicPr>
-            <a:picLocks noChangeAspect="1"/>
-          </p:cNvPicPr>
-          <p:nvPr/>
-        </p:nvPicPr>
-        <p:blipFill rotWithShape="1">
-          <a:blip r:embed="rId3"/>
-          <a:srcRect l="22135" t="582" r="23110" b="44060"/>
-          <a:stretch/>
-        </p:blipFill>
-        <p:spPr>
-          <a:xfrm>
-            <a:off x="3962400" y="1257299"/>
-            <a:ext cx="3638549" cy="3667125"/>
-          </a:xfrm>
-          <a:prstGeom prst="rect">
-            <a:avLst/>
-          </a:prstGeom>
-        </p:spPr>
-      </p:pic>
-      <p:sp>
-        <p:nvSpPr>
-          <p:cNvPr id="5" name="Rectangle 4">
-            <a:extLst>
-              <a:ext uri="{FF2B5EF4-FFF2-40B4-BE49-F238E27FC236}">
-                <a16:creationId xmlns:a16="http://schemas.microsoft.com/office/drawing/2014/main" id="{9C9D6F7C-D5B3-4ED3-A70C-9007FE21517F}"/>
-              </a:ext>
-            </a:extLst>
-          </p:cNvPr>
-          <p:cNvSpPr/>
-          <p:nvPr/>
-        </p:nvSpPr>
-        <p:spPr>
-          <a:xfrm rot="5400000">
-            <a:off x="4010025" y="2981325"/>
-            <a:ext cx="3533774" cy="209550"/>
-          </a:xfrm>
-          <a:prstGeom prst="rect">
-            <a:avLst/>
-          </a:prstGeom>
-          <a:solidFill>
-            <a:srgbClr val="FF0000"/>
-          </a:solidFill>
-        </p:spPr>
-        <p:style>
-          <a:lnRef idx="2">
-            <a:schemeClr val="accent1">
-              <a:shade val="50000"/>
-            </a:schemeClr>
-          </a:lnRef>
-          <a:fillRef idx="1">
-            <a:schemeClr val="accent1"/>
-          </a:fillRef>
-          <a:effectRef idx="0">
-            <a:schemeClr val="accent1"/>
-          </a:effectRef>
-          <a:fontRef idx="minor">
-            <a:schemeClr val="lt1"/>
-          </a:fontRef>
-        </p:style>
-        <p:txBody>
-          <a:bodyPr rtlCol="0" anchor="ctr"/>
-          <a:lstStyle/>
-          <a:p>
-            <a:pPr algn="ctr"/>
-            <a:endParaRPr lang="en-US"/>
-          </a:p>
-        </p:txBody>
-      </p:sp>
-    </p:spTree>
-    <p:extLst>
-      <p:ext uri="{BB962C8B-B14F-4D97-AF65-F5344CB8AC3E}">
-        <p14:creationId xmlns:p14="http://schemas.microsoft.com/office/powerpoint/2010/main" val="1572736565"/>
-      </p:ext>
-    </p:extLst>
-  </p:cSld>
-  <p:clrMapOvr>
-    <a:masterClrMapping/>
-  </p:clrMapOvr>
-</p:sld>
-</file>
-
-<file path=ppt/slides/slide11.xml><?xml version="1.0" encoding="utf-8"?>
-<p:sld xmlns:a="http://schemas.openxmlformats.org/drawingml/2006/main" xmlns:r="http://schemas.openxmlformats.org/officeDocument/2006/relationships" xmlns:p="http://schemas.openxmlformats.org/presentationml/2006/main">
-  <p:cSld>
-    <p:spTree>
-      <p:nvGrpSpPr>
-        <p:cNvPr id="1" name=""/>
-        <p:cNvGrpSpPr/>
-        <p:nvPr/>
-      </p:nvGrpSpPr>
-      <p:grpSpPr>
-        <a:xfrm>
-          <a:off x="0" y="0"/>
-          <a:ext cx="0" cy="0"/>
-          <a:chOff x="0" y="0"/>
-          <a:chExt cx="0" cy="0"/>
-        </a:xfrm>
-      </p:grpSpPr>
-      <p:pic>
-        <p:nvPicPr>
-          <p:cNvPr id="2" name="Picture 1">
-            <a:extLst>
-              <a:ext uri="{FF2B5EF4-FFF2-40B4-BE49-F238E27FC236}">
-                <a16:creationId xmlns:a16="http://schemas.microsoft.com/office/drawing/2014/main" id="{810E4F26-075C-4F8E-B53A-135C51CBBCEC}"/>
-              </a:ext>
-            </a:extLst>
-          </p:cNvPr>
-          <p:cNvPicPr>
-            <a:picLocks noChangeAspect="1"/>
-          </p:cNvPicPr>
-          <p:nvPr/>
-        </p:nvPicPr>
-        <p:blipFill rotWithShape="1">
-          <a:blip r:embed="rId3"/>
-          <a:srcRect l="22135" t="582" r="23110" b="44060"/>
-          <a:stretch/>
-        </p:blipFill>
-        <p:spPr>
-          <a:xfrm>
-            <a:off x="3962400" y="1257299"/>
-            <a:ext cx="3638549" cy="3667125"/>
-          </a:xfrm>
-          <a:prstGeom prst="rect">
-            <a:avLst/>
-          </a:prstGeom>
-        </p:spPr>
-      </p:pic>
-      <p:sp>
-        <p:nvSpPr>
-          <p:cNvPr id="4" name="TextBox 3">
-            <a:extLst>
-              <a:ext uri="{FF2B5EF4-FFF2-40B4-BE49-F238E27FC236}">
-                <a16:creationId xmlns:a16="http://schemas.microsoft.com/office/drawing/2014/main" id="{A58FC557-A667-4323-A120-60DA62E7AC47}"/>
-              </a:ext>
-            </a:extLst>
-          </p:cNvPr>
-          <p:cNvSpPr txBox="1"/>
-          <p:nvPr/>
-        </p:nvSpPr>
-        <p:spPr>
-          <a:xfrm>
-            <a:off x="4486274" y="-133099"/>
-            <a:ext cx="2886075" cy="6447919"/>
-          </a:xfrm>
-          <a:prstGeom prst="rect">
-            <a:avLst/>
-          </a:prstGeom>
-          <a:noFill/>
-        </p:spPr>
-        <p:txBody>
-          <a:bodyPr wrap="square" rtlCol="0">
-            <a:spAutoFit/>
-          </a:bodyPr>
-          <a:lstStyle/>
-          <a:p>
-            <a:r>
-              <a:rPr lang="en-US" sz="41300" dirty="0">
-                <a:solidFill>
-                  <a:srgbClr val="FFFF00"/>
-                </a:solidFill>
-                <a:effectLst>
-                  <a:outerShdw blurRad="50800" dist="38100" dir="10800000" algn="r" rotWithShape="0">
-                    <a:prstClr val="black">
-                      <a:alpha val="40000"/>
-                    </a:prstClr>
-                  </a:outerShdw>
-                </a:effectLst>
-              </a:rPr>
-              <a:t>?</a:t>
-            </a:r>
-          </a:p>
-        </p:txBody>
-      </p:sp>
-    </p:spTree>
-    <p:extLst>
-      <p:ext uri="{BB962C8B-B14F-4D97-AF65-F5344CB8AC3E}">
-        <p14:creationId xmlns:p14="http://schemas.microsoft.com/office/powerpoint/2010/main" val="3234151335"/>
-      </p:ext>
-    </p:extLst>
-  </p:cSld>
-  <p:clrMapOvr>
-    <a:masterClrMapping/>
-  </p:clrMapOvr>
-</p:sld>
-</file>
-
-<file path=ppt/slides/slide12.xml><?xml version="1.0" encoding="utf-8"?>
-<p:sld xmlns:a="http://schemas.openxmlformats.org/drawingml/2006/main" xmlns:r="http://schemas.openxmlformats.org/officeDocument/2006/relationships" xmlns:p="http://schemas.openxmlformats.org/presentationml/2006/main">
-  <p:cSld>
-    <p:spTree>
-      <p:nvGrpSpPr>
-        <p:cNvPr id="1" name=""/>
-        <p:cNvGrpSpPr/>
-        <p:nvPr/>
-      </p:nvGrpSpPr>
-      <p:grpSpPr>
-        <a:xfrm>
-          <a:off x="0" y="0"/>
-          <a:ext cx="0" cy="0"/>
-          <a:chOff x="0" y="0"/>
-          <a:chExt cx="0" cy="0"/>
-        </a:xfrm>
-      </p:grpSpPr>
-      <p:pic>
-        <p:nvPicPr>
-          <p:cNvPr id="2" name="Picture 1">
-            <a:extLst>
-              <a:ext uri="{FF2B5EF4-FFF2-40B4-BE49-F238E27FC236}">
-                <a16:creationId xmlns:a16="http://schemas.microsoft.com/office/drawing/2014/main" id="{810E4F26-075C-4F8E-B53A-135C51CBBCEC}"/>
-              </a:ext>
-            </a:extLst>
-          </p:cNvPr>
-          <p:cNvPicPr>
-            <a:picLocks noChangeAspect="1"/>
-          </p:cNvPicPr>
-          <p:nvPr/>
-        </p:nvPicPr>
-        <p:blipFill rotWithShape="1">
-          <a:blip r:embed="rId3"/>
-          <a:srcRect l="22135" t="582" r="23110" b="44060"/>
-          <a:stretch/>
-        </p:blipFill>
-        <p:spPr>
-          <a:xfrm>
-            <a:off x="3962400" y="1333499"/>
-            <a:ext cx="3638549" cy="3667125"/>
-          </a:xfrm>
-          <a:prstGeom prst="rect">
-            <a:avLst/>
-          </a:prstGeom>
-        </p:spPr>
-      </p:pic>
-      <p:sp>
-        <p:nvSpPr>
-          <p:cNvPr id="4" name="TextBox 3">
-            <a:extLst>
-              <a:ext uri="{FF2B5EF4-FFF2-40B4-BE49-F238E27FC236}">
-                <a16:creationId xmlns:a16="http://schemas.microsoft.com/office/drawing/2014/main" id="{A58FC557-A667-4323-A120-60DA62E7AC47}"/>
-              </a:ext>
-            </a:extLst>
-          </p:cNvPr>
-          <p:cNvSpPr txBox="1"/>
-          <p:nvPr/>
-        </p:nvSpPr>
-        <p:spPr>
-          <a:xfrm>
-            <a:off x="3867149" y="1658956"/>
-            <a:ext cx="7677150" cy="3016210"/>
-          </a:xfrm>
-          <a:prstGeom prst="rect">
-            <a:avLst/>
-          </a:prstGeom>
-          <a:noFill/>
-        </p:spPr>
-        <p:txBody>
-          <a:bodyPr wrap="square" rtlCol="0">
-            <a:spAutoFit/>
-            <a:scene3d>
-              <a:camera prst="orthographicFront"/>
-              <a:lightRig rig="soft" dir="t">
-                <a:rot lat="0" lon="0" rev="15600000"/>
-              </a:lightRig>
-            </a:scene3d>
-            <a:sp3d extrusionH="57150" prstMaterial="softEdge">
-              <a:bevelT w="25400" h="38100"/>
-            </a:sp3d>
-          </a:bodyPr>
-          <a:lstStyle/>
-          <a:p>
-            <a:r>
-              <a:rPr lang="en-US" sz="19000" b="1" dirty="0">
-                <a:ln/>
-                <a:solidFill>
-                  <a:srgbClr val="FFFF00"/>
-                </a:solidFill>
-                <a:effectLst>
-                  <a:outerShdw blurRad="50800" dist="38100" dir="10800000" algn="r" rotWithShape="0">
-                    <a:prstClr val="black">
-                      <a:alpha val="40000"/>
-                    </a:prstClr>
-                  </a:outerShdw>
-                </a:effectLst>
-              </a:rPr>
-              <a:t>?++</a:t>
-            </a:r>
-          </a:p>
-        </p:txBody>
-      </p:sp>
-    </p:spTree>
-    <p:extLst>
-      <p:ext uri="{BB962C8B-B14F-4D97-AF65-F5344CB8AC3E}">
-        <p14:creationId xmlns:p14="http://schemas.microsoft.com/office/powerpoint/2010/main" val="1323239356"/>
-      </p:ext>
-    </p:extLst>
-  </p:cSld>
-  <p:clrMapOvr>
-    <a:masterClrMapping/>
-  </p:clrMapOvr>
-</p:sld>
-</file>
-
-<file path=ppt/slides/slide13.xml><?xml version="1.0" encoding="utf-8"?>
-<p:sld xmlns:a="http://schemas.openxmlformats.org/drawingml/2006/main" xmlns:r="http://schemas.openxmlformats.org/officeDocument/2006/relationships" xmlns:p="http://schemas.openxmlformats.org/presentationml/2006/main">
-  <p:cSld>
-    <p:spTree>
-      <p:nvGrpSpPr>
-        <p:cNvPr id="1" name=""/>
-        <p:cNvGrpSpPr/>
-        <p:nvPr/>
-      </p:nvGrpSpPr>
-      <p:grpSpPr>
-        <a:xfrm>
-          <a:off x="0" y="0"/>
-          <a:ext cx="0" cy="0"/>
-          <a:chOff x="0" y="0"/>
-          <a:chExt cx="0" cy="0"/>
-        </a:xfrm>
-      </p:grpSpPr>
-      <p:pic>
-        <p:nvPicPr>
-          <p:cNvPr id="2" name="Picture 1">
-            <a:extLst>
-              <a:ext uri="{FF2B5EF4-FFF2-40B4-BE49-F238E27FC236}">
-                <a16:creationId xmlns:a16="http://schemas.microsoft.com/office/drawing/2014/main" id="{3F346B1C-146E-40B6-A156-9ECCC04E1773}"/>
-              </a:ext>
-            </a:extLst>
-          </p:cNvPr>
-          <p:cNvPicPr>
-            <a:picLocks noChangeAspect="1"/>
-          </p:cNvPicPr>
-          <p:nvPr/>
-        </p:nvPicPr>
-        <p:blipFill rotWithShape="1">
-          <a:blip r:embed="rId3"/>
-          <a:srcRect l="18443" t="8911" r="39760" b="52305"/>
-          <a:stretch/>
-        </p:blipFill>
-        <p:spPr>
-          <a:xfrm>
-            <a:off x="4476751" y="2170750"/>
-            <a:ext cx="3035300" cy="2807650"/>
-          </a:xfrm>
-          <a:prstGeom prst="rect">
-            <a:avLst/>
-          </a:prstGeom>
-        </p:spPr>
-      </p:pic>
-      <p:sp>
-        <p:nvSpPr>
-          <p:cNvPr id="6" name="TextBox 5">
-            <a:extLst>
-              <a:ext uri="{FF2B5EF4-FFF2-40B4-BE49-F238E27FC236}">
-                <a16:creationId xmlns:a16="http://schemas.microsoft.com/office/drawing/2014/main" id="{87D1A4C1-2E5C-4DB8-B708-131FAA7844C9}"/>
-              </a:ext>
-            </a:extLst>
-          </p:cNvPr>
-          <p:cNvSpPr txBox="1"/>
-          <p:nvPr/>
-        </p:nvSpPr>
-        <p:spPr>
-          <a:xfrm>
-            <a:off x="5476874" y="2643551"/>
-            <a:ext cx="2886075" cy="1862048"/>
-          </a:xfrm>
-          <a:prstGeom prst="rect">
-            <a:avLst/>
-          </a:prstGeom>
-          <a:noFill/>
-        </p:spPr>
-        <p:txBody>
-          <a:bodyPr wrap="square" rtlCol="0">
-            <a:spAutoFit/>
-          </a:bodyPr>
-          <a:lstStyle/>
-          <a:p>
-            <a:r>
-              <a:rPr lang="en-US" sz="11500" dirty="0">
-                <a:solidFill>
-                  <a:srgbClr val="FFFF00"/>
-                </a:solidFill>
-                <a:effectLst>
-                  <a:outerShdw blurRad="50800" dist="38100" dir="10800000" algn="r" rotWithShape="0">
-                    <a:prstClr val="black">
-                      <a:alpha val="40000"/>
-                    </a:prstClr>
-                  </a:outerShdw>
-                </a:effectLst>
-              </a:rPr>
-              <a:t>?</a:t>
-            </a:r>
-          </a:p>
-        </p:txBody>
-      </p:sp>
-    </p:spTree>
-    <p:extLst>
-      <p:ext uri="{BB962C8B-B14F-4D97-AF65-F5344CB8AC3E}">
-        <p14:creationId xmlns:p14="http://schemas.microsoft.com/office/powerpoint/2010/main" val="3255219281"/>
-      </p:ext>
-    </p:extLst>
-  </p:cSld>
-  <p:clrMapOvr>
-    <a:masterClrMapping/>
-  </p:clrMapOvr>
-</p:sld>
-</file>
-
-<file path=ppt/slides/slide14.xml><?xml version="1.0" encoding="utf-8"?>
-<p:sld xmlns:a="http://schemas.openxmlformats.org/drawingml/2006/main" xmlns:r="http://schemas.openxmlformats.org/officeDocument/2006/relationships" xmlns:p="http://schemas.openxmlformats.org/presentationml/2006/main">
-  <p:cSld>
-    <p:spTree>
-      <p:nvGrpSpPr>
-        <p:cNvPr id="1" name=""/>
-        <p:cNvGrpSpPr/>
-        <p:nvPr/>
-      </p:nvGrpSpPr>
-      <p:grpSpPr>
-        <a:xfrm>
-          <a:off x="0" y="0"/>
-          <a:ext cx="0" cy="0"/>
-          <a:chOff x="0" y="0"/>
-          <a:chExt cx="0" cy="0"/>
-        </a:xfrm>
-      </p:grpSpPr>
-      <p:pic>
-        <p:nvPicPr>
-          <p:cNvPr id="2" name="Picture 1">
-            <a:extLst>
-              <a:ext uri="{FF2B5EF4-FFF2-40B4-BE49-F238E27FC236}">
-                <a16:creationId xmlns:a16="http://schemas.microsoft.com/office/drawing/2014/main" id="{3F346B1C-146E-40B6-A156-9ECCC04E1773}"/>
-              </a:ext>
-            </a:extLst>
-          </p:cNvPr>
-          <p:cNvPicPr>
-            <a:picLocks noChangeAspect="1"/>
-          </p:cNvPicPr>
-          <p:nvPr/>
-        </p:nvPicPr>
-        <p:blipFill rotWithShape="1">
-          <a:blip r:embed="rId3"/>
-          <a:srcRect l="18443" t="8911" r="39760" b="52305"/>
-          <a:stretch/>
-        </p:blipFill>
-        <p:spPr>
-          <a:xfrm>
-            <a:off x="4476751" y="2170750"/>
-            <a:ext cx="3035300" cy="2807650"/>
-          </a:xfrm>
-          <a:prstGeom prst="rect">
-            <a:avLst/>
-          </a:prstGeom>
-        </p:spPr>
-      </p:pic>
-      <p:sp>
-        <p:nvSpPr>
-          <p:cNvPr id="3" name="Arrow: Curved Left 2">
-            <a:extLst>
-              <a:ext uri="{FF2B5EF4-FFF2-40B4-BE49-F238E27FC236}">
-                <a16:creationId xmlns:a16="http://schemas.microsoft.com/office/drawing/2014/main" id="{553EA8F3-3BF9-4F6A-9336-C8F36EEE5500}"/>
-              </a:ext>
-            </a:extLst>
-          </p:cNvPr>
-          <p:cNvSpPr/>
-          <p:nvPr/>
-        </p:nvSpPr>
-        <p:spPr>
-          <a:xfrm>
-            <a:off x="6218240" y="2840957"/>
-            <a:ext cx="948528" cy="1737394"/>
-          </a:xfrm>
-          <a:prstGeom prst="curvedLeftArrow">
-            <a:avLst>
-              <a:gd name="adj1" fmla="val 18048"/>
-              <a:gd name="adj2" fmla="val 50000"/>
-              <a:gd name="adj3" fmla="val 39338"/>
-            </a:avLst>
-          </a:prstGeom>
-          <a:solidFill>
-            <a:srgbClr val="FFFF00"/>
-          </a:solidFill>
-          <a:effectLst>
-            <a:outerShdw blurRad="50800" dist="38100" dir="10800000" algn="r" rotWithShape="0">
-              <a:prstClr val="black">
-                <a:alpha val="40000"/>
-              </a:prstClr>
-            </a:outerShdw>
-          </a:effectLst>
-        </p:spPr>
-        <p:style>
-          <a:lnRef idx="0">
-            <a:schemeClr val="accent4"/>
-          </a:lnRef>
-          <a:fillRef idx="3">
-            <a:schemeClr val="accent4"/>
-          </a:fillRef>
-          <a:effectRef idx="3">
-            <a:schemeClr val="accent4"/>
-          </a:effectRef>
-          <a:fontRef idx="minor">
-            <a:schemeClr val="lt1"/>
-          </a:fontRef>
-        </p:style>
-        <p:txBody>
-          <a:bodyPr rtlCol="0" anchor="ctr"/>
-          <a:lstStyle/>
-          <a:p>
-            <a:pPr algn="ctr"/>
-            <a:endParaRPr lang="en-US">
-              <a:solidFill>
-                <a:schemeClr val="tx1"/>
-              </a:solidFill>
-            </a:endParaRPr>
-          </a:p>
-        </p:txBody>
-      </p:sp>
-      <p:sp>
-        <p:nvSpPr>
-          <p:cNvPr id="5" name="Arrow: Curved Left 4">
-            <a:extLst>
-              <a:ext uri="{FF2B5EF4-FFF2-40B4-BE49-F238E27FC236}">
-                <a16:creationId xmlns:a16="http://schemas.microsoft.com/office/drawing/2014/main" id="{D8C208C2-D625-476D-AB9B-A5A8754B6CBB}"/>
-              </a:ext>
-            </a:extLst>
-          </p:cNvPr>
-          <p:cNvSpPr/>
-          <p:nvPr/>
-        </p:nvSpPr>
-        <p:spPr>
-          <a:xfrm rot="10800000">
-            <a:off x="4812884" y="2691729"/>
-            <a:ext cx="887825" cy="1737395"/>
-          </a:xfrm>
-          <a:prstGeom prst="curvedLeftArrow">
-            <a:avLst>
-              <a:gd name="adj1" fmla="val 18048"/>
-              <a:gd name="adj2" fmla="val 50000"/>
-              <a:gd name="adj3" fmla="val 39338"/>
-            </a:avLst>
-          </a:prstGeom>
-          <a:solidFill>
-            <a:srgbClr val="FFFF00"/>
-          </a:solidFill>
-          <a:effectLst>
-            <a:outerShdw blurRad="50800" dist="38100" dir="10800000" algn="r" rotWithShape="0">
-              <a:prstClr val="black">
-                <a:alpha val="40000"/>
-              </a:prstClr>
-            </a:outerShdw>
-          </a:effectLst>
-        </p:spPr>
-        <p:style>
-          <a:lnRef idx="0">
-            <a:schemeClr val="accent4"/>
-          </a:lnRef>
-          <a:fillRef idx="3">
-            <a:schemeClr val="accent4"/>
-          </a:fillRef>
-          <a:effectRef idx="3">
-            <a:schemeClr val="accent4"/>
-          </a:effectRef>
-          <a:fontRef idx="minor">
-            <a:schemeClr val="lt1"/>
-          </a:fontRef>
-        </p:style>
-        <p:txBody>
-          <a:bodyPr rtlCol="0" anchor="ctr"/>
-          <a:lstStyle/>
-          <a:p>
-            <a:pPr algn="ctr"/>
-            <a:endParaRPr lang="en-US">
-              <a:solidFill>
-                <a:schemeClr val="tx1"/>
-              </a:solidFill>
-              <a:effectLst>
-                <a:outerShdw blurRad="50800" dist="38100" dir="10800000" algn="r" rotWithShape="0">
-                  <a:prstClr val="black">
-                    <a:alpha val="40000"/>
-                  </a:prstClr>
-                </a:outerShdw>
-              </a:effectLst>
-            </a:endParaRPr>
-          </a:p>
-        </p:txBody>
-      </p:sp>
-    </p:spTree>
-    <p:extLst>
-      <p:ext uri="{BB962C8B-B14F-4D97-AF65-F5344CB8AC3E}">
-        <p14:creationId xmlns:p14="http://schemas.microsoft.com/office/powerpoint/2010/main" val="3695942885"/>
-      </p:ext>
-    </p:extLst>
-  </p:cSld>
-  <p:clrMapOvr>
-    <a:masterClrMapping/>
-  </p:clrMapOvr>
-</p:sld>
-</file>
-
-<file path=ppt/slides/slide15.xml><?xml version="1.0" encoding="utf-8"?>
-<p:sld xmlns:a="http://schemas.openxmlformats.org/drawingml/2006/main" xmlns:r="http://schemas.openxmlformats.org/officeDocument/2006/relationships" xmlns:p="http://schemas.openxmlformats.org/presentationml/2006/main">
-  <p:cSld>
-    <p:spTree>
-      <p:nvGrpSpPr>
-        <p:cNvPr id="1" name=""/>
-        <p:cNvGrpSpPr/>
-        <p:nvPr/>
-      </p:nvGrpSpPr>
-      <p:grpSpPr>
-        <a:xfrm>
-          <a:off x="0" y="0"/>
-          <a:ext cx="0" cy="0"/>
-          <a:chOff x="0" y="0"/>
-          <a:chExt cx="0" cy="0"/>
-        </a:xfrm>
-      </p:grpSpPr>
-      <p:pic>
-        <p:nvPicPr>
-          <p:cNvPr id="2" name="Picture 1">
-            <a:extLst>
-              <a:ext uri="{FF2B5EF4-FFF2-40B4-BE49-F238E27FC236}">
-                <a16:creationId xmlns:a16="http://schemas.microsoft.com/office/drawing/2014/main" id="{3F346B1C-146E-40B6-A156-9ECCC04E1773}"/>
-              </a:ext>
-            </a:extLst>
-          </p:cNvPr>
-          <p:cNvPicPr>
-            <a:picLocks noChangeAspect="1"/>
-          </p:cNvPicPr>
-          <p:nvPr/>
-        </p:nvPicPr>
-        <p:blipFill rotWithShape="1">
-          <a:blip r:embed="rId3"/>
-          <a:srcRect l="18443" t="8911" r="39760" b="52305"/>
-          <a:stretch/>
-        </p:blipFill>
-        <p:spPr>
-          <a:xfrm>
-            <a:off x="4476751" y="2170750"/>
-            <a:ext cx="3035300" cy="2807650"/>
-          </a:xfrm>
-          <a:prstGeom prst="rect">
-            <a:avLst/>
-          </a:prstGeom>
-        </p:spPr>
-      </p:pic>
-      <p:sp>
-        <p:nvSpPr>
-          <p:cNvPr id="3" name="Arrow: Curved Left 2">
-            <a:extLst>
-              <a:ext uri="{FF2B5EF4-FFF2-40B4-BE49-F238E27FC236}">
-                <a16:creationId xmlns:a16="http://schemas.microsoft.com/office/drawing/2014/main" id="{553EA8F3-3BF9-4F6A-9336-C8F36EEE5500}"/>
-              </a:ext>
-            </a:extLst>
-          </p:cNvPr>
-          <p:cNvSpPr/>
-          <p:nvPr/>
-        </p:nvSpPr>
-        <p:spPr>
-          <a:xfrm flipV="1">
-            <a:off x="6218240" y="2672680"/>
-            <a:ext cx="948528" cy="1737394"/>
-          </a:xfrm>
-          <a:prstGeom prst="curvedLeftArrow">
-            <a:avLst>
-              <a:gd name="adj1" fmla="val 18048"/>
-              <a:gd name="adj2" fmla="val 50000"/>
-              <a:gd name="adj3" fmla="val 39338"/>
-            </a:avLst>
-          </a:prstGeom>
-          <a:solidFill>
-            <a:srgbClr val="FFFF00"/>
-          </a:solidFill>
-        </p:spPr>
-        <p:style>
-          <a:lnRef idx="0">
-            <a:schemeClr val="accent4"/>
-          </a:lnRef>
-          <a:fillRef idx="3">
-            <a:schemeClr val="accent4"/>
-          </a:fillRef>
-          <a:effectRef idx="3">
-            <a:schemeClr val="accent4"/>
-          </a:effectRef>
-          <a:fontRef idx="minor">
-            <a:schemeClr val="lt1"/>
-          </a:fontRef>
-        </p:style>
-        <p:txBody>
-          <a:bodyPr rtlCol="0" anchor="ctr"/>
-          <a:lstStyle/>
-          <a:p>
-            <a:pPr algn="ctr"/>
-            <a:endParaRPr lang="en-US">
-              <a:solidFill>
-                <a:schemeClr val="tx1"/>
-              </a:solidFill>
-            </a:endParaRPr>
-          </a:p>
-        </p:txBody>
-      </p:sp>
-      <p:sp>
-        <p:nvSpPr>
-          <p:cNvPr id="5" name="Arrow: Curved Left 4">
-            <a:extLst>
-              <a:ext uri="{FF2B5EF4-FFF2-40B4-BE49-F238E27FC236}">
-                <a16:creationId xmlns:a16="http://schemas.microsoft.com/office/drawing/2014/main" id="{D8C208C2-D625-476D-AB9B-A5A8754B6CBB}"/>
-              </a:ext>
-            </a:extLst>
-          </p:cNvPr>
-          <p:cNvSpPr/>
-          <p:nvPr/>
-        </p:nvSpPr>
-        <p:spPr>
-          <a:xfrm rot="10800000" flipV="1">
-            <a:off x="4803359" y="2796504"/>
-            <a:ext cx="887825" cy="1737395"/>
-          </a:xfrm>
-          <a:prstGeom prst="curvedLeftArrow">
-            <a:avLst>
-              <a:gd name="adj1" fmla="val 18048"/>
-              <a:gd name="adj2" fmla="val 50000"/>
-              <a:gd name="adj3" fmla="val 39338"/>
-            </a:avLst>
-          </a:prstGeom>
-          <a:solidFill>
-            <a:srgbClr val="FFFF00"/>
-          </a:solidFill>
-        </p:spPr>
-        <p:style>
-          <a:lnRef idx="0">
-            <a:schemeClr val="accent4"/>
-          </a:lnRef>
-          <a:fillRef idx="3">
-            <a:schemeClr val="accent4"/>
-          </a:fillRef>
-          <a:effectRef idx="3">
-            <a:schemeClr val="accent4"/>
-          </a:effectRef>
-          <a:fontRef idx="minor">
-            <a:schemeClr val="lt1"/>
-          </a:fontRef>
-        </p:style>
-        <p:txBody>
-          <a:bodyPr rtlCol="0" anchor="ctr"/>
-          <a:lstStyle/>
-          <a:p>
-            <a:pPr algn="ctr"/>
-            <a:endParaRPr lang="en-US">
-              <a:solidFill>
-                <a:schemeClr val="tx1"/>
-              </a:solidFill>
-            </a:endParaRPr>
-          </a:p>
-        </p:txBody>
-      </p:sp>
-    </p:spTree>
-    <p:extLst>
-      <p:ext uri="{BB962C8B-B14F-4D97-AF65-F5344CB8AC3E}">
-        <p14:creationId xmlns:p14="http://schemas.microsoft.com/office/powerpoint/2010/main" val="3077491938"/>
-      </p:ext>
-    </p:extLst>
-  </p:cSld>
-  <p:clrMapOvr>
-    <a:masterClrMapping/>
-  </p:clrMapOvr>
-</p:sld>
-</file>
-
-<file path=ppt/slides/slide16.xml><?xml version="1.0" encoding="utf-8"?>
-<p:sld xmlns:a="http://schemas.openxmlformats.org/drawingml/2006/main" xmlns:r="http://schemas.openxmlformats.org/officeDocument/2006/relationships" xmlns:p="http://schemas.openxmlformats.org/presentationml/2006/main">
-  <p:cSld>
-    <p:spTree>
-      <p:nvGrpSpPr>
-        <p:cNvPr id="1" name=""/>
-        <p:cNvGrpSpPr/>
-        <p:nvPr/>
-      </p:nvGrpSpPr>
-      <p:grpSpPr>
-        <a:xfrm>
-          <a:off x="0" y="0"/>
-          <a:ext cx="0" cy="0"/>
-          <a:chOff x="0" y="0"/>
-          <a:chExt cx="0" cy="0"/>
-        </a:xfrm>
-      </p:grpSpPr>
-      <p:pic>
-        <p:nvPicPr>
-          <p:cNvPr id="2" name="Picture 1">
-            <a:extLst>
-              <a:ext uri="{FF2B5EF4-FFF2-40B4-BE49-F238E27FC236}">
-                <a16:creationId xmlns:a16="http://schemas.microsoft.com/office/drawing/2014/main" id="{3F346B1C-146E-40B6-A156-9ECCC04E1773}"/>
-              </a:ext>
-            </a:extLst>
-          </p:cNvPr>
-          <p:cNvPicPr>
-            <a:picLocks noChangeAspect="1"/>
-          </p:cNvPicPr>
-          <p:nvPr/>
-        </p:nvPicPr>
-        <p:blipFill rotWithShape="1">
-          <a:blip r:embed="rId3"/>
-          <a:srcRect l="18443" t="8911" r="39760" b="52305"/>
-          <a:stretch/>
-        </p:blipFill>
-        <p:spPr>
-          <a:xfrm>
-            <a:off x="4476751" y="2170750"/>
-            <a:ext cx="3035300" cy="2807650"/>
-          </a:xfrm>
-          <a:prstGeom prst="rect">
-            <a:avLst/>
-          </a:prstGeom>
-        </p:spPr>
-      </p:pic>
-      <p:sp>
-        <p:nvSpPr>
-          <p:cNvPr id="3" name="Arrow: Curved Left 2">
-            <a:extLst>
-              <a:ext uri="{FF2B5EF4-FFF2-40B4-BE49-F238E27FC236}">
-                <a16:creationId xmlns:a16="http://schemas.microsoft.com/office/drawing/2014/main" id="{553EA8F3-3BF9-4F6A-9336-C8F36EEE5500}"/>
-              </a:ext>
-            </a:extLst>
-          </p:cNvPr>
-          <p:cNvSpPr/>
-          <p:nvPr/>
-        </p:nvSpPr>
-        <p:spPr>
-          <a:xfrm>
-            <a:off x="6296297" y="2736333"/>
-            <a:ext cx="948528" cy="1897773"/>
-          </a:xfrm>
-          <a:prstGeom prst="curvedLeftArrow">
-            <a:avLst>
-              <a:gd name="adj1" fmla="val 18048"/>
-              <a:gd name="adj2" fmla="val 50000"/>
-              <a:gd name="adj3" fmla="val 39338"/>
-            </a:avLst>
-          </a:prstGeom>
-          <a:solidFill>
-            <a:srgbClr val="FFFF00"/>
-          </a:solidFill>
-        </p:spPr>
-        <p:style>
-          <a:lnRef idx="0">
-            <a:schemeClr val="accent4"/>
-          </a:lnRef>
-          <a:fillRef idx="3">
-            <a:schemeClr val="accent4"/>
-          </a:fillRef>
-          <a:effectRef idx="3">
-            <a:schemeClr val="accent4"/>
-          </a:effectRef>
-          <a:fontRef idx="minor">
-            <a:schemeClr val="lt1"/>
-          </a:fontRef>
-        </p:style>
-        <p:txBody>
-          <a:bodyPr rtlCol="0" anchor="ctr"/>
-          <a:lstStyle/>
-          <a:p>
-            <a:pPr algn="ctr"/>
-            <a:endParaRPr lang="en-US">
-              <a:solidFill>
-                <a:schemeClr val="tx1"/>
-              </a:solidFill>
-            </a:endParaRPr>
-          </a:p>
-        </p:txBody>
-      </p:sp>
-      <p:sp>
-        <p:nvSpPr>
-          <p:cNvPr id="5" name="Arrow: Curved Left 4">
-            <a:extLst>
-              <a:ext uri="{FF2B5EF4-FFF2-40B4-BE49-F238E27FC236}">
-                <a16:creationId xmlns:a16="http://schemas.microsoft.com/office/drawing/2014/main" id="{D8C208C2-D625-476D-AB9B-A5A8754B6CBB}"/>
-              </a:ext>
-            </a:extLst>
-          </p:cNvPr>
-          <p:cNvSpPr/>
-          <p:nvPr/>
-        </p:nvSpPr>
-        <p:spPr>
-          <a:xfrm rot="10800000">
-            <a:off x="4745977" y="2613671"/>
-            <a:ext cx="887825" cy="1897773"/>
-          </a:xfrm>
-          <a:prstGeom prst="curvedLeftArrow">
-            <a:avLst>
-              <a:gd name="adj1" fmla="val 18048"/>
-              <a:gd name="adj2" fmla="val 50000"/>
-              <a:gd name="adj3" fmla="val 39338"/>
-            </a:avLst>
-          </a:prstGeom>
-          <a:solidFill>
-            <a:srgbClr val="FFFF00"/>
-          </a:solidFill>
-        </p:spPr>
-        <p:style>
-          <a:lnRef idx="0">
-            <a:schemeClr val="accent4"/>
-          </a:lnRef>
-          <a:fillRef idx="3">
-            <a:schemeClr val="accent4"/>
-          </a:fillRef>
-          <a:effectRef idx="3">
-            <a:schemeClr val="accent4"/>
-          </a:effectRef>
-          <a:fontRef idx="minor">
-            <a:schemeClr val="lt1"/>
-          </a:fontRef>
-        </p:style>
-        <p:txBody>
-          <a:bodyPr rtlCol="0" anchor="ctr"/>
-          <a:lstStyle/>
-          <a:p>
-            <a:pPr algn="ctr"/>
-            <a:endParaRPr lang="en-US">
-              <a:solidFill>
-                <a:schemeClr val="tx1"/>
-              </a:solidFill>
-            </a:endParaRPr>
-          </a:p>
-        </p:txBody>
-      </p:sp>
-      <p:sp>
-        <p:nvSpPr>
-          <p:cNvPr id="4" name="Rectangle 3">
-            <a:extLst>
-              <a:ext uri="{FF2B5EF4-FFF2-40B4-BE49-F238E27FC236}">
-                <a16:creationId xmlns:a16="http://schemas.microsoft.com/office/drawing/2014/main" id="{7B0A359F-E561-4E2A-AF05-B22EF1230944}"/>
-              </a:ext>
-            </a:extLst>
-          </p:cNvPr>
-          <p:cNvSpPr/>
-          <p:nvPr/>
-        </p:nvSpPr>
-        <p:spPr>
-          <a:xfrm>
-            <a:off x="4748106" y="3071811"/>
-            <a:ext cx="2451310" cy="1038225"/>
-          </a:xfrm>
-          <a:prstGeom prst="rect">
-            <a:avLst/>
-          </a:prstGeom>
-          <a:noFill/>
-          <a:ln>
-            <a:noFill/>
-          </a:ln>
-        </p:spPr>
-        <p:style>
-          <a:lnRef idx="2">
-            <a:schemeClr val="accent1">
-              <a:shade val="50000"/>
-            </a:schemeClr>
-          </a:lnRef>
-          <a:fillRef idx="1">
-            <a:schemeClr val="accent1"/>
-          </a:fillRef>
-          <a:effectRef idx="0">
-            <a:schemeClr val="accent1"/>
-          </a:effectRef>
-          <a:fontRef idx="minor">
-            <a:schemeClr val="lt1"/>
-          </a:fontRef>
-        </p:style>
-        <p:txBody>
-          <a:bodyPr rtlCol="0" anchor="ctr"/>
-          <a:lstStyle/>
-          <a:p>
-            <a:pPr algn="ctr"/>
-            <a:r>
-              <a:rPr lang="en-US" sz="11500" dirty="0">
-                <a:solidFill>
-                  <a:srgbClr val="FFFF00"/>
-                </a:solidFill>
-                <a:effectLst>
-                  <a:outerShdw blurRad="50800" dist="38100" dir="10800000" algn="r" rotWithShape="0">
-                    <a:prstClr val="black">
-                      <a:alpha val="40000"/>
-                    </a:prstClr>
-                  </a:outerShdw>
-                </a:effectLst>
-              </a:rPr>
-              <a:t>180</a:t>
-            </a:r>
-          </a:p>
-        </p:txBody>
-      </p:sp>
-    </p:spTree>
-    <p:extLst>
-      <p:ext uri="{BB962C8B-B14F-4D97-AF65-F5344CB8AC3E}">
-        <p14:creationId xmlns:p14="http://schemas.microsoft.com/office/powerpoint/2010/main" val="415986124"/>
-      </p:ext>
-    </p:extLst>
-  </p:cSld>
-  <p:clrMapOvr>
-    <a:masterClrMapping/>
-  </p:clrMapOvr>
-</p:sld>
-</file>
-
-<file path=ppt/slides/slide17.xml><?xml version="1.0" encoding="utf-8"?>
-<p:sld xmlns:a="http://schemas.openxmlformats.org/drawingml/2006/main" xmlns:r="http://schemas.openxmlformats.org/officeDocument/2006/relationships" xmlns:p="http://schemas.openxmlformats.org/presentationml/2006/main">
-  <p:cSld>
-    <p:spTree>
-      <p:nvGrpSpPr>
-        <p:cNvPr id="1" name=""/>
-        <p:cNvGrpSpPr/>
-        <p:nvPr/>
-      </p:nvGrpSpPr>
-      <p:grpSpPr>
-        <a:xfrm>
-          <a:off x="0" y="0"/>
-          <a:ext cx="0" cy="0"/>
-          <a:chOff x="0" y="0"/>
-          <a:chExt cx="0" cy="0"/>
-        </a:xfrm>
-      </p:grpSpPr>
-      <p:pic>
-        <p:nvPicPr>
-          <p:cNvPr id="7" name="Picture 6">
-            <a:extLst>
-              <a:ext uri="{FF2B5EF4-FFF2-40B4-BE49-F238E27FC236}">
-                <a16:creationId xmlns:a16="http://schemas.microsoft.com/office/drawing/2014/main" id="{FC6CC54F-4F24-47A6-AC28-00ECA2B89101}"/>
-              </a:ext>
-            </a:extLst>
-          </p:cNvPr>
-          <p:cNvPicPr>
-            <a:picLocks noChangeAspect="1"/>
-          </p:cNvPicPr>
-          <p:nvPr/>
-        </p:nvPicPr>
-        <p:blipFill>
-          <a:blip r:embed="rId3"/>
-          <a:stretch>
-            <a:fillRect/>
-          </a:stretch>
-        </p:blipFill>
-        <p:spPr>
-          <a:xfrm>
-            <a:off x="4361036" y="2143124"/>
-            <a:ext cx="2837082" cy="2250100"/>
-          </a:xfrm>
-          <a:prstGeom prst="rect">
-            <a:avLst/>
-          </a:prstGeom>
-        </p:spPr>
-      </p:pic>
-      <p:sp>
-        <p:nvSpPr>
-          <p:cNvPr id="8" name="Arrow: Left-Right 7">
-            <a:extLst>
-              <a:ext uri="{FF2B5EF4-FFF2-40B4-BE49-F238E27FC236}">
-                <a16:creationId xmlns:a16="http://schemas.microsoft.com/office/drawing/2014/main" id="{992E4B48-C2ED-435D-BE82-5BDA82DD4DA6}"/>
-              </a:ext>
-            </a:extLst>
-          </p:cNvPr>
-          <p:cNvSpPr/>
-          <p:nvPr/>
-        </p:nvSpPr>
-        <p:spPr>
-          <a:xfrm>
-            <a:off x="5455726" y="2934277"/>
-            <a:ext cx="628650" cy="787384"/>
-          </a:xfrm>
-          <a:prstGeom prst="leftRightArrow">
-            <a:avLst>
-              <a:gd name="adj1" fmla="val 18775"/>
-              <a:gd name="adj2" fmla="val 35555"/>
-            </a:avLst>
-          </a:prstGeom>
-          <a:solidFill>
-            <a:srgbClr val="FFFF00"/>
-          </a:solidFill>
-        </p:spPr>
-        <p:style>
-          <a:lnRef idx="0">
-            <a:schemeClr val="accent4"/>
-          </a:lnRef>
-          <a:fillRef idx="3">
-            <a:schemeClr val="accent4"/>
-          </a:fillRef>
-          <a:effectRef idx="3">
-            <a:schemeClr val="accent4"/>
-          </a:effectRef>
-          <a:fontRef idx="minor">
-            <a:schemeClr val="lt1"/>
-          </a:fontRef>
-        </p:style>
-        <p:txBody>
-          <a:bodyPr rtlCol="0" anchor="ctr"/>
-          <a:lstStyle/>
-          <a:p>
-            <a:pPr algn="ctr"/>
-            <a:endParaRPr lang="en-US">
-              <a:solidFill>
-                <a:srgbClr val="FFFF00"/>
-              </a:solidFill>
-              <a:effectLst>
-                <a:outerShdw blurRad="50800" dist="38100" dir="10800000" algn="r" rotWithShape="0">
-                  <a:prstClr val="black">
-                    <a:alpha val="40000"/>
-                  </a:prstClr>
-                </a:outerShdw>
-              </a:effectLst>
-            </a:endParaRPr>
-          </a:p>
-        </p:txBody>
-      </p:sp>
-    </p:spTree>
-    <p:extLst>
-      <p:ext uri="{BB962C8B-B14F-4D97-AF65-F5344CB8AC3E}">
-        <p14:creationId xmlns:p14="http://schemas.microsoft.com/office/powerpoint/2010/main" val="3246792119"/>
-      </p:ext>
-    </p:extLst>
-  </p:cSld>
-  <p:clrMapOvr>
-    <a:masterClrMapping/>
-  </p:clrMapOvr>
-</p:sld>
-</file>
-
-<file path=ppt/slides/slide2.xml><?xml version="1.0" encoding="utf-8"?>
+<file path=ppt/slides/slide3.xml><?xml version="1.0" encoding="utf-8"?>
 <p:sld xmlns:a="http://schemas.openxmlformats.org/drawingml/2006/main" xmlns:r="http://schemas.openxmlformats.org/officeDocument/2006/relationships" xmlns:p="http://schemas.openxmlformats.org/presentationml/2006/main">
   <p:cSld>
     <p:spTree>
@@ -6416,7 +6586,7 @@
 </p:sld>
 </file>
 
-<file path=ppt/slides/slide3.xml><?xml version="1.0" encoding="utf-8"?>
+<file path=ppt/slides/slide4.xml><?xml version="1.0" encoding="utf-8"?>
 <p:sld xmlns:a="http://schemas.openxmlformats.org/drawingml/2006/main" xmlns:r="http://schemas.openxmlformats.org/officeDocument/2006/relationships" xmlns:p="http://schemas.openxmlformats.org/presentationml/2006/main">
   <p:cSld>
     <p:spTree>
@@ -6599,7 +6769,7 @@
 </p:sld>
 </file>
 
-<file path=ppt/slides/slide4.xml><?xml version="1.0" encoding="utf-8"?>
+<file path=ppt/slides/slide5.xml><?xml version="1.0" encoding="utf-8"?>
 <p:sld xmlns:a="http://schemas.openxmlformats.org/drawingml/2006/main" xmlns:r="http://schemas.openxmlformats.org/officeDocument/2006/relationships" xmlns:p="http://schemas.openxmlformats.org/presentationml/2006/main">
   <p:cSld>
     <p:spTree>
@@ -6798,8 +6968,8 @@
         </p:nvSpPr>
         <p:spPr>
           <a:xfrm>
-            <a:off x="5745101" y="2353128"/>
-            <a:ext cx="423832" cy="769441"/>
+            <a:off x="5321071" y="2058650"/>
+            <a:ext cx="423832" cy="1107996"/>
           </a:xfrm>
           <a:prstGeom prst="rect">
             <a:avLst/>
@@ -6833,7 +7003,7 @@
           <a:p>
             <a:pPr algn="ctr"/>
             <a:r>
-              <a:rPr lang="en-US" sz="4400" dirty="0">
+              <a:rPr lang="en-US" sz="6600" dirty="0">
                 <a:solidFill>
                   <a:srgbClr val="FFFF00"/>
                 </a:solidFill>
@@ -6995,8 +7165,8 @@
         </p:nvSpPr>
         <p:spPr>
           <a:xfrm>
-            <a:off x="6309370" y="2353127"/>
-            <a:ext cx="423832" cy="769441"/>
+            <a:off x="6645139" y="2058650"/>
+            <a:ext cx="423832" cy="1107996"/>
           </a:xfrm>
           <a:prstGeom prst="rect">
             <a:avLst/>
@@ -7030,7 +7200,7 @@
           <a:p>
             <a:pPr algn="ctr"/>
             <a:r>
-              <a:rPr lang="en-US" sz="4400" dirty="0">
+              <a:rPr lang="en-US" sz="6600" dirty="0">
                 <a:solidFill>
                   <a:srgbClr val="FFFF00"/>
                 </a:solidFill>
@@ -7054,8 +7224,8 @@
         </p:nvSpPr>
         <p:spPr>
           <a:xfrm>
-            <a:off x="5492958" y="3021644"/>
-            <a:ext cx="423832" cy="769441"/>
+            <a:off x="5201888" y="3242361"/>
+            <a:ext cx="423832" cy="1107996"/>
           </a:xfrm>
           <a:prstGeom prst="rect">
             <a:avLst/>
@@ -7089,7 +7259,7 @@
           <a:p>
             <a:pPr algn="ctr"/>
             <a:r>
-              <a:rPr lang="en-US" sz="4400" dirty="0">
+              <a:rPr lang="en-US" sz="6600" dirty="0">
                 <a:solidFill>
                   <a:srgbClr val="FFFF00"/>
                 </a:solidFill>
@@ -7113,8 +7283,8 @@
         </p:nvSpPr>
         <p:spPr>
           <a:xfrm>
-            <a:off x="5966029" y="3316218"/>
-            <a:ext cx="423832" cy="769441"/>
+            <a:off x="5991824" y="3523497"/>
+            <a:ext cx="423832" cy="1107996"/>
           </a:xfrm>
           <a:prstGeom prst="rect">
             <a:avLst/>
@@ -7148,7 +7318,7 @@
           <a:p>
             <a:pPr algn="ctr"/>
             <a:r>
-              <a:rPr lang="en-US" sz="4400" dirty="0">
+              <a:rPr lang="en-US" sz="6600" dirty="0">
                 <a:solidFill>
                   <a:srgbClr val="FFFF00"/>
                 </a:solidFill>
@@ -7172,8 +7342,8 @@
         </p:nvSpPr>
         <p:spPr>
           <a:xfrm>
-            <a:off x="6445389" y="3021644"/>
-            <a:ext cx="423832" cy="769441"/>
+            <a:off x="6814986" y="3242361"/>
+            <a:ext cx="423832" cy="1107996"/>
           </a:xfrm>
           <a:prstGeom prst="rect">
             <a:avLst/>
@@ -7207,7 +7377,7 @@
           <a:p>
             <a:pPr algn="ctr"/>
             <a:r>
-              <a:rPr lang="en-US" sz="4400" dirty="0">
+              <a:rPr lang="en-US" sz="6600" dirty="0">
                 <a:solidFill>
                   <a:srgbClr val="FFFF00"/>
                 </a:solidFill>
@@ -7231,8 +7401,8 @@
         </p:nvSpPr>
         <p:spPr>
           <a:xfrm>
-            <a:off x="5983646" y="2847063"/>
-            <a:ext cx="423832" cy="769441"/>
+            <a:off x="6018384" y="2688363"/>
+            <a:ext cx="423832" cy="1107996"/>
           </a:xfrm>
           <a:prstGeom prst="rect">
             <a:avLst/>
@@ -7266,7 +7436,7 @@
           <a:p>
             <a:pPr algn="ctr"/>
             <a:r>
-              <a:rPr lang="en-US" sz="4400" dirty="0">
+              <a:rPr lang="en-US" sz="6600" dirty="0">
                 <a:solidFill>
                   <a:srgbClr val="FFFF00"/>
                 </a:solidFill>
@@ -7289,7 +7459,7 @@
 </p:sld>
 </file>
 
-<file path=ppt/slides/slide5.xml><?xml version="1.0" encoding="utf-8"?>
+<file path=ppt/slides/slide6.xml><?xml version="1.0" encoding="utf-8"?>
 <p:sld xmlns:a="http://schemas.openxmlformats.org/drawingml/2006/main" xmlns:r="http://schemas.openxmlformats.org/officeDocument/2006/relationships" xmlns:p="http://schemas.openxmlformats.org/presentationml/2006/main">
   <p:cSld>
     <p:spTree>
@@ -7397,7 +7567,7 @@
 </p:sld>
 </file>
 
-<file path=ppt/slides/slide6.xml><?xml version="1.0" encoding="utf-8"?>
+<file path=ppt/slides/slide7.xml><?xml version="1.0" encoding="utf-8"?>
 <p:sld xmlns:a="http://schemas.openxmlformats.org/drawingml/2006/main" xmlns:r="http://schemas.openxmlformats.org/officeDocument/2006/relationships" xmlns:p="http://schemas.openxmlformats.org/presentationml/2006/main">
   <p:cSld>
     <p:spTree>
@@ -7444,6 +7614,36 @@
           </a:prstGeom>
         </p:spPr>
       </p:pic>
+      <p:pic>
+        <p:nvPicPr>
+          <p:cNvPr id="2" name="Picture 1">
+            <a:extLst>
+              <a:ext uri="{FF2B5EF4-FFF2-40B4-BE49-F238E27FC236}">
+                <a16:creationId xmlns:a16="http://schemas.microsoft.com/office/drawing/2014/main" id="{FFA81468-0428-4959-B073-750AA1B7CC7F}"/>
+              </a:ext>
+            </a:extLst>
+          </p:cNvPr>
+          <p:cNvPicPr>
+            <a:picLocks noChangeAspect="1"/>
+          </p:cNvPicPr>
+          <p:nvPr/>
+        </p:nvPicPr>
+        <p:blipFill>
+          <a:blip r:embed="rId4"/>
+          <a:stretch>
+            <a:fillRect/>
+          </a:stretch>
+        </p:blipFill>
+        <p:spPr>
+          <a:xfrm>
+            <a:off x="4938713" y="2193785"/>
+            <a:ext cx="885825" cy="857250"/>
+          </a:xfrm>
+          <a:prstGeom prst="rect">
+            <a:avLst/>
+          </a:prstGeom>
+        </p:spPr>
+      </p:pic>
     </p:spTree>
     <p:extLst>
       <p:ext uri="{BB962C8B-B14F-4D97-AF65-F5344CB8AC3E}">
@@ -7457,7 +7657,7 @@
 </p:sld>
 </file>
 
-<file path=ppt/slides/slide7.xml><?xml version="1.0" encoding="utf-8"?>
+<file path=ppt/slides/slide8.xml><?xml version="1.0" encoding="utf-8"?>
 <p:sld xmlns:a="http://schemas.openxmlformats.org/drawingml/2006/main" xmlns:r="http://schemas.openxmlformats.org/officeDocument/2006/relationships" xmlns:p="http://schemas.openxmlformats.org/presentationml/2006/main">
   <p:cSld>
     <p:spTree>
@@ -7517,8 +7717,8 @@
         </p:nvSpPr>
         <p:spPr>
           <a:xfrm rot="20947113">
-            <a:off x="4136026" y="1914315"/>
-            <a:ext cx="423832" cy="769441"/>
+            <a:off x="4136026" y="1745039"/>
+            <a:ext cx="423832" cy="1107996"/>
           </a:xfrm>
           <a:prstGeom prst="rect">
             <a:avLst/>
@@ -7552,7 +7752,7 @@
           <a:p>
             <a:pPr algn="ctr"/>
             <a:r>
-              <a:rPr lang="en-US" sz="4400" dirty="0">
+              <a:rPr lang="en-US" sz="6600" dirty="0">
                 <a:solidFill>
                   <a:srgbClr val="FFFF00"/>
                 </a:solidFill>
@@ -7576,8 +7776,8 @@
         </p:nvSpPr>
         <p:spPr>
           <a:xfrm rot="20693841">
-            <a:off x="6299845" y="1278887"/>
-            <a:ext cx="423832" cy="769441"/>
+            <a:off x="6299845" y="1109611"/>
+            <a:ext cx="423832" cy="1107996"/>
           </a:xfrm>
           <a:prstGeom prst="rect">
             <a:avLst/>
@@ -7611,7 +7811,7 @@
           <a:p>
             <a:pPr algn="ctr"/>
             <a:r>
-              <a:rPr lang="en-US" sz="4400" dirty="0">
+              <a:rPr lang="en-US" sz="6600" dirty="0">
                 <a:solidFill>
                   <a:srgbClr val="FFFF00"/>
                 </a:solidFill>
@@ -7635,8 +7835,8 @@
         </p:nvSpPr>
         <p:spPr>
           <a:xfrm rot="20863819">
-            <a:off x="4892883" y="3469454"/>
-            <a:ext cx="423832" cy="769441"/>
+            <a:off x="4892883" y="3300178"/>
+            <a:ext cx="423832" cy="1107996"/>
           </a:xfrm>
           <a:prstGeom prst="rect">
             <a:avLst/>
@@ -7670,7 +7870,7 @@
           <a:p>
             <a:pPr algn="ctr"/>
             <a:r>
-              <a:rPr lang="en-US" sz="4400" dirty="0">
+              <a:rPr lang="en-US" sz="6600" dirty="0">
                 <a:solidFill>
                   <a:srgbClr val="FFFF00"/>
                 </a:solidFill>
@@ -7694,8 +7894,8 @@
         </p:nvSpPr>
         <p:spPr>
           <a:xfrm rot="20592803">
-            <a:off x="6331130" y="3429000"/>
-            <a:ext cx="423832" cy="769441"/>
+            <a:off x="6331130" y="3259724"/>
+            <a:ext cx="423832" cy="1107996"/>
           </a:xfrm>
           <a:prstGeom prst="rect">
             <a:avLst/>
@@ -7729,7 +7929,7 @@
           <a:p>
             <a:pPr algn="ctr"/>
             <a:r>
-              <a:rPr lang="en-US" sz="4400" dirty="0">
+              <a:rPr lang="en-US" sz="6600" dirty="0">
                 <a:solidFill>
                   <a:srgbClr val="FFFF00"/>
                 </a:solidFill>
@@ -7753,8 +7953,8 @@
         </p:nvSpPr>
         <p:spPr>
           <a:xfrm rot="20600239">
-            <a:off x="5598224" y="4154983"/>
-            <a:ext cx="423832" cy="769441"/>
+            <a:off x="5598224" y="3985707"/>
+            <a:ext cx="423832" cy="1107996"/>
           </a:xfrm>
           <a:prstGeom prst="rect">
             <a:avLst/>
@@ -7788,7 +7988,7 @@
           <a:p>
             <a:pPr algn="ctr"/>
             <a:r>
-              <a:rPr lang="en-US" sz="4400" dirty="0">
+              <a:rPr lang="en-US" sz="6600" dirty="0">
                 <a:solidFill>
                   <a:srgbClr val="FFFF00"/>
                 </a:solidFill>
@@ -7870,7 +8070,7 @@
 </p:sld>
 </file>
 
-<file path=ppt/slides/slide8.xml><?xml version="1.0" encoding="utf-8"?>
+<file path=ppt/slides/slide9.xml><?xml version="1.0" encoding="utf-8"?>
 <p:sld xmlns:a="http://schemas.openxmlformats.org/drawingml/2006/main" xmlns:r="http://schemas.openxmlformats.org/officeDocument/2006/relationships" xmlns:p="http://schemas.openxmlformats.org/presentationml/2006/main">
   <p:cSld>
     <p:spTree>
@@ -7969,114 +8169,6 @@
     <p:extLst>
       <p:ext uri="{BB962C8B-B14F-4D97-AF65-F5344CB8AC3E}">
         <p14:creationId xmlns:p14="http://schemas.microsoft.com/office/powerpoint/2010/main" val="1157997097"/>
-      </p:ext>
-    </p:extLst>
-  </p:cSld>
-  <p:clrMapOvr>
-    <a:masterClrMapping/>
-  </p:clrMapOvr>
-</p:sld>
-</file>
-
-<file path=ppt/slides/slide9.xml><?xml version="1.0" encoding="utf-8"?>
-<p:sld xmlns:a="http://schemas.openxmlformats.org/drawingml/2006/main" xmlns:r="http://schemas.openxmlformats.org/officeDocument/2006/relationships" xmlns:p="http://schemas.openxmlformats.org/presentationml/2006/main">
-  <p:cSld>
-    <p:spTree>
-      <p:nvGrpSpPr>
-        <p:cNvPr id="1" name=""/>
-        <p:cNvGrpSpPr/>
-        <p:nvPr/>
-      </p:nvGrpSpPr>
-      <p:grpSpPr>
-        <a:xfrm>
-          <a:off x="0" y="0"/>
-          <a:ext cx="0" cy="0"/>
-          <a:chOff x="0" y="0"/>
-          <a:chExt cx="0" cy="0"/>
-        </a:xfrm>
-      </p:grpSpPr>
-      <p:pic>
-        <p:nvPicPr>
-          <p:cNvPr id="2" name="Picture 1">
-            <a:extLst>
-              <a:ext uri="{FF2B5EF4-FFF2-40B4-BE49-F238E27FC236}">
-                <a16:creationId xmlns:a16="http://schemas.microsoft.com/office/drawing/2014/main" id="{810E4F26-075C-4F8E-B53A-135C51CBBCEC}"/>
-              </a:ext>
-            </a:extLst>
-          </p:cNvPr>
-          <p:cNvPicPr>
-            <a:picLocks noChangeAspect="1"/>
-          </p:cNvPicPr>
-          <p:nvPr/>
-        </p:nvPicPr>
-        <p:blipFill rotWithShape="1">
-          <a:blip r:embed="rId3"/>
-          <a:srcRect l="22135" t="582" r="23110" b="44060"/>
-          <a:stretch/>
-        </p:blipFill>
-        <p:spPr>
-          <a:xfrm>
-            <a:off x="3962400" y="1257299"/>
-            <a:ext cx="3638549" cy="3667125"/>
-          </a:xfrm>
-          <a:prstGeom prst="rect">
-            <a:avLst/>
-          </a:prstGeom>
-        </p:spPr>
-      </p:pic>
-      <p:sp>
-        <p:nvSpPr>
-          <p:cNvPr id="5" name="Rectangle 4">
-            <a:extLst>
-              <a:ext uri="{FF2B5EF4-FFF2-40B4-BE49-F238E27FC236}">
-                <a16:creationId xmlns:a16="http://schemas.microsoft.com/office/drawing/2014/main" id="{9C9D6F7C-D5B3-4ED3-A70C-9007FE21517F}"/>
-              </a:ext>
-            </a:extLst>
-          </p:cNvPr>
-          <p:cNvSpPr/>
-          <p:nvPr/>
-        </p:nvSpPr>
-        <p:spPr>
-          <a:xfrm>
-            <a:off x="4010025" y="2981325"/>
-            <a:ext cx="3533774" cy="209550"/>
-          </a:xfrm>
-          <a:prstGeom prst="rect">
-            <a:avLst/>
-          </a:prstGeom>
-          <a:solidFill>
-            <a:srgbClr val="FF0000"/>
-          </a:solidFill>
-        </p:spPr>
-        <p:style>
-          <a:lnRef idx="2">
-            <a:schemeClr val="accent1">
-              <a:shade val="50000"/>
-            </a:schemeClr>
-          </a:lnRef>
-          <a:fillRef idx="1">
-            <a:schemeClr val="accent1"/>
-          </a:fillRef>
-          <a:effectRef idx="0">
-            <a:schemeClr val="accent1"/>
-          </a:effectRef>
-          <a:fontRef idx="minor">
-            <a:schemeClr val="lt1"/>
-          </a:fontRef>
-        </p:style>
-        <p:txBody>
-          <a:bodyPr rtlCol="0" anchor="ctr"/>
-          <a:lstStyle/>
-          <a:p>
-            <a:pPr algn="ctr"/>
-            <a:endParaRPr lang="en-US"/>
-          </a:p>
-        </p:txBody>
-      </p:sp>
-    </p:spTree>
-    <p:extLst>
-      <p:ext uri="{BB962C8B-B14F-4D97-AF65-F5344CB8AC3E}">
-        <p14:creationId xmlns:p14="http://schemas.microsoft.com/office/powerpoint/2010/main" val="872767627"/>
       </p:ext>
     </p:extLst>
   </p:cSld>

</xml_diff>

<commit_message>
Sound FX updates and new spell
</commit_message>
<xml_diff>
--- a/Art/SpellImageWork.pptx
+++ b/Art/SpellImageWork.pptx
@@ -5,7 +5,7 @@
     <p:sldMasterId id="2147483648" r:id="rId1"/>
   </p:sldMasterIdLst>
   <p:notesMasterIdLst>
-    <p:notesMasterId r:id="rId21"/>
+    <p:notesMasterId r:id="rId22"/>
   </p:notesMasterIdLst>
   <p:sldIdLst>
     <p:sldId id="273" r:id="rId2"/>
@@ -18,15 +18,16 @@
     <p:sldId id="268" r:id="rId9"/>
     <p:sldId id="262" r:id="rId10"/>
     <p:sldId id="272" r:id="rId11"/>
-    <p:sldId id="263" r:id="rId12"/>
-    <p:sldId id="265" r:id="rId13"/>
-    <p:sldId id="264" r:id="rId14"/>
-    <p:sldId id="266" r:id="rId15"/>
-    <p:sldId id="258" r:id="rId16"/>
-    <p:sldId id="267" r:id="rId17"/>
-    <p:sldId id="259" r:id="rId18"/>
-    <p:sldId id="260" r:id="rId19"/>
-    <p:sldId id="256" r:id="rId20"/>
+    <p:sldId id="275" r:id="rId12"/>
+    <p:sldId id="263" r:id="rId13"/>
+    <p:sldId id="265" r:id="rId14"/>
+    <p:sldId id="264" r:id="rId15"/>
+    <p:sldId id="266" r:id="rId16"/>
+    <p:sldId id="258" r:id="rId17"/>
+    <p:sldId id="267" r:id="rId18"/>
+    <p:sldId id="259" r:id="rId19"/>
+    <p:sldId id="260" r:id="rId20"/>
+    <p:sldId id="256" r:id="rId21"/>
   </p:sldIdLst>
   <p:sldSz cx="12192000" cy="6858000"/>
   <p:notesSz cx="6858000" cy="9144000"/>
@@ -133,10 +134,6 @@
 </p:presentation>
 </file>
 
-<file path=ppt/revisionInfo.xml><?xml version="1.0" encoding="utf-8"?>
-<p1510:revInfo xmlns:a="http://schemas.openxmlformats.org/drawingml/2006/main" xmlns:r="http://schemas.openxmlformats.org/officeDocument/2006/relationships" xmlns:p1510="http://schemas.microsoft.com/office/powerpoint/2015/10/main"/>
-</file>
-
 <file path=ppt/notesMasters/notesMaster1.xml><?xml version="1.0" encoding="utf-8"?>
 <p:notesMaster xmlns:a="http://schemas.openxmlformats.org/drawingml/2006/main" xmlns:r="http://schemas.openxmlformats.org/officeDocument/2006/relationships" xmlns:p="http://schemas.openxmlformats.org/presentationml/2006/main">
   <p:cSld>
@@ -219,7 +216,7 @@
           <a:p>
             <a:fld id="{885F340B-B2F0-44D2-B94A-CA6CE60D6424}" type="datetimeFigureOut">
               <a:rPr lang="en-US" smtClean="0"/>
-              <a:t>12/19/2017</a:t>
+              <a:t>3/9/2018</a:t>
             </a:fld>
             <a:endParaRPr lang="en-US"/>
           </a:p>
@@ -728,7 +725,7 @@
     </p:spTree>
     <p:extLst>
       <p:ext uri="{BB962C8B-B14F-4D97-AF65-F5344CB8AC3E}">
-        <p14:creationId xmlns:p14="http://schemas.microsoft.com/office/powerpoint/2010/main" val="1609716475"/>
+        <p14:creationId xmlns:p14="http://schemas.microsoft.com/office/powerpoint/2010/main" val="593930906"/>
       </p:ext>
     </p:extLst>
   </p:cSld>
@@ -812,7 +809,7 @@
     </p:spTree>
     <p:extLst>
       <p:ext uri="{BB962C8B-B14F-4D97-AF65-F5344CB8AC3E}">
-        <p14:creationId xmlns:p14="http://schemas.microsoft.com/office/powerpoint/2010/main" val="3071738978"/>
+        <p14:creationId xmlns:p14="http://schemas.microsoft.com/office/powerpoint/2010/main" val="1609716475"/>
       </p:ext>
     </p:extLst>
   </p:cSld>
@@ -896,7 +893,7 @@
     </p:spTree>
     <p:extLst>
       <p:ext uri="{BB962C8B-B14F-4D97-AF65-F5344CB8AC3E}">
-        <p14:creationId xmlns:p14="http://schemas.microsoft.com/office/powerpoint/2010/main" val="3507851252"/>
+        <p14:creationId xmlns:p14="http://schemas.microsoft.com/office/powerpoint/2010/main" val="3071738978"/>
       </p:ext>
     </p:extLst>
   </p:cSld>
@@ -980,7 +977,7 @@
     </p:spTree>
     <p:extLst>
       <p:ext uri="{BB962C8B-B14F-4D97-AF65-F5344CB8AC3E}">
-        <p14:creationId xmlns:p14="http://schemas.microsoft.com/office/powerpoint/2010/main" val="2227256533"/>
+        <p14:creationId xmlns:p14="http://schemas.microsoft.com/office/powerpoint/2010/main" val="3507851252"/>
       </p:ext>
     </p:extLst>
   </p:cSld>
@@ -1064,7 +1061,7 @@
     </p:spTree>
     <p:extLst>
       <p:ext uri="{BB962C8B-B14F-4D97-AF65-F5344CB8AC3E}">
-        <p14:creationId xmlns:p14="http://schemas.microsoft.com/office/powerpoint/2010/main" val="937330666"/>
+        <p14:creationId xmlns:p14="http://schemas.microsoft.com/office/powerpoint/2010/main" val="2227256533"/>
       </p:ext>
     </p:extLst>
   </p:cSld>
@@ -1148,7 +1145,7 @@
     </p:spTree>
     <p:extLst>
       <p:ext uri="{BB962C8B-B14F-4D97-AF65-F5344CB8AC3E}">
-        <p14:creationId xmlns:p14="http://schemas.microsoft.com/office/powerpoint/2010/main" val="1181008352"/>
+        <p14:creationId xmlns:p14="http://schemas.microsoft.com/office/powerpoint/2010/main" val="937330666"/>
       </p:ext>
     </p:extLst>
   </p:cSld>
@@ -1232,7 +1229,7 @@
     </p:spTree>
     <p:extLst>
       <p:ext uri="{BB962C8B-B14F-4D97-AF65-F5344CB8AC3E}">
-        <p14:creationId xmlns:p14="http://schemas.microsoft.com/office/powerpoint/2010/main" val="1616101520"/>
+        <p14:creationId xmlns:p14="http://schemas.microsoft.com/office/powerpoint/2010/main" val="1181008352"/>
       </p:ext>
     </p:extLst>
   </p:cSld>
@@ -1316,7 +1313,7 @@
     </p:spTree>
     <p:extLst>
       <p:ext uri="{BB962C8B-B14F-4D97-AF65-F5344CB8AC3E}">
-        <p14:creationId xmlns:p14="http://schemas.microsoft.com/office/powerpoint/2010/main" val="1211650007"/>
+        <p14:creationId xmlns:p14="http://schemas.microsoft.com/office/powerpoint/2010/main" val="1616101520"/>
       </p:ext>
     </p:extLst>
   </p:cSld>
@@ -1400,7 +1397,7 @@
     </p:spTree>
     <p:extLst>
       <p:ext uri="{BB962C8B-B14F-4D97-AF65-F5344CB8AC3E}">
-        <p14:creationId xmlns:p14="http://schemas.microsoft.com/office/powerpoint/2010/main" val="2074622893"/>
+        <p14:creationId xmlns:p14="http://schemas.microsoft.com/office/powerpoint/2010/main" val="1211650007"/>
       </p:ext>
     </p:extLst>
   </p:cSld>
@@ -1485,6 +1482,90 @@
     <p:extLst>
       <p:ext uri="{BB962C8B-B14F-4D97-AF65-F5344CB8AC3E}">
         <p14:creationId xmlns:p14="http://schemas.microsoft.com/office/powerpoint/2010/main" val="3903295320"/>
+      </p:ext>
+    </p:extLst>
+  </p:cSld>
+  <p:clrMapOvr>
+    <a:masterClrMapping/>
+  </p:clrMapOvr>
+</p:notes>
+</file>
+
+<file path=ppt/notesSlides/notesSlide20.xml><?xml version="1.0" encoding="utf-8"?>
+<p:notes xmlns:a="http://schemas.openxmlformats.org/drawingml/2006/main" xmlns:r="http://schemas.openxmlformats.org/officeDocument/2006/relationships" xmlns:p="http://schemas.openxmlformats.org/presentationml/2006/main">
+  <p:cSld>
+    <p:spTree>
+      <p:nvGrpSpPr>
+        <p:cNvPr id="1" name=""/>
+        <p:cNvGrpSpPr/>
+        <p:nvPr/>
+      </p:nvGrpSpPr>
+      <p:grpSpPr>
+        <a:xfrm>
+          <a:off x="0" y="0"/>
+          <a:ext cx="0" cy="0"/>
+          <a:chOff x="0" y="0"/>
+          <a:chExt cx="0" cy="0"/>
+        </a:xfrm>
+      </p:grpSpPr>
+      <p:sp>
+        <p:nvSpPr>
+          <p:cNvPr id="2" name="Slide Image Placeholder 1"/>
+          <p:cNvSpPr>
+            <a:spLocks noGrp="1" noRot="1" noChangeAspect="1"/>
+          </p:cNvSpPr>
+          <p:nvPr>
+            <p:ph type="sldImg"/>
+          </p:nvPr>
+        </p:nvSpPr>
+        <p:spPr/>
+      </p:sp>
+      <p:sp>
+        <p:nvSpPr>
+          <p:cNvPr id="3" name="Notes Placeholder 2"/>
+          <p:cNvSpPr>
+            <a:spLocks noGrp="1"/>
+          </p:cNvSpPr>
+          <p:nvPr>
+            <p:ph type="body" idx="1"/>
+          </p:nvPr>
+        </p:nvSpPr>
+        <p:spPr/>
+        <p:txBody>
+          <a:bodyPr/>
+          <a:lstStyle/>
+          <a:p>
+            <a:endParaRPr lang="en-US"/>
+          </a:p>
+        </p:txBody>
+      </p:sp>
+      <p:sp>
+        <p:nvSpPr>
+          <p:cNvPr id="4" name="Slide Number Placeholder 3"/>
+          <p:cNvSpPr>
+            <a:spLocks noGrp="1"/>
+          </p:cNvSpPr>
+          <p:nvPr>
+            <p:ph type="sldNum" sz="quarter" idx="10"/>
+          </p:nvPr>
+        </p:nvSpPr>
+        <p:spPr/>
+        <p:txBody>
+          <a:bodyPr/>
+          <a:lstStyle/>
+          <a:p>
+            <a:fld id="{5B19FFF6-9D3A-43A2-9BC5-0E29ACA647E9}" type="slidenum">
+              <a:rPr lang="en-US" smtClean="0"/>
+              <a:t>20</a:t>
+            </a:fld>
+            <a:endParaRPr lang="en-US"/>
+          </a:p>
+        </p:txBody>
+      </p:sp>
+    </p:spTree>
+    <p:extLst>
+      <p:ext uri="{BB962C8B-B14F-4D97-AF65-F5344CB8AC3E}">
+        <p14:creationId xmlns:p14="http://schemas.microsoft.com/office/powerpoint/2010/main" val="2074622893"/>
       </p:ext>
     </p:extLst>
   </p:cSld>
@@ -2229,7 +2310,7 @@
           <a:p>
             <a:fld id="{705F61FD-B4C5-4C11-9C2B-341349F118F3}" type="datetimeFigureOut">
               <a:rPr lang="en-US" smtClean="0"/>
-              <a:t>12/19/2017</a:t>
+              <a:t>3/9/2018</a:t>
             </a:fld>
             <a:endParaRPr lang="en-US"/>
           </a:p>
@@ -2427,7 +2508,7 @@
           <a:p>
             <a:fld id="{705F61FD-B4C5-4C11-9C2B-341349F118F3}" type="datetimeFigureOut">
               <a:rPr lang="en-US" smtClean="0"/>
-              <a:t>12/19/2017</a:t>
+              <a:t>3/9/2018</a:t>
             </a:fld>
             <a:endParaRPr lang="en-US"/>
           </a:p>
@@ -2635,7 +2716,7 @@
           <a:p>
             <a:fld id="{705F61FD-B4C5-4C11-9C2B-341349F118F3}" type="datetimeFigureOut">
               <a:rPr lang="en-US" smtClean="0"/>
-              <a:t>12/19/2017</a:t>
+              <a:t>3/9/2018</a:t>
             </a:fld>
             <a:endParaRPr lang="en-US"/>
           </a:p>
@@ -2833,7 +2914,7 @@
           <a:p>
             <a:fld id="{705F61FD-B4C5-4C11-9C2B-341349F118F3}" type="datetimeFigureOut">
               <a:rPr lang="en-US" smtClean="0"/>
-              <a:t>12/19/2017</a:t>
+              <a:t>3/9/2018</a:t>
             </a:fld>
             <a:endParaRPr lang="en-US"/>
           </a:p>
@@ -3108,7 +3189,7 @@
           <a:p>
             <a:fld id="{705F61FD-B4C5-4C11-9C2B-341349F118F3}" type="datetimeFigureOut">
               <a:rPr lang="en-US" smtClean="0"/>
-              <a:t>12/19/2017</a:t>
+              <a:t>3/9/2018</a:t>
             </a:fld>
             <a:endParaRPr lang="en-US"/>
           </a:p>
@@ -3373,7 +3454,7 @@
           <a:p>
             <a:fld id="{705F61FD-B4C5-4C11-9C2B-341349F118F3}" type="datetimeFigureOut">
               <a:rPr lang="en-US" smtClean="0"/>
-              <a:t>12/19/2017</a:t>
+              <a:t>3/9/2018</a:t>
             </a:fld>
             <a:endParaRPr lang="en-US"/>
           </a:p>
@@ -3785,7 +3866,7 @@
           <a:p>
             <a:fld id="{705F61FD-B4C5-4C11-9C2B-341349F118F3}" type="datetimeFigureOut">
               <a:rPr lang="en-US" smtClean="0"/>
-              <a:t>12/19/2017</a:t>
+              <a:t>3/9/2018</a:t>
             </a:fld>
             <a:endParaRPr lang="en-US"/>
           </a:p>
@@ -3926,7 +4007,7 @@
           <a:p>
             <a:fld id="{705F61FD-B4C5-4C11-9C2B-341349F118F3}" type="datetimeFigureOut">
               <a:rPr lang="en-US" smtClean="0"/>
-              <a:t>12/19/2017</a:t>
+              <a:t>3/9/2018</a:t>
             </a:fld>
             <a:endParaRPr lang="en-US"/>
           </a:p>
@@ -4039,7 +4120,7 @@
           <a:p>
             <a:fld id="{705F61FD-B4C5-4C11-9C2B-341349F118F3}" type="datetimeFigureOut">
               <a:rPr lang="en-US" smtClean="0"/>
-              <a:t>12/19/2017</a:t>
+              <a:t>3/9/2018</a:t>
             </a:fld>
             <a:endParaRPr lang="en-US"/>
           </a:p>
@@ -4350,7 +4431,7 @@
           <a:p>
             <a:fld id="{705F61FD-B4C5-4C11-9C2B-341349F118F3}" type="datetimeFigureOut">
               <a:rPr lang="en-US" smtClean="0"/>
-              <a:t>12/19/2017</a:t>
+              <a:t>3/9/2018</a:t>
             </a:fld>
             <a:endParaRPr lang="en-US"/>
           </a:p>
@@ -4638,7 +4719,7 @@
           <a:p>
             <a:fld id="{705F61FD-B4C5-4C11-9C2B-341349F118F3}" type="datetimeFigureOut">
               <a:rPr lang="en-US" smtClean="0"/>
-              <a:t>12/19/2017</a:t>
+              <a:t>3/9/2018</a:t>
             </a:fld>
             <a:endParaRPr lang="en-US"/>
           </a:p>
@@ -4879,7 +4960,7 @@
           <a:p>
             <a:fld id="{705F61FD-B4C5-4C11-9C2B-341349F118F3}" type="datetimeFigureOut">
               <a:rPr lang="en-US" smtClean="0"/>
-              <a:t>12/19/2017</a:t>
+              <a:t>3/9/2018</a:t>
             </a:fld>
             <a:endParaRPr lang="en-US"/>
           </a:p>
@@ -5538,10 +5619,10 @@
       </p:pic>
       <p:sp>
         <p:nvSpPr>
-          <p:cNvPr id="3" name="Multiplication Sign 2">
-            <a:extLst>
-              <a:ext uri="{FF2B5EF4-FFF2-40B4-BE49-F238E27FC236}">
-                <a16:creationId xmlns:a16="http://schemas.microsoft.com/office/drawing/2014/main" id="{D250D44B-F387-4D84-B7E5-EC1CAE256365}"/>
+          <p:cNvPr id="5" name="Multiplication Sign 4">
+            <a:extLst>
+              <a:ext uri="{FF2B5EF4-FFF2-40B4-BE49-F238E27FC236}">
+                <a16:creationId xmlns:a16="http://schemas.microsoft.com/office/drawing/2014/main" id="{4D219B1D-612E-4F6C-A8AB-45C06CB717D7}"/>
               </a:ext>
             </a:extLst>
           </p:cNvPr>
@@ -5550,8 +5631,204 @@
         </p:nvSpPr>
         <p:spPr>
           <a:xfrm>
-            <a:off x="4090986" y="1643061"/>
-            <a:ext cx="3381375" cy="2895600"/>
+            <a:off x="5129211" y="1733550"/>
+            <a:ext cx="1304925" cy="1152525"/>
+          </a:xfrm>
+          <a:prstGeom prst="mathMultiply">
+            <a:avLst/>
+          </a:prstGeom>
+          <a:solidFill>
+            <a:srgbClr val="FF0000"/>
+          </a:solidFill>
+        </p:spPr>
+        <p:style>
+          <a:lnRef idx="2">
+            <a:schemeClr val="accent1">
+              <a:shade val="50000"/>
+            </a:schemeClr>
+          </a:lnRef>
+          <a:fillRef idx="1">
+            <a:schemeClr val="accent1"/>
+          </a:fillRef>
+          <a:effectRef idx="0">
+            <a:schemeClr val="accent1"/>
+          </a:effectRef>
+          <a:fontRef idx="minor">
+            <a:schemeClr val="lt1"/>
+          </a:fontRef>
+        </p:style>
+        <p:txBody>
+          <a:bodyPr rtlCol="0" anchor="ctr"/>
+          <a:lstStyle/>
+          <a:p>
+            <a:pPr algn="ctr"/>
+            <a:endParaRPr lang="en-US"/>
+          </a:p>
+        </p:txBody>
+      </p:sp>
+      <p:sp>
+        <p:nvSpPr>
+          <p:cNvPr id="6" name="Multiplication Sign 5">
+            <a:extLst>
+              <a:ext uri="{FF2B5EF4-FFF2-40B4-BE49-F238E27FC236}">
+                <a16:creationId xmlns:a16="http://schemas.microsoft.com/office/drawing/2014/main" id="{21E8208D-0546-4554-B693-114D856797A7}"/>
+              </a:ext>
+            </a:extLst>
+          </p:cNvPr>
+          <p:cNvSpPr/>
+          <p:nvPr/>
+        </p:nvSpPr>
+        <p:spPr>
+          <a:xfrm>
+            <a:off x="5934075" y="2514598"/>
+            <a:ext cx="1304925" cy="1152525"/>
+          </a:xfrm>
+          <a:prstGeom prst="mathMultiply">
+            <a:avLst/>
+          </a:prstGeom>
+          <a:solidFill>
+            <a:srgbClr val="FF0000"/>
+          </a:solidFill>
+        </p:spPr>
+        <p:style>
+          <a:lnRef idx="2">
+            <a:schemeClr val="accent1">
+              <a:shade val="50000"/>
+            </a:schemeClr>
+          </a:lnRef>
+          <a:fillRef idx="1">
+            <a:schemeClr val="accent1"/>
+          </a:fillRef>
+          <a:effectRef idx="0">
+            <a:schemeClr val="accent1"/>
+          </a:effectRef>
+          <a:fontRef idx="minor">
+            <a:schemeClr val="lt1"/>
+          </a:fontRef>
+        </p:style>
+        <p:txBody>
+          <a:bodyPr rtlCol="0" anchor="ctr"/>
+          <a:lstStyle/>
+          <a:p>
+            <a:pPr algn="ctr"/>
+            <a:endParaRPr lang="en-US"/>
+          </a:p>
+        </p:txBody>
+      </p:sp>
+      <p:sp>
+        <p:nvSpPr>
+          <p:cNvPr id="7" name="Multiplication Sign 6">
+            <a:extLst>
+              <a:ext uri="{FF2B5EF4-FFF2-40B4-BE49-F238E27FC236}">
+                <a16:creationId xmlns:a16="http://schemas.microsoft.com/office/drawing/2014/main" id="{9B3F4661-D163-4311-BA04-614FBBC2C5D1}"/>
+              </a:ext>
+            </a:extLst>
+          </p:cNvPr>
+          <p:cNvSpPr/>
+          <p:nvPr/>
+        </p:nvSpPr>
+        <p:spPr>
+          <a:xfrm>
+            <a:off x="4381499" y="2495552"/>
+            <a:ext cx="1304925" cy="1152525"/>
+          </a:xfrm>
+          <a:prstGeom prst="mathMultiply">
+            <a:avLst/>
+          </a:prstGeom>
+          <a:solidFill>
+            <a:srgbClr val="FF0000"/>
+          </a:solidFill>
+        </p:spPr>
+        <p:style>
+          <a:lnRef idx="2">
+            <a:schemeClr val="accent1">
+              <a:shade val="50000"/>
+            </a:schemeClr>
+          </a:lnRef>
+          <a:fillRef idx="1">
+            <a:schemeClr val="accent1"/>
+          </a:fillRef>
+          <a:effectRef idx="0">
+            <a:schemeClr val="accent1"/>
+          </a:effectRef>
+          <a:fontRef idx="minor">
+            <a:schemeClr val="lt1"/>
+          </a:fontRef>
+        </p:style>
+        <p:txBody>
+          <a:bodyPr rtlCol="0" anchor="ctr"/>
+          <a:lstStyle/>
+          <a:p>
+            <a:pPr algn="ctr"/>
+            <a:endParaRPr lang="en-US"/>
+          </a:p>
+        </p:txBody>
+      </p:sp>
+      <p:sp>
+        <p:nvSpPr>
+          <p:cNvPr id="8" name="Multiplication Sign 7">
+            <a:extLst>
+              <a:ext uri="{FF2B5EF4-FFF2-40B4-BE49-F238E27FC236}">
+                <a16:creationId xmlns:a16="http://schemas.microsoft.com/office/drawing/2014/main" id="{63FF1C26-C99D-418E-92A7-0C7B8DCCECAA}"/>
+              </a:ext>
+            </a:extLst>
+          </p:cNvPr>
+          <p:cNvSpPr/>
+          <p:nvPr/>
+        </p:nvSpPr>
+        <p:spPr>
+          <a:xfrm>
+            <a:off x="5157787" y="3200399"/>
+            <a:ext cx="1304925" cy="1152525"/>
+          </a:xfrm>
+          <a:prstGeom prst="mathMultiply">
+            <a:avLst/>
+          </a:prstGeom>
+          <a:solidFill>
+            <a:srgbClr val="FF0000"/>
+          </a:solidFill>
+        </p:spPr>
+        <p:style>
+          <a:lnRef idx="2">
+            <a:schemeClr val="accent1">
+              <a:shade val="50000"/>
+            </a:schemeClr>
+          </a:lnRef>
+          <a:fillRef idx="1">
+            <a:schemeClr val="accent1"/>
+          </a:fillRef>
+          <a:effectRef idx="0">
+            <a:schemeClr val="accent1"/>
+          </a:effectRef>
+          <a:fontRef idx="minor">
+            <a:schemeClr val="lt1"/>
+          </a:fontRef>
+        </p:style>
+        <p:txBody>
+          <a:bodyPr rtlCol="0" anchor="ctr"/>
+          <a:lstStyle/>
+          <a:p>
+            <a:pPr algn="ctr"/>
+            <a:endParaRPr lang="en-US"/>
+          </a:p>
+        </p:txBody>
+      </p:sp>
+      <p:sp>
+        <p:nvSpPr>
+          <p:cNvPr id="4" name="Multiplication Sign 3">
+            <a:extLst>
+              <a:ext uri="{FF2B5EF4-FFF2-40B4-BE49-F238E27FC236}">
+                <a16:creationId xmlns:a16="http://schemas.microsoft.com/office/drawing/2014/main" id="{39321E22-6B0A-49E8-89FB-F91A9A8C4B9A}"/>
+              </a:ext>
+            </a:extLst>
+          </p:cNvPr>
+          <p:cNvSpPr/>
+          <p:nvPr/>
+        </p:nvSpPr>
+        <p:spPr>
+          <a:xfrm>
+            <a:off x="5157786" y="2514598"/>
+            <a:ext cx="1304925" cy="1152525"/>
           </a:xfrm>
           <a:prstGeom prst="mathMultiply">
             <a:avLst/>
@@ -5646,10 +5923,10 @@
       </p:pic>
       <p:sp>
         <p:nvSpPr>
-          <p:cNvPr id="5" name="Rectangle 4">
-            <a:extLst>
-              <a:ext uri="{FF2B5EF4-FFF2-40B4-BE49-F238E27FC236}">
-                <a16:creationId xmlns:a16="http://schemas.microsoft.com/office/drawing/2014/main" id="{9C9D6F7C-D5B3-4ED3-A70C-9007FE21517F}"/>
+          <p:cNvPr id="3" name="Multiplication Sign 2">
+            <a:extLst>
+              <a:ext uri="{FF2B5EF4-FFF2-40B4-BE49-F238E27FC236}">
+                <a16:creationId xmlns:a16="http://schemas.microsoft.com/office/drawing/2014/main" id="{D250D44B-F387-4D84-B7E5-EC1CAE256365}"/>
               </a:ext>
             </a:extLst>
           </p:cNvPr>
@@ -5658,10 +5935,10 @@
         </p:nvSpPr>
         <p:spPr>
           <a:xfrm>
-            <a:off x="4010025" y="2981325"/>
-            <a:ext cx="3533774" cy="209550"/>
+            <a:off x="3250404" y="847725"/>
+            <a:ext cx="5062539" cy="4348161"/>
           </a:xfrm>
-          <a:prstGeom prst="rect">
+          <a:prstGeom prst="mathMultiply">
             <a:avLst/>
           </a:prstGeom>
           <a:solidFill>
@@ -5696,7 +5973,7 @@
     </p:spTree>
     <p:extLst>
       <p:ext uri="{BB962C8B-B14F-4D97-AF65-F5344CB8AC3E}">
-        <p14:creationId xmlns:p14="http://schemas.microsoft.com/office/powerpoint/2010/main" val="872767627"/>
+        <p14:creationId xmlns:p14="http://schemas.microsoft.com/office/powerpoint/2010/main" val="1073403783"/>
       </p:ext>
     </p:extLst>
   </p:cSld>
@@ -5765,7 +6042,7 @@
           <p:nvPr/>
         </p:nvSpPr>
         <p:spPr>
-          <a:xfrm rot="5400000">
+          <a:xfrm>
             <a:off x="4010025" y="2981325"/>
             <a:ext cx="3533774" cy="209550"/>
           </a:xfrm>
@@ -5804,7 +6081,7 @@
     </p:spTree>
     <p:extLst>
       <p:ext uri="{BB962C8B-B14F-4D97-AF65-F5344CB8AC3E}">
-        <p14:creationId xmlns:p14="http://schemas.microsoft.com/office/powerpoint/2010/main" val="1572736565"/>
+        <p14:creationId xmlns:p14="http://schemas.microsoft.com/office/powerpoint/2010/main" val="872767627"/>
       </p:ext>
     </p:extLst>
   </p:cSld>
@@ -5862,54 +6139,57 @@
       </p:pic>
       <p:sp>
         <p:nvSpPr>
-          <p:cNvPr id="4" name="TextBox 3">
-            <a:extLst>
-              <a:ext uri="{FF2B5EF4-FFF2-40B4-BE49-F238E27FC236}">
-                <a16:creationId xmlns:a16="http://schemas.microsoft.com/office/drawing/2014/main" id="{A58FC557-A667-4323-A120-60DA62E7AC47}"/>
-              </a:ext>
-            </a:extLst>
-          </p:cNvPr>
-          <p:cNvSpPr txBox="1"/>
+          <p:cNvPr id="5" name="Rectangle 4">
+            <a:extLst>
+              <a:ext uri="{FF2B5EF4-FFF2-40B4-BE49-F238E27FC236}">
+                <a16:creationId xmlns:a16="http://schemas.microsoft.com/office/drawing/2014/main" id="{9C9D6F7C-D5B3-4ED3-A70C-9007FE21517F}"/>
+              </a:ext>
+            </a:extLst>
+          </p:cNvPr>
+          <p:cNvSpPr/>
           <p:nvPr/>
         </p:nvSpPr>
         <p:spPr>
-          <a:xfrm>
-            <a:off x="4486274" y="-133099"/>
-            <a:ext cx="2886075" cy="6447919"/>
+          <a:xfrm rot="5400000">
+            <a:off x="4010025" y="2981325"/>
+            <a:ext cx="3533774" cy="209550"/>
           </a:xfrm>
           <a:prstGeom prst="rect">
             <a:avLst/>
           </a:prstGeom>
-          <a:noFill/>
+          <a:solidFill>
+            <a:srgbClr val="FF0000"/>
+          </a:solidFill>
         </p:spPr>
-        <p:txBody>
-          <a:bodyPr wrap="square" rtlCol="0">
-            <a:spAutoFit/>
-          </a:bodyPr>
-          <a:lstStyle/>
-          <a:p>
-            <a:r>
-              <a:rPr lang="en-US" sz="41300" dirty="0">
-                <a:solidFill>
-                  <a:srgbClr val="FFFF00"/>
-                </a:solidFill>
-                <a:effectLst>
-                  <a:outerShdw blurRad="50800" dist="38100" dir="10800000" algn="r" rotWithShape="0">
-                    <a:prstClr val="black">
-                      <a:alpha val="40000"/>
-                    </a:prstClr>
-                  </a:outerShdw>
-                </a:effectLst>
-              </a:rPr>
-              <a:t>?</a:t>
-            </a:r>
+        <p:style>
+          <a:lnRef idx="2">
+            <a:schemeClr val="accent1">
+              <a:shade val="50000"/>
+            </a:schemeClr>
+          </a:lnRef>
+          <a:fillRef idx="1">
+            <a:schemeClr val="accent1"/>
+          </a:fillRef>
+          <a:effectRef idx="0">
+            <a:schemeClr val="accent1"/>
+          </a:effectRef>
+          <a:fontRef idx="minor">
+            <a:schemeClr val="lt1"/>
+          </a:fontRef>
+        </p:style>
+        <p:txBody>
+          <a:bodyPr rtlCol="0" anchor="ctr"/>
+          <a:lstStyle/>
+          <a:p>
+            <a:pPr algn="ctr"/>
+            <a:endParaRPr lang="en-US"/>
           </a:p>
         </p:txBody>
       </p:sp>
     </p:spTree>
     <p:extLst>
       <p:ext uri="{BB962C8B-B14F-4D97-AF65-F5344CB8AC3E}">
-        <p14:creationId xmlns:p14="http://schemas.microsoft.com/office/powerpoint/2010/main" val="3234151335"/>
+        <p14:creationId xmlns:p14="http://schemas.microsoft.com/office/powerpoint/2010/main" val="1572736565"/>
       </p:ext>
     </p:extLst>
   </p:cSld>
@@ -5957,7 +6237,7 @@
         </p:blipFill>
         <p:spPr>
           <a:xfrm>
-            <a:off x="3962400" y="1333499"/>
+            <a:off x="3962400" y="1257299"/>
             <a:ext cx="3638549" cy="3667125"/>
           </a:xfrm>
           <a:prstGeom prst="rect">
@@ -5979,8 +6259,8 @@
         </p:nvSpPr>
         <p:spPr>
           <a:xfrm>
-            <a:off x="3867149" y="1658956"/>
-            <a:ext cx="7677150" cy="3016210"/>
+            <a:off x="4486274" y="-133099"/>
+            <a:ext cx="2886075" cy="6447919"/>
           </a:xfrm>
           <a:prstGeom prst="rect">
             <a:avLst/>
@@ -5990,21 +6270,11 @@
         <p:txBody>
           <a:bodyPr wrap="square" rtlCol="0">
             <a:spAutoFit/>
-            <a:scene3d>
-              <a:camera prst="orthographicFront"/>
-              <a:lightRig rig="soft" dir="t">
-                <a:rot lat="0" lon="0" rev="15600000"/>
-              </a:lightRig>
-            </a:scene3d>
-            <a:sp3d extrusionH="57150" prstMaterial="softEdge">
-              <a:bevelT w="25400" h="38100"/>
-            </a:sp3d>
           </a:bodyPr>
           <a:lstStyle/>
           <a:p>
             <a:r>
-              <a:rPr lang="en-US" sz="19000" b="1" dirty="0">
-                <a:ln/>
+              <a:rPr lang="en-US" sz="41300" dirty="0">
                 <a:solidFill>
                   <a:srgbClr val="FFFF00"/>
                 </a:solidFill>
@@ -6016,7 +6286,7 @@
                   </a:outerShdw>
                 </a:effectLst>
               </a:rPr>
-              <a:t>?++</a:t>
+              <a:t>?</a:t>
             </a:r>
           </a:p>
         </p:txBody>
@@ -6024,7 +6294,7 @@
     </p:spTree>
     <p:extLst>
       <p:ext uri="{BB962C8B-B14F-4D97-AF65-F5344CB8AC3E}">
-        <p14:creationId xmlns:p14="http://schemas.microsoft.com/office/powerpoint/2010/main" val="1323239356"/>
+        <p14:creationId xmlns:p14="http://schemas.microsoft.com/office/powerpoint/2010/main" val="3234151335"/>
       </p:ext>
     </p:extLst>
   </p:cSld>
@@ -6056,6 +6326,121 @@
           <p:cNvPr id="2" name="Picture 1">
             <a:extLst>
               <a:ext uri="{FF2B5EF4-FFF2-40B4-BE49-F238E27FC236}">
+                <a16:creationId xmlns:a16="http://schemas.microsoft.com/office/drawing/2014/main" id="{810E4F26-075C-4F8E-B53A-135C51CBBCEC}"/>
+              </a:ext>
+            </a:extLst>
+          </p:cNvPr>
+          <p:cNvPicPr>
+            <a:picLocks noChangeAspect="1"/>
+          </p:cNvPicPr>
+          <p:nvPr/>
+        </p:nvPicPr>
+        <p:blipFill rotWithShape="1">
+          <a:blip r:embed="rId3"/>
+          <a:srcRect l="22135" t="582" r="23110" b="44060"/>
+          <a:stretch/>
+        </p:blipFill>
+        <p:spPr>
+          <a:xfrm>
+            <a:off x="3962400" y="1333499"/>
+            <a:ext cx="3638549" cy="3667125"/>
+          </a:xfrm>
+          <a:prstGeom prst="rect">
+            <a:avLst/>
+          </a:prstGeom>
+        </p:spPr>
+      </p:pic>
+      <p:sp>
+        <p:nvSpPr>
+          <p:cNvPr id="4" name="TextBox 3">
+            <a:extLst>
+              <a:ext uri="{FF2B5EF4-FFF2-40B4-BE49-F238E27FC236}">
+                <a16:creationId xmlns:a16="http://schemas.microsoft.com/office/drawing/2014/main" id="{A58FC557-A667-4323-A120-60DA62E7AC47}"/>
+              </a:ext>
+            </a:extLst>
+          </p:cNvPr>
+          <p:cNvSpPr txBox="1"/>
+          <p:nvPr/>
+        </p:nvSpPr>
+        <p:spPr>
+          <a:xfrm>
+            <a:off x="3867149" y="1658956"/>
+            <a:ext cx="7677150" cy="3016210"/>
+          </a:xfrm>
+          <a:prstGeom prst="rect">
+            <a:avLst/>
+          </a:prstGeom>
+          <a:noFill/>
+        </p:spPr>
+        <p:txBody>
+          <a:bodyPr wrap="square" rtlCol="0">
+            <a:spAutoFit/>
+            <a:scene3d>
+              <a:camera prst="orthographicFront"/>
+              <a:lightRig rig="soft" dir="t">
+                <a:rot lat="0" lon="0" rev="15600000"/>
+              </a:lightRig>
+            </a:scene3d>
+            <a:sp3d extrusionH="57150" prstMaterial="softEdge">
+              <a:bevelT w="25400" h="38100"/>
+            </a:sp3d>
+          </a:bodyPr>
+          <a:lstStyle/>
+          <a:p>
+            <a:r>
+              <a:rPr lang="en-US" sz="19000" b="1" dirty="0">
+                <a:ln/>
+                <a:solidFill>
+                  <a:srgbClr val="FFFF00"/>
+                </a:solidFill>
+                <a:effectLst>
+                  <a:outerShdw blurRad="50800" dist="38100" dir="10800000" algn="r" rotWithShape="0">
+                    <a:prstClr val="black">
+                      <a:alpha val="40000"/>
+                    </a:prstClr>
+                  </a:outerShdw>
+                </a:effectLst>
+              </a:rPr>
+              <a:t>?++</a:t>
+            </a:r>
+          </a:p>
+        </p:txBody>
+      </p:sp>
+    </p:spTree>
+    <p:extLst>
+      <p:ext uri="{BB962C8B-B14F-4D97-AF65-F5344CB8AC3E}">
+        <p14:creationId xmlns:p14="http://schemas.microsoft.com/office/powerpoint/2010/main" val="1323239356"/>
+      </p:ext>
+    </p:extLst>
+  </p:cSld>
+  <p:clrMapOvr>
+    <a:masterClrMapping/>
+  </p:clrMapOvr>
+</p:sld>
+</file>
+
+<file path=ppt/slides/slide16.xml><?xml version="1.0" encoding="utf-8"?>
+<p:sld xmlns:a="http://schemas.openxmlformats.org/drawingml/2006/main" xmlns:r="http://schemas.openxmlformats.org/officeDocument/2006/relationships" xmlns:p="http://schemas.openxmlformats.org/presentationml/2006/main">
+  <p:cSld>
+    <p:spTree>
+      <p:nvGrpSpPr>
+        <p:cNvPr id="1" name=""/>
+        <p:cNvGrpSpPr/>
+        <p:nvPr/>
+      </p:nvGrpSpPr>
+      <p:grpSpPr>
+        <a:xfrm>
+          <a:off x="0" y="0"/>
+          <a:ext cx="0" cy="0"/>
+          <a:chOff x="0" y="0"/>
+          <a:chExt cx="0" cy="0"/>
+        </a:xfrm>
+      </p:grpSpPr>
+      <p:pic>
+        <p:nvPicPr>
+          <p:cNvPr id="2" name="Picture 1">
+            <a:extLst>
+              <a:ext uri="{FF2B5EF4-FFF2-40B4-BE49-F238E27FC236}">
                 <a16:creationId xmlns:a16="http://schemas.microsoft.com/office/drawing/2014/main" id="{3F346B1C-146E-40B6-A156-9ECCC04E1773}"/>
               </a:ext>
             </a:extLst>
@@ -6139,7 +6524,7 @@
 </p:sld>
 </file>
 
-<file path=ppt/slides/slide16.xml><?xml version="1.0" encoding="utf-8"?>
+<file path=ppt/slides/slide17.xml><?xml version="1.0" encoding="utf-8"?>
 <p:sld xmlns:a="http://schemas.openxmlformats.org/drawingml/2006/main" xmlns:r="http://schemas.openxmlformats.org/officeDocument/2006/relationships" xmlns:p="http://schemas.openxmlformats.org/presentationml/2006/main">
   <p:cSld>
     <p:spTree>
@@ -6253,7 +6638,7 @@
 </p:sld>
 </file>
 
-<file path=ppt/slides/slide17.xml><?xml version="1.0" encoding="utf-8"?>
+<file path=ppt/slides/slide18.xml><?xml version="1.0" encoding="utf-8"?>
 <p:sld xmlns:a="http://schemas.openxmlformats.org/drawingml/2006/main" xmlns:r="http://schemas.openxmlformats.org/officeDocument/2006/relationships" xmlns:p="http://schemas.openxmlformats.org/presentationml/2006/main">
   <p:cSld>
     <p:spTree>
@@ -6367,7 +6752,7 @@
 </p:sld>
 </file>
 
-<file path=ppt/slides/slide18.xml><?xml version="1.0" encoding="utf-8"?>
+<file path=ppt/slides/slide19.xml><?xml version="1.0" encoding="utf-8"?>
 <p:sld xmlns:a="http://schemas.openxmlformats.org/drawingml/2006/main" xmlns:r="http://schemas.openxmlformats.org/officeDocument/2006/relationships" xmlns:p="http://schemas.openxmlformats.org/presentationml/2006/main">
   <p:cSld>
     <p:spTree>
@@ -6497,7 +6882,101 @@
 </p:sld>
 </file>
 
-<file path=ppt/slides/slide19.xml><?xml version="1.0" encoding="utf-8"?>
+<file path=ppt/slides/slide2.xml><?xml version="1.0" encoding="utf-8"?>
+<p:sld xmlns:a="http://schemas.openxmlformats.org/drawingml/2006/main" xmlns:r="http://schemas.openxmlformats.org/officeDocument/2006/relationships" xmlns:p="http://schemas.openxmlformats.org/presentationml/2006/main">
+  <p:cSld>
+    <p:spTree>
+      <p:nvGrpSpPr>
+        <p:cNvPr id="1" name=""/>
+        <p:cNvGrpSpPr/>
+        <p:nvPr/>
+      </p:nvGrpSpPr>
+      <p:grpSpPr>
+        <a:xfrm>
+          <a:off x="0" y="0"/>
+          <a:ext cx="0" cy="0"/>
+          <a:chOff x="0" y="0"/>
+          <a:chExt cx="0" cy="0"/>
+        </a:xfrm>
+      </p:grpSpPr>
+      <p:sp>
+        <p:nvSpPr>
+          <p:cNvPr id="2" name="TextBox 1">
+            <a:extLst>
+              <a:ext uri="{FF2B5EF4-FFF2-40B4-BE49-F238E27FC236}">
+                <a16:creationId xmlns:a16="http://schemas.microsoft.com/office/drawing/2014/main" id="{C7955F0B-61C8-4E9A-9DD1-1E319A288C08}"/>
+              </a:ext>
+            </a:extLst>
+          </p:cNvPr>
+          <p:cNvSpPr txBox="1"/>
+          <p:nvPr/>
+        </p:nvSpPr>
+        <p:spPr>
+          <a:xfrm>
+            <a:off x="1914525" y="1495425"/>
+            <a:ext cx="5857875" cy="1200329"/>
+          </a:xfrm>
+          <a:prstGeom prst="rect">
+            <a:avLst/>
+          </a:prstGeom>
+          <a:noFill/>
+        </p:spPr>
+        <p:txBody>
+          <a:bodyPr wrap="square" rtlCol="0">
+            <a:spAutoFit/>
+          </a:bodyPr>
+          <a:lstStyle/>
+          <a:p>
+            <a:r>
+              <a:rPr lang="en-US" dirty="0">
+                <a:latin typeface="Arial Black" panose="020B0A04020102020204" pitchFamily="34" charset="0"/>
+              </a:rPr>
+              <a:t>QACG</a:t>
+            </a:r>
+          </a:p>
+          <a:p>
+            <a:r>
+              <a:rPr lang="en-US" dirty="0">
+                <a:latin typeface="Arial" panose="020B0604020202020204" pitchFamily="34" charset="0"/>
+                <a:cs typeface="Arial" panose="020B0604020202020204" pitchFamily="34" charset="0"/>
+              </a:rPr>
+              <a:t>QACG</a:t>
+            </a:r>
+          </a:p>
+          <a:p>
+            <a:r>
+              <a:rPr lang="en-US" dirty="0">
+                <a:latin typeface="Arial Narrow" panose="020B0606020202030204" pitchFamily="34" charset="0"/>
+                <a:cs typeface="Arial" panose="020B0604020202020204" pitchFamily="34" charset="0"/>
+              </a:rPr>
+              <a:t>QACG</a:t>
+            </a:r>
+          </a:p>
+          <a:p>
+            <a:r>
+              <a:rPr lang="en-US" dirty="0">
+                <a:latin typeface="Arial Rounded MT Bold" panose="020F0704030504030204" pitchFamily="34" charset="0"/>
+                <a:cs typeface="Arial" panose="020B0604020202020204" pitchFamily="34" charset="0"/>
+              </a:rPr>
+              <a:t>QACG</a:t>
+            </a:r>
+          </a:p>
+        </p:txBody>
+      </p:sp>
+    </p:spTree>
+    <p:extLst>
+      <p:ext uri="{BB962C8B-B14F-4D97-AF65-F5344CB8AC3E}">
+        <p14:creationId xmlns:p14="http://schemas.microsoft.com/office/powerpoint/2010/main" val="695752011"/>
+      </p:ext>
+    </p:extLst>
+  </p:cSld>
+  <p:clrMapOvr>
+    <a:masterClrMapping/>
+  </p:clrMapOvr>
+</p:sld>
+</file>
+
+<file path=ppt/slides/slide20.xml><?xml version="1.0" encoding="utf-8"?>
 <p:sld xmlns:a="http://schemas.openxmlformats.org/drawingml/2006/main" xmlns:r="http://schemas.openxmlformats.org/officeDocument/2006/relationships" xmlns:p="http://schemas.openxmlformats.org/presentationml/2006/main">
   <p:cSld>
     <p:spTree>
@@ -6609,100 +7088,6 @@
     <p:extLst>
       <p:ext uri="{BB962C8B-B14F-4D97-AF65-F5344CB8AC3E}">
         <p14:creationId xmlns:p14="http://schemas.microsoft.com/office/powerpoint/2010/main" val="3246792119"/>
-      </p:ext>
-    </p:extLst>
-  </p:cSld>
-  <p:clrMapOvr>
-    <a:masterClrMapping/>
-  </p:clrMapOvr>
-</p:sld>
-</file>
-
-<file path=ppt/slides/slide2.xml><?xml version="1.0" encoding="utf-8"?>
-<p:sld xmlns:a="http://schemas.openxmlformats.org/drawingml/2006/main" xmlns:r="http://schemas.openxmlformats.org/officeDocument/2006/relationships" xmlns:p="http://schemas.openxmlformats.org/presentationml/2006/main">
-  <p:cSld>
-    <p:spTree>
-      <p:nvGrpSpPr>
-        <p:cNvPr id="1" name=""/>
-        <p:cNvGrpSpPr/>
-        <p:nvPr/>
-      </p:nvGrpSpPr>
-      <p:grpSpPr>
-        <a:xfrm>
-          <a:off x="0" y="0"/>
-          <a:ext cx="0" cy="0"/>
-          <a:chOff x="0" y="0"/>
-          <a:chExt cx="0" cy="0"/>
-        </a:xfrm>
-      </p:grpSpPr>
-      <p:sp>
-        <p:nvSpPr>
-          <p:cNvPr id="2" name="TextBox 1">
-            <a:extLst>
-              <a:ext uri="{FF2B5EF4-FFF2-40B4-BE49-F238E27FC236}">
-                <a16:creationId xmlns:a16="http://schemas.microsoft.com/office/drawing/2014/main" id="{C7955F0B-61C8-4E9A-9DD1-1E319A288C08}"/>
-              </a:ext>
-            </a:extLst>
-          </p:cNvPr>
-          <p:cNvSpPr txBox="1"/>
-          <p:nvPr/>
-        </p:nvSpPr>
-        <p:spPr>
-          <a:xfrm>
-            <a:off x="1914525" y="1495425"/>
-            <a:ext cx="5857875" cy="1200329"/>
-          </a:xfrm>
-          <a:prstGeom prst="rect">
-            <a:avLst/>
-          </a:prstGeom>
-          <a:noFill/>
-        </p:spPr>
-        <p:txBody>
-          <a:bodyPr wrap="square" rtlCol="0">
-            <a:spAutoFit/>
-          </a:bodyPr>
-          <a:lstStyle/>
-          <a:p>
-            <a:r>
-              <a:rPr lang="en-US" dirty="0">
-                <a:latin typeface="Arial Black" panose="020B0A04020102020204" pitchFamily="34" charset="0"/>
-              </a:rPr>
-              <a:t>QACG</a:t>
-            </a:r>
-          </a:p>
-          <a:p>
-            <a:r>
-              <a:rPr lang="en-US" dirty="0">
-                <a:latin typeface="Arial" panose="020B0604020202020204" pitchFamily="34" charset="0"/>
-                <a:cs typeface="Arial" panose="020B0604020202020204" pitchFamily="34" charset="0"/>
-              </a:rPr>
-              <a:t>QACG</a:t>
-            </a:r>
-          </a:p>
-          <a:p>
-            <a:r>
-              <a:rPr lang="en-US" dirty="0">
-                <a:latin typeface="Arial Narrow" panose="020B0606020202030204" pitchFamily="34" charset="0"/>
-                <a:cs typeface="Arial" panose="020B0604020202020204" pitchFamily="34" charset="0"/>
-              </a:rPr>
-              <a:t>QACG</a:t>
-            </a:r>
-          </a:p>
-          <a:p>
-            <a:r>
-              <a:rPr lang="en-US" dirty="0">
-                <a:latin typeface="Arial Rounded MT Bold" panose="020F0704030504030204" pitchFamily="34" charset="0"/>
-                <a:cs typeface="Arial" panose="020B0604020202020204" pitchFamily="34" charset="0"/>
-              </a:rPr>
-              <a:t>QACG</a:t>
-            </a:r>
-          </a:p>
-        </p:txBody>
-      </p:sp>
-    </p:spTree>
-    <p:extLst>
-      <p:ext uri="{BB962C8B-B14F-4D97-AF65-F5344CB8AC3E}">
-        <p14:creationId xmlns:p14="http://schemas.microsoft.com/office/powerpoint/2010/main" val="695752011"/>
       </p:ext>
     </p:extLst>
   </p:cSld>

</xml_diff>